<commit_message>
Update Slides ML BigData Session 3
</commit_message>
<xml_diff>
--- a/module3/session3/class2-part1-logistic-regression.pptx
+++ b/module3/session3/class2-part1-logistic-regression.pptx
@@ -13,7 +13,7 @@
     <p:sldId id="308" r:id="rId7"/>
     <p:sldId id="298" r:id="rId8"/>
     <p:sldId id="258" r:id="rId9"/>
-    <p:sldId id="259" r:id="rId10"/>
+    <p:sldId id="309" r:id="rId10"/>
     <p:sldId id="260" r:id="rId11"/>
     <p:sldId id="275" r:id="rId12"/>
     <p:sldId id="261" r:id="rId13"/>
@@ -145,7 +145,7 @@
             <p14:sldId id="308"/>
             <p14:sldId id="298"/>
             <p14:sldId id="258"/>
-            <p14:sldId id="259"/>
+            <p14:sldId id="309"/>
             <p14:sldId id="260"/>
             <p14:sldId id="275"/>
             <p14:sldId id="261"/>
@@ -271,7 +271,7 @@
           <a:p>
             <a:fld id="{89922305-5C9A-4A9B-A26D-CD3EAF4204D1}" type="datetimeFigureOut">
               <a:rPr lang="fr-FR" smtClean="0"/>
-              <a:t>15/07/2021</a:t>
+              <a:t>31/03/2022</a:t>
             </a:fld>
             <a:endParaRPr lang="fr-FR"/>
           </a:p>
@@ -429,7 +429,7 @@
           <a:p>
             <a:fld id="{1987A764-C96C-4333-B9FE-62CC313D1562}" type="slidenum">
               <a:rPr lang="fr-FR" smtClean="0"/>
-              <a:t>‹N°›</a:t>
+              <a:t>‹#›</a:t>
             </a:fld>
             <a:endParaRPr lang="fr-FR"/>
           </a:p>
@@ -812,7 +812,7 @@
           <a:p>
             <a:fld id="{C6DF3C84-C6DC-034B-A182-D1BEEAB8C825}" type="datetimeFigureOut">
               <a:rPr lang="en-FR" smtClean="0"/>
-              <a:t>07/15/2021</a:t>
+              <a:t>03/31/2022</a:t>
             </a:fld>
             <a:endParaRPr lang="en-FR"/>
           </a:p>
@@ -866,7 +866,7 @@
           <a:p>
             <a:fld id="{CA13C0C9-676E-2540-ABA0-E69B15A5A19E}" type="slidenum">
               <a:rPr lang="en-FR" smtClean="0"/>
-              <a:t>‹N°›</a:t>
+              <a:t>‹#›</a:t>
             </a:fld>
             <a:endParaRPr lang="en-FR"/>
           </a:p>
@@ -1012,7 +1012,7 @@
           <a:p>
             <a:fld id="{C6DF3C84-C6DC-034B-A182-D1BEEAB8C825}" type="datetimeFigureOut">
               <a:rPr lang="en-FR" smtClean="0"/>
-              <a:t>07/15/2021</a:t>
+              <a:t>03/31/2022</a:t>
             </a:fld>
             <a:endParaRPr lang="en-FR"/>
           </a:p>
@@ -1066,7 +1066,7 @@
           <a:p>
             <a:fld id="{CA13C0C9-676E-2540-ABA0-E69B15A5A19E}" type="slidenum">
               <a:rPr lang="en-FR" smtClean="0"/>
-              <a:t>‹N°›</a:t>
+              <a:t>‹#›</a:t>
             </a:fld>
             <a:endParaRPr lang="en-FR"/>
           </a:p>
@@ -1222,7 +1222,7 @@
           <a:p>
             <a:fld id="{C6DF3C84-C6DC-034B-A182-D1BEEAB8C825}" type="datetimeFigureOut">
               <a:rPr lang="en-FR" smtClean="0"/>
-              <a:t>07/15/2021</a:t>
+              <a:t>03/31/2022</a:t>
             </a:fld>
             <a:endParaRPr lang="en-FR"/>
           </a:p>
@@ -1276,7 +1276,7 @@
           <a:p>
             <a:fld id="{CA13C0C9-676E-2540-ABA0-E69B15A5A19E}" type="slidenum">
               <a:rPr lang="en-FR" smtClean="0"/>
-              <a:t>‹N°›</a:t>
+              <a:t>‹#›</a:t>
             </a:fld>
             <a:endParaRPr lang="en-FR"/>
           </a:p>
@@ -1494,7 +1494,7 @@
           <a:p>
             <a:fld id="{C6DF3C84-C6DC-034B-A182-D1BEEAB8C825}" type="datetimeFigureOut">
               <a:rPr lang="en-FR" smtClean="0"/>
-              <a:t>07/15/2021</a:t>
+              <a:t>03/31/2022</a:t>
             </a:fld>
             <a:endParaRPr lang="en-FR"/>
           </a:p>
@@ -1548,7 +1548,7 @@
           <a:p>
             <a:fld id="{CA13C0C9-676E-2540-ABA0-E69B15A5A19E}" type="slidenum">
               <a:rPr lang="en-FR" smtClean="0"/>
-              <a:t>‹N°›</a:t>
+              <a:t>‹#›</a:t>
             </a:fld>
             <a:endParaRPr lang="en-FR"/>
           </a:p>
@@ -1770,7 +1770,7 @@
           <a:p>
             <a:fld id="{C6DF3C84-C6DC-034B-A182-D1BEEAB8C825}" type="datetimeFigureOut">
               <a:rPr lang="en-FR" smtClean="0"/>
-              <a:t>07/15/2021</a:t>
+              <a:t>03/31/2022</a:t>
             </a:fld>
             <a:endParaRPr lang="en-FR"/>
           </a:p>
@@ -1824,7 +1824,7 @@
           <a:p>
             <a:fld id="{CA13C0C9-676E-2540-ABA0-E69B15A5A19E}" type="slidenum">
               <a:rPr lang="en-FR" smtClean="0"/>
-              <a:t>‹N°›</a:t>
+              <a:t>‹#›</a:t>
             </a:fld>
             <a:endParaRPr lang="en-FR"/>
           </a:p>
@@ -2038,7 +2038,7 @@
           <a:p>
             <a:fld id="{C6DF3C84-C6DC-034B-A182-D1BEEAB8C825}" type="datetimeFigureOut">
               <a:rPr lang="en-FR" smtClean="0"/>
-              <a:t>07/15/2021</a:t>
+              <a:t>03/31/2022</a:t>
             </a:fld>
             <a:endParaRPr lang="en-FR"/>
           </a:p>
@@ -2092,7 +2092,7 @@
           <a:p>
             <a:fld id="{CA13C0C9-676E-2540-ABA0-E69B15A5A19E}" type="slidenum">
               <a:rPr lang="en-FR" smtClean="0"/>
-              <a:t>‹N°›</a:t>
+              <a:t>‹#›</a:t>
             </a:fld>
             <a:endParaRPr lang="en-FR"/>
           </a:p>
@@ -2453,7 +2453,7 @@
           <a:p>
             <a:fld id="{C6DF3C84-C6DC-034B-A182-D1BEEAB8C825}" type="datetimeFigureOut">
               <a:rPr lang="en-FR" smtClean="0"/>
-              <a:t>07/15/2021</a:t>
+              <a:t>03/31/2022</a:t>
             </a:fld>
             <a:endParaRPr lang="en-FR"/>
           </a:p>
@@ -2507,7 +2507,7 @@
           <a:p>
             <a:fld id="{CA13C0C9-676E-2540-ABA0-E69B15A5A19E}" type="slidenum">
               <a:rPr lang="en-FR" smtClean="0"/>
-              <a:t>‹N°›</a:t>
+              <a:t>‹#›</a:t>
             </a:fld>
             <a:endParaRPr lang="en-FR"/>
           </a:p>
@@ -2595,7 +2595,7 @@
           <a:p>
             <a:fld id="{C6DF3C84-C6DC-034B-A182-D1BEEAB8C825}" type="datetimeFigureOut">
               <a:rPr lang="en-FR" smtClean="0"/>
-              <a:t>07/15/2021</a:t>
+              <a:t>03/31/2022</a:t>
             </a:fld>
             <a:endParaRPr lang="en-FR"/>
           </a:p>
@@ -2649,7 +2649,7 @@
           <a:p>
             <a:fld id="{CA13C0C9-676E-2540-ABA0-E69B15A5A19E}" type="slidenum">
               <a:rPr lang="en-FR" smtClean="0"/>
-              <a:t>‹N°›</a:t>
+              <a:t>‹#›</a:t>
             </a:fld>
             <a:endParaRPr lang="en-FR"/>
           </a:p>
@@ -2708,7 +2708,7 @@
           <a:p>
             <a:fld id="{C6DF3C84-C6DC-034B-A182-D1BEEAB8C825}" type="datetimeFigureOut">
               <a:rPr lang="en-FR" smtClean="0"/>
-              <a:t>07/15/2021</a:t>
+              <a:t>03/31/2022</a:t>
             </a:fld>
             <a:endParaRPr lang="en-FR"/>
           </a:p>
@@ -2762,7 +2762,7 @@
           <a:p>
             <a:fld id="{CA13C0C9-676E-2540-ABA0-E69B15A5A19E}" type="slidenum">
               <a:rPr lang="en-FR" smtClean="0"/>
-              <a:t>‹N°›</a:t>
+              <a:t>‹#›</a:t>
             </a:fld>
             <a:endParaRPr lang="en-FR"/>
           </a:p>
@@ -3021,7 +3021,7 @@
           <a:p>
             <a:fld id="{C6DF3C84-C6DC-034B-A182-D1BEEAB8C825}" type="datetimeFigureOut">
               <a:rPr lang="en-FR" smtClean="0"/>
-              <a:t>07/15/2021</a:t>
+              <a:t>03/31/2022</a:t>
             </a:fld>
             <a:endParaRPr lang="en-FR"/>
           </a:p>
@@ -3075,7 +3075,7 @@
           <a:p>
             <a:fld id="{CA13C0C9-676E-2540-ABA0-E69B15A5A19E}" type="slidenum">
               <a:rPr lang="en-FR" smtClean="0"/>
-              <a:t>‹N°›</a:t>
+              <a:t>‹#›</a:t>
             </a:fld>
             <a:endParaRPr lang="en-FR"/>
           </a:p>
@@ -3310,7 +3310,7 @@
           <a:p>
             <a:fld id="{C6DF3C84-C6DC-034B-A182-D1BEEAB8C825}" type="datetimeFigureOut">
               <a:rPr lang="en-FR" smtClean="0"/>
-              <a:t>07/15/2021</a:t>
+              <a:t>03/31/2022</a:t>
             </a:fld>
             <a:endParaRPr lang="en-FR"/>
           </a:p>
@@ -3364,7 +3364,7 @@
           <a:p>
             <a:fld id="{CA13C0C9-676E-2540-ABA0-E69B15A5A19E}" type="slidenum">
               <a:rPr lang="en-FR" smtClean="0"/>
-              <a:t>‹N°›</a:t>
+              <a:t>‹#›</a:t>
             </a:fld>
             <a:endParaRPr lang="en-FR"/>
           </a:p>
@@ -3553,7 +3553,7 @@
           <a:p>
             <a:fld id="{C6DF3C84-C6DC-034B-A182-D1BEEAB8C825}" type="datetimeFigureOut">
               <a:rPr lang="en-FR" smtClean="0"/>
-              <a:t>07/15/2021</a:t>
+              <a:t>03/31/2022</a:t>
             </a:fld>
             <a:endParaRPr lang="en-FR"/>
           </a:p>
@@ -3643,7 +3643,7 @@
           <a:p>
             <a:fld id="{CA13C0C9-676E-2540-ABA0-E69B15A5A19E}" type="slidenum">
               <a:rPr lang="en-FR" smtClean="0"/>
-              <a:t>‹N°›</a:t>
+              <a:t>‹#›</a:t>
             </a:fld>
             <a:endParaRPr lang="en-FR"/>
           </a:p>
@@ -10173,8 +10173,8 @@
           </a:p>
         </p:txBody>
       </p:sp>
-      <mc:AlternateContent xmlns:mc="http://schemas.openxmlformats.org/markup-compatibility/2006" xmlns:a14="http://schemas.microsoft.com/office/drawing/2010/main">
-        <mc:Choice Requires="a14">
+      <mc:AlternateContent xmlns:mc="http://schemas.openxmlformats.org/markup-compatibility/2006">
+        <mc:Choice xmlns:a14="http://schemas.microsoft.com/office/drawing/2010/main" Requires="a14">
           <p:sp>
             <p:nvSpPr>
               <p:cNvPr id="5" name="Content Placeholder 4">
@@ -10261,7 +10261,7 @@
             </p:txBody>
           </p:sp>
         </mc:Choice>
-        <mc:Fallback xmlns="">
+        <mc:Fallback>
           <p:sp>
             <p:nvSpPr>
               <p:cNvPr id="5" name="Content Placeholder 4">
@@ -10291,7 +10291,7 @@
               <a:lstStyle/>
               <a:p>
                 <a:r>
-                  <a:rPr lang="fr-FR">
+                  <a:rPr lang="en-US">
                     <a:noFill/>
                   </a:rPr>
                   <a:t> </a:t>
@@ -10333,10 +10333,10 @@
       </p:pic>
       <p:pic>
         <p:nvPicPr>
-          <p:cNvPr id="7" name="Picture 6" descr="A picture containing clock&#10;&#10;Description automatically generated">
+          <p:cNvPr id="6" name="Picture 5">
             <a:extLst>
               <a:ext uri="{FF2B5EF4-FFF2-40B4-BE49-F238E27FC236}">
-                <a16:creationId xmlns:a16="http://schemas.microsoft.com/office/drawing/2014/main" id="{35B53441-5777-CE47-8F27-FE8DA99B1ECC}"/>
+                <a16:creationId xmlns:a16="http://schemas.microsoft.com/office/drawing/2014/main" id="{52FD30A5-B131-4A2E-9B02-B7A383FC75C9}"/>
               </a:ext>
             </a:extLst>
           </p:cNvPr>
@@ -10353,8 +10353,8 @@
         </p:blipFill>
         <p:spPr>
           <a:xfrm>
-            <a:off x="8358909" y="1947381"/>
-            <a:ext cx="3375959" cy="2112184"/>
+            <a:off x="8373603" y="1817743"/>
+            <a:ext cx="3457575" cy="2124075"/>
           </a:xfrm>
           <a:prstGeom prst="rect">
             <a:avLst/>
@@ -11352,36 +11352,6 @@
           </a:p>
         </p:txBody>
       </p:sp>
-      <p:pic>
-        <p:nvPicPr>
-          <p:cNvPr id="4" name="Picture 3" descr="A screenshot of a cell phone&#10;&#10;Description automatically generated">
-            <a:extLst>
-              <a:ext uri="{FF2B5EF4-FFF2-40B4-BE49-F238E27FC236}">
-                <a16:creationId xmlns:a16="http://schemas.microsoft.com/office/drawing/2014/main" id="{BADF1499-C92A-764F-8AF0-FD94472533E0}"/>
-              </a:ext>
-            </a:extLst>
-          </p:cNvPr>
-          <p:cNvPicPr>
-            <a:picLocks noChangeAspect="1"/>
-          </p:cNvPicPr>
-          <p:nvPr/>
-        </p:nvPicPr>
-        <p:blipFill>
-          <a:blip r:embed="rId2"/>
-          <a:stretch>
-            <a:fillRect/>
-          </a:stretch>
-        </p:blipFill>
-        <p:spPr>
-          <a:xfrm>
-            <a:off x="2091170" y="3118282"/>
-            <a:ext cx="8009659" cy="3186163"/>
-          </a:xfrm>
-          <a:prstGeom prst="rect">
-            <a:avLst/>
-          </a:prstGeom>
-        </p:spPr>
-      </p:pic>
     </p:spTree>
     <p:extLst>
       <p:ext uri="{BB962C8B-B14F-4D97-AF65-F5344CB8AC3E}">
@@ -11795,8 +11765,8 @@
           </a:p>
         </p:txBody>
       </p:sp>
-      <mc:AlternateContent xmlns:mc="http://schemas.openxmlformats.org/markup-compatibility/2006" xmlns:a14="http://schemas.microsoft.com/office/drawing/2010/main">
-        <mc:Choice Requires="a14">
+      <mc:AlternateContent xmlns:mc="http://schemas.openxmlformats.org/markup-compatibility/2006">
+        <mc:Choice xmlns:a14="http://schemas.microsoft.com/office/drawing/2010/main" Requires="a14">
           <p:sp>
             <p:nvSpPr>
               <p:cNvPr id="3" name="Content Placeholder 2">
@@ -11821,8 +11791,16 @@
               <a:lstStyle/>
               <a:p>
                 <a:r>
-                  <a:rPr lang="en-FR"/>
-                  <a:t>Let’s start with a well known algorithm to show case the design ideas</a:t>
+                  <a:rPr lang="en-FR" dirty="0"/>
+                  <a:t>Let’s start with a well</a:t>
+                </a:r>
+                <a:r>
+                  <a:rPr lang="en-US" dirty="0"/>
+                  <a:t>-</a:t>
+                </a:r>
+                <a:r>
+                  <a:rPr lang="en-FR" dirty="0"/>
+                  <a:t>known algorithm to show case the design ideas</a:t>
                 </a:r>
               </a:p>
               <a:p>
@@ -11837,7 +11815,7 @@
                   </m:oMath>
                 </a14:m>
                 <a:r>
-                  <a:rPr lang="en-FR"/>
+                  <a:rPr lang="en-FR" dirty="0"/>
                   <a:t> data points </a:t>
                 </a:r>
                 <a14:m>
@@ -11916,11 +11894,11 @@
                     </m:r>
                   </m:oMath>
                 </a14:m>
-                <a:endParaRPr lang="fr-FR" b="0"/>
+                <a:endParaRPr lang="fr-FR" b="0" dirty="0"/>
               </a:p>
               <a:p>
                 <a:r>
-                  <a:rPr lang="en-FR"/>
+                  <a:rPr lang="en-FR" dirty="0"/>
                   <a:t>Parametrized model function </a:t>
                 </a:r>
                 <a14:m>
@@ -11993,24 +11971,122 @@
                     </m:acc>
                   </m:oMath>
                 </a14:m>
-                <a:endParaRPr lang="fr-FR" b="0"/>
+                <a:r>
+                  <a:rPr lang="fr-FR" b="0" dirty="0"/>
+                  <a:t>          </a:t>
+                </a:r>
+                <a:r>
+                  <a:rPr lang="fr-FR" b="0" dirty="0" err="1"/>
+                  <a:t>Logistic</a:t>
+                </a:r>
+                <a:r>
+                  <a:rPr lang="fr-FR" b="0" dirty="0"/>
+                  <a:t> model : </a:t>
+                </a:r>
+                <a14:m>
+                  <m:oMath xmlns:m="http://schemas.openxmlformats.org/officeDocument/2006/math">
+                    <m:sSub>
+                      <m:sSubPr>
+                        <m:ctrlPr>
+                          <a:rPr lang="fr-FR" i="1">
+                            <a:latin typeface="Cambria Math" panose="02040503050406030204" pitchFamily="18" charset="0"/>
+                          </a:rPr>
+                        </m:ctrlPr>
+                      </m:sSubPr>
+                      <m:e>
+                        <m:r>
+                          <a:rPr lang="fr-FR" i="1">
+                            <a:latin typeface="Cambria Math" panose="02040503050406030204" pitchFamily="18" charset="0"/>
+                          </a:rPr>
+                          <m:t>𝑓</m:t>
+                        </m:r>
+                      </m:e>
+                      <m:sub>
+                        <m:r>
+                          <a:rPr lang="fr-FR" i="1">
+                            <a:latin typeface="Cambria Math" panose="02040503050406030204" pitchFamily="18" charset="0"/>
+                          </a:rPr>
+                          <m:t>𝜃</m:t>
+                        </m:r>
+                      </m:sub>
+                    </m:sSub>
+                    <m:d>
+                      <m:dPr>
+                        <m:ctrlPr>
+                          <a:rPr lang="fr-FR" i="1">
+                            <a:latin typeface="Cambria Math" panose="02040503050406030204" pitchFamily="18" charset="0"/>
+                          </a:rPr>
+                        </m:ctrlPr>
+                      </m:dPr>
+                      <m:e>
+                        <m:r>
+                          <a:rPr lang="fr-FR" i="1">
+                            <a:latin typeface="Cambria Math" panose="02040503050406030204" pitchFamily="18" charset="0"/>
+                          </a:rPr>
+                          <m:t>𝑥</m:t>
+                        </m:r>
+                      </m:e>
+                    </m:d>
+                  </m:oMath>
+                </a14:m>
+                <a:r>
+                  <a:rPr lang="fr-FR" b="0" dirty="0"/>
+                  <a:t> := Sigmoid</a:t>
+                </a:r>
+                <a14:m>
+                  <m:oMath xmlns:m="http://schemas.openxmlformats.org/officeDocument/2006/math">
+                    <m:d>
+                      <m:dPr>
+                        <m:ctrlPr>
+                          <a:rPr lang="fr-FR" i="1">
+                            <a:latin typeface="Cambria Math" panose="02040503050406030204" pitchFamily="18" charset="0"/>
+                          </a:rPr>
+                        </m:ctrlPr>
+                      </m:dPr>
+                      <m:e>
+                        <m:r>
+                          <a:rPr lang="fr-FR" i="1">
+                            <a:latin typeface="Cambria Math" panose="02040503050406030204" pitchFamily="18" charset="0"/>
+                          </a:rPr>
+                          <m:t>𝑥</m:t>
+                        </m:r>
+                        <m:r>
+                          <a:rPr lang="en-US" b="0" i="1" smtClean="0">
+                            <a:latin typeface="Cambria Math" panose="02040503050406030204" pitchFamily="18" charset="0"/>
+                          </a:rPr>
+                          <m:t>.</m:t>
+                        </m:r>
+                        <m:r>
+                          <a:rPr lang="el-GR" i="1">
+                            <a:latin typeface="Cambria Math" panose="02040503050406030204" pitchFamily="18" charset="0"/>
+                          </a:rPr>
+                          <m:t>𝜃</m:t>
+                        </m:r>
+                      </m:e>
+                    </m:d>
+                  </m:oMath>
+                </a14:m>
+                <a:r>
+                  <a:rPr lang="fr-FR" b="0" dirty="0"/>
+                  <a:t> </a:t>
+                </a:r>
               </a:p>
               <a:p>
                 <a:r>
-                  <a:rPr lang="en-FR"/>
+                  <a:rPr lang="en-FR" dirty="0"/>
                   <a:t>Loss function </a:t>
                 </a:r>
               </a:p>
               <a:p>
                 <a:pPr lvl="1"/>
                 <a:r>
-                  <a:rPr lang="en-FR"/>
+                  <a:rPr lang="en-FR" dirty="0"/>
                   <a:t>For each data point </a:t>
                 </a:r>
               </a:p>
               <a:p>
                 <a:pPr lvl="1"/>
-                <a:endParaRPr lang="fr-FR" b="0" i="1">
+                <a:endParaRPr lang="fr-FR" b="0" i="1" dirty="0">
                   <a:latin typeface="Cambria Math" panose="02040503050406030204" pitchFamily="18" charset="0"/>
                   <a:ea typeface="Cambria Math" panose="02040503050406030204" pitchFamily="18" charset="0"/>
                 </a:endParaRPr>
@@ -12322,37 +12398,37 @@
                     </m:oMath>
                   </m:oMathPara>
                 </a14:m>
-                <a:endParaRPr lang="fr-FR" b="0"/>
+                <a:endParaRPr lang="fr-FR" b="0" dirty="0"/>
               </a:p>
               <a:p>
                 <a:pPr marL="457200" lvl="1" indent="0">
                   <a:buNone/>
                 </a:pPr>
-                <a:endParaRPr lang="fr-FR" b="0"/>
+                <a:endParaRPr lang="fr-FR" b="0" dirty="0"/>
               </a:p>
               <a:p>
                 <a:pPr lvl="1"/>
                 <a:r>
-                  <a:rPr lang="fr-FR" b="0"/>
+                  <a:rPr lang="fr-FR" b="0" dirty="0"/>
                   <a:t>For the </a:t>
                 </a:r>
                 <a:r>
-                  <a:rPr lang="fr-FR" b="0" err="1"/>
+                  <a:rPr lang="fr-FR" b="0" dirty="0" err="1"/>
                   <a:t>whole</a:t>
                 </a:r>
                 <a:r>
-                  <a:rPr lang="fr-FR" b="0"/>
+                  <a:rPr lang="fr-FR" b="0" dirty="0"/>
                   <a:t> </a:t>
                 </a:r>
                 <a:r>
-                  <a:rPr lang="fr-FR" b="0" err="1"/>
+                  <a:rPr lang="fr-FR" b="0" dirty="0" err="1"/>
                   <a:t>dataset</a:t>
                 </a:r>
                 <a:r>
-                  <a:rPr lang="fr-FR" b="0"/>
+                  <a:rPr lang="fr-FR" b="0" dirty="0"/>
                   <a:t> </a:t>
                 </a:r>
-                <a:endParaRPr lang="fr-FR" b="0" i="1">
+                <a:endParaRPr lang="fr-FR" b="0" i="1" dirty="0">
                   <a:latin typeface="Cambria Math" panose="02040503050406030204" pitchFamily="18" charset="0"/>
                 </a:endParaRPr>
               </a:p>
@@ -12545,14 +12621,14 @@
                     </m:oMath>
                   </m:oMathPara>
                 </a14:m>
-                <a:endParaRPr lang="fr-FR"/>
+                <a:endParaRPr lang="fr-FR" dirty="0"/>
               </a:p>
               <a:p>
                 <a:r>
-                  <a:rPr lang="fr-FR" b="0"/>
+                  <a:rPr lang="fr-FR" b="0" dirty="0"/>
                   <a:t>Objective </a:t>
                 </a:r>
-                <a:endParaRPr lang="fr-FR" b="0" i="1">
+                <a:endParaRPr lang="fr-FR" b="0" i="1" dirty="0">
                   <a:latin typeface="Cambria Math" panose="02040503050406030204" pitchFamily="18" charset="0"/>
                 </a:endParaRPr>
               </a:p>
@@ -12665,7 +12741,7 @@
                     </m:oMath>
                   </m:oMathPara>
                 </a14:m>
-                <a:endParaRPr lang="fr-FR" b="0">
+                <a:endParaRPr lang="fr-FR" b="0" dirty="0">
                   <a:solidFill>
                     <a:schemeClr val="tx1">
                       <a:lumMod val="65000"/>
@@ -12675,12 +12751,12 @@
                 </a:endParaRPr>
               </a:p>
               <a:p>
-                <a:endParaRPr lang="en-FR"/>
+                <a:endParaRPr lang="en-FR" dirty="0"/>
               </a:p>
             </p:txBody>
           </p:sp>
         </mc:Choice>
-        <mc:Fallback xmlns="">
+        <mc:Fallback>
           <p:sp>
             <p:nvSpPr>
               <p:cNvPr id="3" name="Content Placeholder 2">
@@ -12710,7 +12786,7 @@
               <a:lstStyle/>
               <a:p>
                 <a:r>
-                  <a:rPr lang="fr-FR">
+                  <a:rPr lang="en-US">
                     <a:noFill/>
                   </a:rPr>
                   <a:t> </a:t>
@@ -12720,16 +12796,193 @@
           </p:sp>
         </mc:Fallback>
       </mc:AlternateContent>
+      <p:sp>
+        <p:nvSpPr>
+          <p:cNvPr id="4" name="Cloud 3">
+            <a:extLst>
+              <a:ext uri="{FF2B5EF4-FFF2-40B4-BE49-F238E27FC236}">
+                <a16:creationId xmlns:a16="http://schemas.microsoft.com/office/drawing/2014/main" id="{DE7AA65F-3A26-4F1B-A3F2-CC94164E1750}"/>
+              </a:ext>
+            </a:extLst>
+          </p:cNvPr>
+          <p:cNvSpPr/>
+          <p:nvPr/>
+        </p:nvSpPr>
+        <p:spPr>
+          <a:xfrm>
+            <a:off x="8908330" y="3506772"/>
+            <a:ext cx="4289196" cy="829559"/>
+          </a:xfrm>
+          <a:prstGeom prst="cloud">
+            <a:avLst/>
+          </a:prstGeom>
+        </p:spPr>
+        <p:style>
+          <a:lnRef idx="2">
+            <a:schemeClr val="accent1"/>
+          </a:lnRef>
+          <a:fillRef idx="1">
+            <a:schemeClr val="lt1"/>
+          </a:fillRef>
+          <a:effectRef idx="0">
+            <a:schemeClr val="accent1"/>
+          </a:effectRef>
+          <a:fontRef idx="minor">
+            <a:schemeClr val="dk1"/>
+          </a:fontRef>
+        </p:style>
+        <p:txBody>
+          <a:bodyPr rtlCol="0" anchor="ctr"/>
+          <a:lstStyle/>
+          <a:p>
+            <a:pPr algn="ctr"/>
+            <a:r>
+              <a:rPr lang="en-US" sz="1400" dirty="0"/>
+              <a:t>Log </a:t>
+            </a:r>
+            <a:r>
+              <a:rPr lang="en-US" sz="1400" dirty="0" err="1"/>
+              <a:t>Proba</a:t>
+            </a:r>
+            <a:r>
+              <a:rPr lang="en-US" sz="1400" dirty="0"/>
+              <a:t>( Y</a:t>
+            </a:r>
+            <a:r>
+              <a:rPr lang="en-US" sz="1400" baseline="-25000" dirty="0"/>
+              <a:t>i </a:t>
+            </a:r>
+            <a:r>
+              <a:rPr lang="en-US" sz="1400" dirty="0"/>
+              <a:t>= </a:t>
+            </a:r>
+            <a:r>
+              <a:rPr lang="en-US" sz="1400" dirty="0" err="1"/>
+              <a:t>y</a:t>
+            </a:r>
+            <a:r>
+              <a:rPr lang="en-US" sz="1400" baseline="-25000" dirty="0" err="1"/>
+              <a:t>i</a:t>
+            </a:r>
+            <a:r>
+              <a:rPr lang="en-US" sz="1400" baseline="-25000" dirty="0"/>
+              <a:t> </a:t>
+            </a:r>
+            <a:r>
+              <a:rPr lang="en-US" sz="1400" dirty="0"/>
+              <a:t> | model</a:t>
+            </a:r>
+            <a:r>
+              <a:rPr lang="el-GR" sz="1400" dirty="0"/>
+              <a:t> </a:t>
+            </a:r>
+            <a:r>
+              <a:rPr lang="el-GR" sz="1400" baseline="-25000" dirty="0"/>
+              <a:t>θ</a:t>
+            </a:r>
+            <a:r>
+              <a:rPr lang="en-US" sz="1400" dirty="0"/>
+              <a:t>, x</a:t>
+            </a:r>
+            <a:r>
+              <a:rPr lang="en-US" sz="1400" baseline="-25000" dirty="0"/>
+              <a:t>i</a:t>
+            </a:r>
+            <a:r>
+              <a:rPr lang="en-US" sz="1400" dirty="0"/>
+              <a:t> )</a:t>
+            </a:r>
+          </a:p>
+        </p:txBody>
+      </p:sp>
     </p:spTree>
     <p:extLst>
       <p:ext uri="{BB962C8B-B14F-4D97-AF65-F5344CB8AC3E}">
-        <p14:creationId xmlns:p14="http://schemas.microsoft.com/office/powerpoint/2010/main" val="1900057026"/>
+        <p14:creationId xmlns:p14="http://schemas.microsoft.com/office/powerpoint/2010/main" val="1257645731"/>
       </p:ext>
     </p:extLst>
   </p:cSld>
   <p:clrMapOvr>
     <a:masterClrMapping/>
   </p:clrMapOvr>
+  <p:timing>
+    <p:tnLst>
+      <p:par>
+        <p:cTn id="1" dur="indefinite" restart="never" nodeType="tmRoot">
+          <p:childTnLst>
+            <p:seq concurrent="1" nextAc="seek">
+              <p:cTn id="2" dur="indefinite" nodeType="mainSeq">
+                <p:childTnLst>
+                  <p:par>
+                    <p:cTn id="3" fill="hold">
+                      <p:stCondLst>
+                        <p:cond delay="indefinite"/>
+                      </p:stCondLst>
+                      <p:childTnLst>
+                        <p:par>
+                          <p:cTn id="4" fill="hold">
+                            <p:stCondLst>
+                              <p:cond delay="0"/>
+                            </p:stCondLst>
+                            <p:childTnLst>
+                              <p:par>
+                                <p:cTn id="5" presetID="1" presetClass="entr" presetSubtype="0" fill="hold" grpId="0" nodeType="clickEffect">
+                                  <p:stCondLst>
+                                    <p:cond delay="0"/>
+                                  </p:stCondLst>
+                                  <p:childTnLst>
+                                    <p:set>
+                                      <p:cBhvr>
+                                        <p:cTn id="6" dur="1" fill="hold">
+                                          <p:stCondLst>
+                                            <p:cond delay="0"/>
+                                          </p:stCondLst>
+                                        </p:cTn>
+                                        <p:tgtEl>
+                                          <p:spTgt spid="4"/>
+                                        </p:tgtEl>
+                                        <p:attrNameLst>
+                                          <p:attrName>style.visibility</p:attrName>
+                                        </p:attrNameLst>
+                                      </p:cBhvr>
+                                      <p:to>
+                                        <p:strVal val="visible"/>
+                                      </p:to>
+                                    </p:set>
+                                  </p:childTnLst>
+                                </p:cTn>
+                              </p:par>
+                            </p:childTnLst>
+                          </p:cTn>
+                        </p:par>
+                      </p:childTnLst>
+                    </p:cTn>
+                  </p:par>
+                </p:childTnLst>
+              </p:cTn>
+              <p:prevCondLst>
+                <p:cond evt="onPrev" delay="0">
+                  <p:tgtEl>
+                    <p:sldTgt/>
+                  </p:tgtEl>
+                </p:cond>
+              </p:prevCondLst>
+              <p:nextCondLst>
+                <p:cond evt="onNext" delay="0">
+                  <p:tgtEl>
+                    <p:sldTgt/>
+                  </p:tgtEl>
+                </p:cond>
+              </p:nextCondLst>
+            </p:seq>
+          </p:childTnLst>
+        </p:cTn>
+      </p:par>
+    </p:tnLst>
+    <p:bldLst>
+      <p:bldP spid="4" grpId="0" animBg="1"/>
+    </p:bldLst>
+  </p:timing>
 </p:sld>
 </file>
 
@@ -12772,9 +13025,10 @@
           <a:lstStyle/>
           <a:p>
             <a:r>
-              <a:rPr lang="en-FR"/>
-              <a:t>Logistic Regression</a:t>
-            </a:r>
+              <a:rPr lang="en-US" dirty="0"/>
+              <a:t>Gradient and stochastic gradient</a:t>
+            </a:r>
+            <a:endParaRPr lang="en-FR" dirty="0"/>
           </a:p>
         </p:txBody>
       </p:sp>
@@ -12804,41 +13058,41 @@
               <a:lstStyle/>
               <a:p>
                 <a:r>
-                  <a:rPr lang="fr-FR"/>
+                  <a:rPr lang="fr-FR" dirty="0"/>
                   <a:t>Gradient </a:t>
                 </a:r>
                 <a:r>
-                  <a:rPr lang="fr-FR" err="1"/>
+                  <a:rPr lang="fr-FR" dirty="0" err="1"/>
                   <a:t>descent</a:t>
                 </a:r>
-                <a:endParaRPr lang="fr-FR"/>
+                <a:endParaRPr lang="fr-FR" dirty="0"/>
               </a:p>
               <a:p>
                 <a:pPr lvl="1"/>
                 <a:r>
-                  <a:rPr lang="fr-FR" b="0" err="1"/>
+                  <a:rPr lang="fr-FR" b="0" dirty="0" err="1"/>
                   <a:t>Repea</a:t>
                 </a:r>
                 <a:r>
-                  <a:rPr lang="fr-FR" err="1"/>
+                  <a:rPr lang="fr-FR" dirty="0" err="1"/>
                   <a:t>t</a:t>
                 </a:r>
                 <a:r>
-                  <a:rPr lang="fr-FR"/>
+                  <a:rPr lang="fr-FR" dirty="0"/>
                   <a:t> </a:t>
                 </a:r>
                 <a:r>
-                  <a:rPr lang="fr-FR" err="1"/>
+                  <a:rPr lang="fr-FR" dirty="0" err="1"/>
                   <a:t>until</a:t>
                 </a:r>
                 <a:r>
-                  <a:rPr lang="fr-FR"/>
+                  <a:rPr lang="fr-FR" dirty="0"/>
                   <a:t> convergence</a:t>
                 </a:r>
               </a:p>
               <a:p>
                 <a:pPr lvl="1"/>
-                <a:endParaRPr lang="fr-FR"/>
+                <a:endParaRPr lang="fr-FR" dirty="0"/>
               </a:p>
               <a:p>
                 <a:pPr marL="914400" lvl="2" indent="0">
@@ -12990,7 +13244,7 @@
                     </m:oMath>
                   </m:oMathPara>
                 </a14:m>
-                <a:endParaRPr lang="fr-FR">
+                <a:endParaRPr lang="fr-FR" dirty="0">
                   <a:ea typeface="Cambria Math" panose="02040503050406030204" pitchFamily="18" charset="0"/>
                 </a:endParaRPr>
               </a:p>
@@ -12998,72 +13252,72 @@
                 <a:pPr marL="914400" lvl="2" indent="0">
                   <a:buNone/>
                 </a:pPr>
-                <a:endParaRPr lang="fr-FR">
+                <a:endParaRPr lang="fr-FR" dirty="0">
                   <a:ea typeface="Cambria Math" panose="02040503050406030204" pitchFamily="18" charset="0"/>
                 </a:endParaRPr>
               </a:p>
               <a:p>
                 <a:r>
-                  <a:rPr lang="fr-FR" b="0" err="1">
+                  <a:rPr lang="fr-FR" b="0" dirty="0" err="1">
                     <a:ea typeface="Cambria Math" panose="02040503050406030204" pitchFamily="18" charset="0"/>
                   </a:rPr>
                   <a:t>Stochastic</a:t>
                 </a:r>
                 <a:r>
-                  <a:rPr lang="fr-FR" b="0">
+                  <a:rPr lang="fr-FR" b="0" dirty="0">
                     <a:ea typeface="Cambria Math" panose="02040503050406030204" pitchFamily="18" charset="0"/>
                   </a:rPr>
                   <a:t> gradient </a:t>
                 </a:r>
                 <a:r>
-                  <a:rPr lang="fr-FR" b="0" err="1">
+                  <a:rPr lang="fr-FR" b="0" dirty="0" err="1">
                     <a:ea typeface="Cambria Math" panose="02040503050406030204" pitchFamily="18" charset="0"/>
                   </a:rPr>
                   <a:t>descent</a:t>
                 </a:r>
-                <a:endParaRPr lang="fr-FR" b="0">
+                <a:endParaRPr lang="fr-FR" b="0" dirty="0">
                   <a:ea typeface="Cambria Math" panose="02040503050406030204" pitchFamily="18" charset="0"/>
                 </a:endParaRPr>
               </a:p>
               <a:p>
                 <a:pPr lvl="1"/>
                 <a:r>
-                  <a:rPr lang="fr-FR" b="0" err="1"/>
+                  <a:rPr lang="fr-FR" b="0" dirty="0" err="1"/>
                   <a:t>Repea</a:t>
                 </a:r>
                 <a:r>
-                  <a:rPr lang="fr-FR" err="1"/>
+                  <a:rPr lang="fr-FR" dirty="0" err="1"/>
                   <a:t>t</a:t>
                 </a:r>
                 <a:r>
-                  <a:rPr lang="fr-FR"/>
+                  <a:rPr lang="fr-FR" dirty="0"/>
                   <a:t> </a:t>
                 </a:r>
                 <a:r>
-                  <a:rPr lang="fr-FR" err="1"/>
+                  <a:rPr lang="fr-FR" dirty="0" err="1"/>
                   <a:t>until</a:t>
                 </a:r>
                 <a:r>
-                  <a:rPr lang="fr-FR"/>
+                  <a:rPr lang="fr-FR" dirty="0"/>
                   <a:t> convergence</a:t>
                 </a:r>
               </a:p>
               <a:p>
                 <a:pPr lvl="2"/>
                 <a:r>
-                  <a:rPr lang="fr-FR" b="0" err="1"/>
+                  <a:rPr lang="fr-FR" b="0" dirty="0" err="1"/>
                   <a:t>Sample</a:t>
                 </a:r>
                 <a:r>
-                  <a:rPr lang="fr-FR" b="0"/>
+                  <a:rPr lang="fr-FR" b="0" dirty="0"/>
                   <a:t> </a:t>
                 </a:r>
                 <a:r>
-                  <a:rPr lang="fr-FR" b="0" err="1"/>
+                  <a:rPr lang="fr-FR" b="0" dirty="0" err="1"/>
                   <a:t>random</a:t>
                 </a:r>
                 <a:r>
-                  <a:rPr lang="fr-FR" b="0"/>
+                  <a:rPr lang="fr-FR" b="0" dirty="0"/>
                   <a:t> </a:t>
                 </a:r>
                 <a14:m>
@@ -13077,15 +13331,15 @@
                   </m:oMath>
                 </a14:m>
                 <a:r>
-                  <a:rPr lang="fr-FR" b="0"/>
+                  <a:rPr lang="fr-FR" b="0" dirty="0"/>
                   <a:t> </a:t>
                 </a:r>
                 <a:r>
-                  <a:rPr lang="fr-FR" b="0" err="1"/>
+                  <a:rPr lang="fr-FR" b="0" dirty="0" err="1"/>
                   <a:t>from</a:t>
                 </a:r>
                 <a:r>
-                  <a:rPr lang="fr-FR" b="0"/>
+                  <a:rPr lang="fr-FR" b="0" dirty="0"/>
                   <a:t> </a:t>
                 </a:r>
                 <a14:m>
@@ -13110,11 +13364,11 @@
                     </m:r>
                   </m:oMath>
                 </a14:m>
-                <a:endParaRPr lang="fr-FR" b="0"/>
+                <a:endParaRPr lang="fr-FR" b="0" dirty="0"/>
               </a:p>
               <a:p>
                 <a:pPr lvl="2"/>
-                <a:endParaRPr lang="fr-FR" b="0"/>
+                <a:endParaRPr lang="fr-FR" b="0" dirty="0"/>
               </a:p>
               <a:p>
                 <a:pPr marL="914400" lvl="2" indent="0">
@@ -13363,7 +13617,7 @@
                     </m:oMath>
                   </m:oMathPara>
                 </a14:m>
-                <a:endParaRPr lang="fr-FR" b="0"/>
+                <a:endParaRPr lang="fr-FR" b="0" dirty="0"/>
               </a:p>
             </p:txBody>
           </p:sp>
@@ -13460,9 +13714,10 @@
           <a:lstStyle/>
           <a:p>
             <a:r>
-              <a:rPr lang="en-FR"/>
-              <a:t>Logistic Regression</a:t>
-            </a:r>
+              <a:rPr lang="en-US" dirty="0"/>
+              <a:t>Gradient and stochastic gradient</a:t>
+            </a:r>
+            <a:endParaRPr lang="en-FR" dirty="0"/>
           </a:p>
         </p:txBody>
       </p:sp>
@@ -13492,54 +13747,54 @@
               <a:lstStyle/>
               <a:p>
                 <a:r>
-                  <a:rPr lang="fr-FR"/>
+                  <a:rPr lang="fr-FR" dirty="0"/>
                   <a:t>Mini-batch </a:t>
                 </a:r>
                 <a:r>
-                  <a:rPr lang="fr-FR" err="1"/>
+                  <a:rPr lang="fr-FR" dirty="0" err="1"/>
                   <a:t>stochastic</a:t>
                 </a:r>
                 <a:r>
-                  <a:rPr lang="fr-FR"/>
+                  <a:rPr lang="fr-FR" dirty="0"/>
                   <a:t> gradient </a:t>
                 </a:r>
                 <a:r>
-                  <a:rPr lang="fr-FR" err="1"/>
+                  <a:rPr lang="fr-FR" dirty="0" err="1"/>
                   <a:t>descent</a:t>
                 </a:r>
-                <a:endParaRPr lang="fr-FR"/>
+                <a:endParaRPr lang="fr-FR" dirty="0"/>
               </a:p>
               <a:p>
                 <a:pPr lvl="1"/>
                 <a:r>
-                  <a:rPr lang="fr-FR" b="0" err="1"/>
+                  <a:rPr lang="fr-FR" b="0" dirty="0" err="1"/>
                   <a:t>Repea</a:t>
                 </a:r>
                 <a:r>
-                  <a:rPr lang="fr-FR" err="1"/>
+                  <a:rPr lang="fr-FR" dirty="0" err="1"/>
                   <a:t>t</a:t>
                 </a:r>
                 <a:r>
-                  <a:rPr lang="fr-FR"/>
+                  <a:rPr lang="fr-FR" dirty="0"/>
                   <a:t> </a:t>
                 </a:r>
                 <a:r>
-                  <a:rPr lang="fr-FR" err="1"/>
+                  <a:rPr lang="fr-FR" dirty="0" err="1"/>
                   <a:t>until</a:t>
                 </a:r>
                 <a:r>
-                  <a:rPr lang="fr-FR"/>
+                  <a:rPr lang="fr-FR" dirty="0"/>
                   <a:t> convergence</a:t>
                 </a:r>
               </a:p>
               <a:p>
                 <a:pPr lvl="2"/>
                 <a:r>
-                  <a:rPr lang="fr-FR" b="0" err="1"/>
+                  <a:rPr lang="fr-FR" b="0" dirty="0" err="1"/>
                   <a:t>Sample</a:t>
                 </a:r>
                 <a:r>
-                  <a:rPr lang="fr-FR" b="0"/>
+                  <a:rPr lang="fr-FR" b="0" dirty="0"/>
                   <a:t> a batch of data of size </a:t>
                 </a:r>
                 <a14:m>
@@ -13552,11 +13807,11 @@
                     </m:r>
                   </m:oMath>
                 </a14:m>
-                <a:endParaRPr lang="fr-FR" b="0"/>
+                <a:endParaRPr lang="fr-FR" b="0" dirty="0"/>
               </a:p>
               <a:p>
                 <a:pPr lvl="2"/>
-                <a:endParaRPr lang="fr-FR" b="0"/>
+                <a:endParaRPr lang="fr-FR" b="0" dirty="0"/>
               </a:p>
               <a:p>
                 <a:pPr marL="914400" lvl="2" indent="0">
@@ -13767,13 +14022,13 @@
                     </m:oMath>
                   </m:oMathPara>
                 </a14:m>
-                <a:endParaRPr lang="fr-FR" b="0"/>
+                <a:endParaRPr lang="fr-FR" b="0" dirty="0"/>
               </a:p>
               <a:p>
                 <a:pPr marL="914400" lvl="2" indent="0">
                   <a:buNone/>
                 </a:pPr>
-                <a:endParaRPr lang="fr-FR" b="0"/>
+                <a:endParaRPr lang="fr-FR" b="0" dirty="0"/>
               </a:p>
               <a:p>
                 <a:pPr marL="914400" lvl="2" indent="0">
@@ -13967,46 +14222,46 @@
                     </m:oMath>
                   </m:oMathPara>
                 </a14:m>
-                <a:endParaRPr lang="fr-FR" b="0"/>
+                <a:endParaRPr lang="fr-FR" b="0" dirty="0"/>
               </a:p>
               <a:p>
                 <a:pPr marL="914400" lvl="2" indent="0">
                   <a:buNone/>
                 </a:pPr>
-                <a:endParaRPr lang="fr-FR" b="0"/>
+                <a:endParaRPr lang="fr-FR" b="0" dirty="0"/>
               </a:p>
               <a:p>
                 <a:pPr lvl="2"/>
-                <a:endParaRPr lang="fr-FR"/>
+                <a:endParaRPr lang="fr-FR" dirty="0"/>
               </a:p>
               <a:p>
                 <a:r>
-                  <a:rPr lang="fr-FR" b="0" err="1"/>
+                  <a:rPr lang="fr-FR" b="0" dirty="0" err="1"/>
                   <a:t>Stochastic</a:t>
                 </a:r>
                 <a:r>
-                  <a:rPr lang="fr-FR" b="0"/>
+                  <a:rPr lang="fr-FR" b="0" dirty="0"/>
                   <a:t> and mini-batch gradient </a:t>
                 </a:r>
                 <a:r>
-                  <a:rPr lang="fr-FR" b="0" err="1"/>
+                  <a:rPr lang="fr-FR" b="0" dirty="0" err="1"/>
                   <a:t>descent</a:t>
                 </a:r>
                 <a:r>
-                  <a:rPr lang="fr-FR" b="0"/>
+                  <a:rPr lang="fr-FR" b="0" dirty="0"/>
                   <a:t> </a:t>
                 </a:r>
                 <a:r>
-                  <a:rPr lang="fr-FR" b="0" err="1"/>
+                  <a:rPr lang="fr-FR" b="0" dirty="0" err="1"/>
                   <a:t>rely</a:t>
                 </a:r>
                 <a:r>
-                  <a:rPr lang="fr-FR" b="0"/>
+                  <a:rPr lang="fr-FR" b="0" dirty="0"/>
                   <a:t> on</a:t>
                 </a:r>
               </a:p>
               <a:p>
-                <a:endParaRPr lang="fr-FR" b="0"/>
+                <a:endParaRPr lang="fr-FR" b="0" dirty="0"/>
               </a:p>
               <a:p>
                 <a:pPr marL="0" indent="0">
@@ -14531,7 +14786,7 @@
                     </m:oMath>
                   </m:oMathPara>
                 </a14:m>
-                <a:endParaRPr lang="fr-FR" b="0" i="1">
+                <a:endParaRPr lang="fr-FR" b="0" i="1" dirty="0">
                   <a:solidFill>
                     <a:schemeClr val="tx1">
                       <a:lumMod val="65000"/>
@@ -14543,7 +14798,7 @@
                 </a:endParaRPr>
               </a:p>
               <a:p>
-                <a:endParaRPr lang="en-FR"/>
+                <a:endParaRPr lang="en-FR" dirty="0"/>
               </a:p>
             </p:txBody>
           </p:sp>
@@ -15375,12 +15630,6 @@
 </file>
 
 <file path=customXml/item1.xml><?xml version="1.0" encoding="utf-8"?>
-<p:properties xmlns:p="http://schemas.microsoft.com/office/2006/metadata/properties" xmlns:xsi="http://www.w3.org/2001/XMLSchema-instance" xmlns:pc="http://schemas.microsoft.com/office/infopath/2007/PartnerControls">
-  <documentManagement/>
-</p:properties>
-</file>
-
-<file path=customXml/item2.xml><?xml version="1.0" encoding="utf-8"?>
 <ct:contentTypeSchema xmlns:ct="http://schemas.microsoft.com/office/2006/metadata/contentType" xmlns:ma="http://schemas.microsoft.com/office/2006/metadata/properties/metaAttributes" ct:_="" ma:_="" ma:contentTypeName="Document" ma:contentTypeID="0x010100839BB5A41606934E9661239A78136CF2" ma:contentTypeVersion="8" ma:contentTypeDescription="Crée un document." ma:contentTypeScope="" ma:versionID="b9be824822c9f52af16b1c2b820dd085">
   <xsd:schema xmlns:xsd="http://www.w3.org/2001/XMLSchema" xmlns:xs="http://www.w3.org/2001/XMLSchema" xmlns:p="http://schemas.microsoft.com/office/2006/metadata/properties" xmlns:ns3="742617a4-d98d-4e68-a93e-4ff7524f8ebd" targetNamespace="http://schemas.microsoft.com/office/2006/metadata/properties" ma:root="true" ma:fieldsID="4209314a5a8f37f020f0cd743c90aed9" ns3:_="">
     <xsd:import namespace="742617a4-d98d-4e68-a93e-4ff7524f8ebd"/>
@@ -15550,6 +15799,12 @@
 </ct:contentTypeSchema>
 </file>
 
+<file path=customXml/item2.xml><?xml version="1.0" encoding="utf-8"?>
+<p:properties xmlns:p="http://schemas.microsoft.com/office/2006/metadata/properties" xmlns:xsi="http://www.w3.org/2001/XMLSchema-instance" xmlns:pc="http://schemas.microsoft.com/office/infopath/2007/PartnerControls">
+  <documentManagement/>
+</p:properties>
+</file>
+
 <file path=customXml/item3.xml><?xml version="1.0" encoding="utf-8"?>
 <?mso-contentType ?>
 <FormTemplates xmlns="http://schemas.microsoft.com/sharepoint/v3/contenttype/forms">
@@ -15560,15 +15815,6 @@
 </file>
 
 <file path=customXml/itemProps1.xml><?xml version="1.0" encoding="utf-8"?>
-<ds:datastoreItem xmlns:ds="http://schemas.openxmlformats.org/officeDocument/2006/customXml" ds:itemID="{5913C20A-333A-4CDF-AB37-2CCECA07EE0D}">
-  <ds:schemaRefs>
-    <ds:schemaRef ds:uri="http://schemas.microsoft.com/office/2006/metadata/properties"/>
-    <ds:schemaRef ds:uri="http://schemas.microsoft.com/office/infopath/2007/PartnerControls"/>
-  </ds:schemaRefs>
-</ds:datastoreItem>
-</file>
-
-<file path=customXml/itemProps2.xml><?xml version="1.0" encoding="utf-8"?>
 <ds:datastoreItem xmlns:ds="http://schemas.openxmlformats.org/officeDocument/2006/customXml" ds:itemID="{228DB318-E8FC-420E-961E-17A6D6EAD589}">
   <ds:schemaRefs>
     <ds:schemaRef ds:uri="http://schemas.microsoft.com/office/2006/metadata/contentType"/>
@@ -15586,6 +15832,15 @@
 </ds:datastoreItem>
 </file>
 
+<file path=customXml/itemProps2.xml><?xml version="1.0" encoding="utf-8"?>
+<ds:datastoreItem xmlns:ds="http://schemas.openxmlformats.org/officeDocument/2006/customXml" ds:itemID="{5913C20A-333A-4CDF-AB37-2CCECA07EE0D}">
+  <ds:schemaRefs>
+    <ds:schemaRef ds:uri="http://schemas.microsoft.com/office/2006/metadata/properties"/>
+    <ds:schemaRef ds:uri="http://schemas.microsoft.com/office/infopath/2007/PartnerControls"/>
+  </ds:schemaRefs>
+</ds:datastoreItem>
+</file>
+
 <file path=customXml/itemProps3.xml><?xml version="1.0" encoding="utf-8"?>
 <ds:datastoreItem xmlns:ds="http://schemas.openxmlformats.org/officeDocument/2006/customXml" ds:itemID="{05D500D6-2D45-4FCD-AEAF-910B885A5958}">
   <ds:schemaRefs>

</xml_diff>

<commit_message>
[Module 3] Update Slides and TDs for sessions 3 and 4
</commit_message>
<xml_diff>
--- a/module3/session3/class2-part1-logistic-regression.pptx
+++ b/module3/session3/class2-part1-logistic-regression.pptx
@@ -5,38 +5,39 @@
     <p:sldMasterId id="2147483648" r:id="rId4"/>
   </p:sldMasterIdLst>
   <p:notesMasterIdLst>
-    <p:notesMasterId r:id="rId34"/>
+    <p:notesMasterId r:id="rId35"/>
   </p:notesMasterIdLst>
   <p:sldIdLst>
     <p:sldId id="256" r:id="rId5"/>
     <p:sldId id="257" r:id="rId6"/>
     <p:sldId id="308" r:id="rId7"/>
     <p:sldId id="298" r:id="rId8"/>
-    <p:sldId id="258" r:id="rId9"/>
-    <p:sldId id="309" r:id="rId10"/>
-    <p:sldId id="260" r:id="rId11"/>
-    <p:sldId id="275" r:id="rId12"/>
-    <p:sldId id="261" r:id="rId13"/>
-    <p:sldId id="299" r:id="rId14"/>
-    <p:sldId id="262" r:id="rId15"/>
-    <p:sldId id="300" r:id="rId16"/>
-    <p:sldId id="265" r:id="rId17"/>
-    <p:sldId id="264" r:id="rId18"/>
-    <p:sldId id="266" r:id="rId19"/>
-    <p:sldId id="267" r:id="rId20"/>
-    <p:sldId id="263" r:id="rId21"/>
-    <p:sldId id="268" r:id="rId22"/>
-    <p:sldId id="269" r:id="rId23"/>
-    <p:sldId id="270" r:id="rId24"/>
-    <p:sldId id="271" r:id="rId25"/>
-    <p:sldId id="272" r:id="rId26"/>
-    <p:sldId id="273" r:id="rId27"/>
-    <p:sldId id="274" r:id="rId28"/>
-    <p:sldId id="276" r:id="rId29"/>
-    <p:sldId id="277" r:id="rId30"/>
-    <p:sldId id="304" r:id="rId31"/>
-    <p:sldId id="305" r:id="rId32"/>
-    <p:sldId id="303" r:id="rId33"/>
+    <p:sldId id="310" r:id="rId9"/>
+    <p:sldId id="258" r:id="rId10"/>
+    <p:sldId id="309" r:id="rId11"/>
+    <p:sldId id="260" r:id="rId12"/>
+    <p:sldId id="275" r:id="rId13"/>
+    <p:sldId id="261" r:id="rId14"/>
+    <p:sldId id="299" r:id="rId15"/>
+    <p:sldId id="262" r:id="rId16"/>
+    <p:sldId id="300" r:id="rId17"/>
+    <p:sldId id="265" r:id="rId18"/>
+    <p:sldId id="264" r:id="rId19"/>
+    <p:sldId id="266" r:id="rId20"/>
+    <p:sldId id="267" r:id="rId21"/>
+    <p:sldId id="263" r:id="rId22"/>
+    <p:sldId id="268" r:id="rId23"/>
+    <p:sldId id="269" r:id="rId24"/>
+    <p:sldId id="270" r:id="rId25"/>
+    <p:sldId id="271" r:id="rId26"/>
+    <p:sldId id="272" r:id="rId27"/>
+    <p:sldId id="273" r:id="rId28"/>
+    <p:sldId id="274" r:id="rId29"/>
+    <p:sldId id="276" r:id="rId30"/>
+    <p:sldId id="277" r:id="rId31"/>
+    <p:sldId id="304" r:id="rId32"/>
+    <p:sldId id="305" r:id="rId33"/>
+    <p:sldId id="303" r:id="rId34"/>
   </p:sldIdLst>
   <p:sldSz cx="12192000" cy="6858000"/>
   <p:notesSz cx="6858000" cy="9144000"/>
@@ -144,6 +145,7 @@
             <p14:sldId id="257"/>
             <p14:sldId id="308"/>
             <p14:sldId id="298"/>
+            <p14:sldId id="310"/>
             <p14:sldId id="258"/>
             <p14:sldId id="309"/>
             <p14:sldId id="260"/>
@@ -271,7 +273,7 @@
           <a:p>
             <a:fld id="{89922305-5C9A-4A9B-A26D-CD3EAF4204D1}" type="datetimeFigureOut">
               <a:rPr lang="fr-FR" smtClean="0"/>
-              <a:t>31/03/2022</a:t>
+              <a:t>05/04/2023</a:t>
             </a:fld>
             <a:endParaRPr lang="fr-FR"/>
           </a:p>
@@ -429,7 +431,7 @@
           <a:p>
             <a:fld id="{1987A764-C96C-4333-B9FE-62CC313D1562}" type="slidenum">
               <a:rPr lang="fr-FR" smtClean="0"/>
-              <a:t>‹#›</a:t>
+              <a:t>‹N°›</a:t>
             </a:fld>
             <a:endParaRPr lang="fr-FR"/>
           </a:p>
@@ -638,7 +640,7 @@
           <a:p>
             <a:fld id="{1987A764-C96C-4333-B9FE-62CC313D1562}" type="slidenum">
               <a:rPr lang="fr-FR" smtClean="0"/>
-              <a:t>12</a:t>
+              <a:t>13</a:t>
             </a:fld>
             <a:endParaRPr lang="fr-FR"/>
           </a:p>
@@ -812,7 +814,7 @@
           <a:p>
             <a:fld id="{C6DF3C84-C6DC-034B-A182-D1BEEAB8C825}" type="datetimeFigureOut">
               <a:rPr lang="en-FR" smtClean="0"/>
-              <a:t>03/31/2022</a:t>
+              <a:t>04/05/2023</a:t>
             </a:fld>
             <a:endParaRPr lang="en-FR"/>
           </a:p>
@@ -866,7 +868,7 @@
           <a:p>
             <a:fld id="{CA13C0C9-676E-2540-ABA0-E69B15A5A19E}" type="slidenum">
               <a:rPr lang="en-FR" smtClean="0"/>
-              <a:t>‹#›</a:t>
+              <a:t>‹N°›</a:t>
             </a:fld>
             <a:endParaRPr lang="en-FR"/>
           </a:p>
@@ -1012,7 +1014,7 @@
           <a:p>
             <a:fld id="{C6DF3C84-C6DC-034B-A182-D1BEEAB8C825}" type="datetimeFigureOut">
               <a:rPr lang="en-FR" smtClean="0"/>
-              <a:t>03/31/2022</a:t>
+              <a:t>04/05/2023</a:t>
             </a:fld>
             <a:endParaRPr lang="en-FR"/>
           </a:p>
@@ -1066,7 +1068,7 @@
           <a:p>
             <a:fld id="{CA13C0C9-676E-2540-ABA0-E69B15A5A19E}" type="slidenum">
               <a:rPr lang="en-FR" smtClean="0"/>
-              <a:t>‹#›</a:t>
+              <a:t>‹N°›</a:t>
             </a:fld>
             <a:endParaRPr lang="en-FR"/>
           </a:p>
@@ -1222,7 +1224,7 @@
           <a:p>
             <a:fld id="{C6DF3C84-C6DC-034B-A182-D1BEEAB8C825}" type="datetimeFigureOut">
               <a:rPr lang="en-FR" smtClean="0"/>
-              <a:t>03/31/2022</a:t>
+              <a:t>04/05/2023</a:t>
             </a:fld>
             <a:endParaRPr lang="en-FR"/>
           </a:p>
@@ -1276,7 +1278,7 @@
           <a:p>
             <a:fld id="{CA13C0C9-676E-2540-ABA0-E69B15A5A19E}" type="slidenum">
               <a:rPr lang="en-FR" smtClean="0"/>
-              <a:t>‹#›</a:t>
+              <a:t>‹N°›</a:t>
             </a:fld>
             <a:endParaRPr lang="en-FR"/>
           </a:p>
@@ -1494,7 +1496,7 @@
           <a:p>
             <a:fld id="{C6DF3C84-C6DC-034B-A182-D1BEEAB8C825}" type="datetimeFigureOut">
               <a:rPr lang="en-FR" smtClean="0"/>
-              <a:t>03/31/2022</a:t>
+              <a:t>04/05/2023</a:t>
             </a:fld>
             <a:endParaRPr lang="en-FR"/>
           </a:p>
@@ -1548,7 +1550,7 @@
           <a:p>
             <a:fld id="{CA13C0C9-676E-2540-ABA0-E69B15A5A19E}" type="slidenum">
               <a:rPr lang="en-FR" smtClean="0"/>
-              <a:t>‹#›</a:t>
+              <a:t>‹N°›</a:t>
             </a:fld>
             <a:endParaRPr lang="en-FR"/>
           </a:p>
@@ -1770,7 +1772,7 @@
           <a:p>
             <a:fld id="{C6DF3C84-C6DC-034B-A182-D1BEEAB8C825}" type="datetimeFigureOut">
               <a:rPr lang="en-FR" smtClean="0"/>
-              <a:t>03/31/2022</a:t>
+              <a:t>04/05/2023</a:t>
             </a:fld>
             <a:endParaRPr lang="en-FR"/>
           </a:p>
@@ -1824,7 +1826,7 @@
           <a:p>
             <a:fld id="{CA13C0C9-676E-2540-ABA0-E69B15A5A19E}" type="slidenum">
               <a:rPr lang="en-FR" smtClean="0"/>
-              <a:t>‹#›</a:t>
+              <a:t>‹N°›</a:t>
             </a:fld>
             <a:endParaRPr lang="en-FR"/>
           </a:p>
@@ -2038,7 +2040,7 @@
           <a:p>
             <a:fld id="{C6DF3C84-C6DC-034B-A182-D1BEEAB8C825}" type="datetimeFigureOut">
               <a:rPr lang="en-FR" smtClean="0"/>
-              <a:t>03/31/2022</a:t>
+              <a:t>04/05/2023</a:t>
             </a:fld>
             <a:endParaRPr lang="en-FR"/>
           </a:p>
@@ -2092,7 +2094,7 @@
           <a:p>
             <a:fld id="{CA13C0C9-676E-2540-ABA0-E69B15A5A19E}" type="slidenum">
               <a:rPr lang="en-FR" smtClean="0"/>
-              <a:t>‹#›</a:t>
+              <a:t>‹N°›</a:t>
             </a:fld>
             <a:endParaRPr lang="en-FR"/>
           </a:p>
@@ -2453,7 +2455,7 @@
           <a:p>
             <a:fld id="{C6DF3C84-C6DC-034B-A182-D1BEEAB8C825}" type="datetimeFigureOut">
               <a:rPr lang="en-FR" smtClean="0"/>
-              <a:t>03/31/2022</a:t>
+              <a:t>04/05/2023</a:t>
             </a:fld>
             <a:endParaRPr lang="en-FR"/>
           </a:p>
@@ -2507,7 +2509,7 @@
           <a:p>
             <a:fld id="{CA13C0C9-676E-2540-ABA0-E69B15A5A19E}" type="slidenum">
               <a:rPr lang="en-FR" smtClean="0"/>
-              <a:t>‹#›</a:t>
+              <a:t>‹N°›</a:t>
             </a:fld>
             <a:endParaRPr lang="en-FR"/>
           </a:p>
@@ -2595,7 +2597,7 @@
           <a:p>
             <a:fld id="{C6DF3C84-C6DC-034B-A182-D1BEEAB8C825}" type="datetimeFigureOut">
               <a:rPr lang="en-FR" smtClean="0"/>
-              <a:t>03/31/2022</a:t>
+              <a:t>04/05/2023</a:t>
             </a:fld>
             <a:endParaRPr lang="en-FR"/>
           </a:p>
@@ -2649,7 +2651,7 @@
           <a:p>
             <a:fld id="{CA13C0C9-676E-2540-ABA0-E69B15A5A19E}" type="slidenum">
               <a:rPr lang="en-FR" smtClean="0"/>
-              <a:t>‹#›</a:t>
+              <a:t>‹N°›</a:t>
             </a:fld>
             <a:endParaRPr lang="en-FR"/>
           </a:p>
@@ -2708,7 +2710,7 @@
           <a:p>
             <a:fld id="{C6DF3C84-C6DC-034B-A182-D1BEEAB8C825}" type="datetimeFigureOut">
               <a:rPr lang="en-FR" smtClean="0"/>
-              <a:t>03/31/2022</a:t>
+              <a:t>04/05/2023</a:t>
             </a:fld>
             <a:endParaRPr lang="en-FR"/>
           </a:p>
@@ -2762,7 +2764,7 @@
           <a:p>
             <a:fld id="{CA13C0C9-676E-2540-ABA0-E69B15A5A19E}" type="slidenum">
               <a:rPr lang="en-FR" smtClean="0"/>
-              <a:t>‹#›</a:t>
+              <a:t>‹N°›</a:t>
             </a:fld>
             <a:endParaRPr lang="en-FR"/>
           </a:p>
@@ -3021,7 +3023,7 @@
           <a:p>
             <a:fld id="{C6DF3C84-C6DC-034B-A182-D1BEEAB8C825}" type="datetimeFigureOut">
               <a:rPr lang="en-FR" smtClean="0"/>
-              <a:t>03/31/2022</a:t>
+              <a:t>04/05/2023</a:t>
             </a:fld>
             <a:endParaRPr lang="en-FR"/>
           </a:p>
@@ -3075,7 +3077,7 @@
           <a:p>
             <a:fld id="{CA13C0C9-676E-2540-ABA0-E69B15A5A19E}" type="slidenum">
               <a:rPr lang="en-FR" smtClean="0"/>
-              <a:t>‹#›</a:t>
+              <a:t>‹N°›</a:t>
             </a:fld>
             <a:endParaRPr lang="en-FR"/>
           </a:p>
@@ -3310,7 +3312,7 @@
           <a:p>
             <a:fld id="{C6DF3C84-C6DC-034B-A182-D1BEEAB8C825}" type="datetimeFigureOut">
               <a:rPr lang="en-FR" smtClean="0"/>
-              <a:t>03/31/2022</a:t>
+              <a:t>04/05/2023</a:t>
             </a:fld>
             <a:endParaRPr lang="en-FR"/>
           </a:p>
@@ -3364,7 +3366,7 @@
           <a:p>
             <a:fld id="{CA13C0C9-676E-2540-ABA0-E69B15A5A19E}" type="slidenum">
               <a:rPr lang="en-FR" smtClean="0"/>
-              <a:t>‹#›</a:t>
+              <a:t>‹N°›</a:t>
             </a:fld>
             <a:endParaRPr lang="en-FR"/>
           </a:p>
@@ -3553,7 +3555,7 @@
           <a:p>
             <a:fld id="{C6DF3C84-C6DC-034B-A182-D1BEEAB8C825}" type="datetimeFigureOut">
               <a:rPr lang="en-FR" smtClean="0"/>
-              <a:t>03/31/2022</a:t>
+              <a:t>04/05/2023</a:t>
             </a:fld>
             <a:endParaRPr lang="en-FR"/>
           </a:p>
@@ -3643,7 +3645,7 @@
           <a:p>
             <a:fld id="{CA13C0C9-676E-2540-ABA0-E69B15A5A19E}" type="slidenum">
               <a:rPr lang="en-FR" smtClean="0"/>
-              <a:t>‹#›</a:t>
+              <a:t>‹N°›</a:t>
             </a:fld>
             <a:endParaRPr lang="en-FR"/>
           </a:p>
@@ -4096,6 +4098,189 @@
           </a:p>
         </p:txBody>
       </p:sp>
+      <mc:AlternateContent xmlns:mc="http://schemas.openxmlformats.org/markup-compatibility/2006" xmlns:a14="http://schemas.microsoft.com/office/drawing/2010/main">
+        <mc:Choice Requires="a14">
+          <p:sp>
+            <p:nvSpPr>
+              <p:cNvPr id="5" name="Content Placeholder 4">
+                <a:extLst>
+                  <a:ext uri="{FF2B5EF4-FFF2-40B4-BE49-F238E27FC236}">
+                    <a16:creationId xmlns:a16="http://schemas.microsoft.com/office/drawing/2014/main" id="{D9F4F0FC-9B82-3D40-98B3-B4D29F6B3DD7}"/>
+                  </a:ext>
+                </a:extLst>
+              </p:cNvPr>
+              <p:cNvSpPr>
+                <a:spLocks noGrp="1"/>
+              </p:cNvSpPr>
+              <p:nvPr>
+                <p:ph idx="1"/>
+              </p:nvPr>
+            </p:nvSpPr>
+            <p:spPr/>
+            <p:txBody>
+              <a:bodyPr/>
+              <a:lstStyle/>
+              <a:p>
+                <a14:m>
+                  <m:oMath xmlns:m="http://schemas.openxmlformats.org/officeDocument/2006/math">
+                    <m:r>
+                      <a:rPr lang="en-FR" i="1" dirty="0" smtClean="0">
+                        <a:latin typeface="Cambria Math" panose="02040503050406030204" pitchFamily="18" charset="0"/>
+                      </a:rPr>
+                      <m:t>𝑊</m:t>
+                    </m:r>
+                  </m:oMath>
+                </a14:m>
+                <a:r>
+                  <a:rPr lang="en-FR"/>
+                  <a:t> workers</a:t>
+                </a:r>
+              </a:p>
+              <a:p>
+                <a:r>
+                  <a:rPr lang="en-FR"/>
+                  <a:t>Each worker</a:t>
+                </a:r>
+              </a:p>
+              <a:p>
+                <a:pPr lvl="1"/>
+                <a:r>
+                  <a:rPr lang="en-FR"/>
+                  <a:t>Reads a partition of data</a:t>
+                </a:r>
+              </a:p>
+              <a:p>
+                <a:pPr lvl="1"/>
+                <a:r>
+                  <a:rPr lang="en-FR"/>
+                  <a:t>Computes a local gradient</a:t>
+                </a:r>
+              </a:p>
+              <a:p>
+                <a:pPr lvl="1"/>
+                <a:r>
+                  <a:rPr lang="en-FR"/>
+                  <a:t>Sends the gradient over to be aggregated</a:t>
+                </a:r>
+              </a:p>
+              <a:p>
+                <a:pPr lvl="1"/>
+                <a:r>
+                  <a:rPr lang="en-FR"/>
+                  <a:t>Model is updated and re-pushed to the workers</a:t>
+                </a:r>
+              </a:p>
+              <a:p>
+                <a:pPr lvl="1"/>
+                <a:r>
+                  <a:rPr lang="en-FR"/>
+                  <a:t>Rince and repeat</a:t>
+                </a:r>
+              </a:p>
+              <a:p>
+                <a:endParaRPr lang="en-FR"/>
+              </a:p>
+            </p:txBody>
+          </p:sp>
+        </mc:Choice>
+        <mc:Fallback xmlns="">
+          <p:sp>
+            <p:nvSpPr>
+              <p:cNvPr id="5" name="Content Placeholder 4">
+                <a:extLst>
+                  <a:ext uri="{FF2B5EF4-FFF2-40B4-BE49-F238E27FC236}">
+                    <a16:creationId xmlns:a16="http://schemas.microsoft.com/office/drawing/2014/main" id="{D9F4F0FC-9B82-3D40-98B3-B4D29F6B3DD7}"/>
+                  </a:ext>
+                </a:extLst>
+              </p:cNvPr>
+              <p:cNvSpPr>
+                <a:spLocks noGrp="1" noRot="1" noChangeAspect="1" noMove="1" noResize="1" noEditPoints="1" noAdjustHandles="1" noChangeArrowheads="1" noChangeShapeType="1" noTextEdit="1"/>
+              </p:cNvSpPr>
+              <p:nvPr>
+                <p:ph idx="1"/>
+              </p:nvPr>
+            </p:nvSpPr>
+            <p:spPr>
+              <a:blipFill>
+                <a:blip r:embed="rId2"/>
+                <a:stretch>
+                  <a:fillRect l="-928" t="-2241"/>
+                </a:stretch>
+              </a:blipFill>
+            </p:spPr>
+            <p:txBody>
+              <a:bodyPr/>
+              <a:lstStyle/>
+              <a:p>
+                <a:r>
+                  <a:rPr lang="fr-FR">
+                    <a:noFill/>
+                  </a:rPr>
+                  <a:t> </a:t>
+                </a:r>
+              </a:p>
+            </p:txBody>
+          </p:sp>
+        </mc:Fallback>
+      </mc:AlternateContent>
+    </p:spTree>
+    <p:extLst>
+      <p:ext uri="{BB962C8B-B14F-4D97-AF65-F5344CB8AC3E}">
+        <p14:creationId xmlns:p14="http://schemas.microsoft.com/office/powerpoint/2010/main" val="2527911543"/>
+      </p:ext>
+    </p:extLst>
+  </p:cSld>
+  <p:clrMapOvr>
+    <a:masterClrMapping/>
+  </p:clrMapOvr>
+</p:sld>
+</file>
+
+<file path=ppt/slides/slide11.xml><?xml version="1.0" encoding="utf-8"?>
+<p:sld xmlns:a="http://schemas.openxmlformats.org/drawingml/2006/main" xmlns:r="http://schemas.openxmlformats.org/officeDocument/2006/relationships" xmlns:p="http://schemas.openxmlformats.org/presentationml/2006/main">
+  <p:cSld>
+    <p:spTree>
+      <p:nvGrpSpPr>
+        <p:cNvPr id="1" name=""/>
+        <p:cNvGrpSpPr/>
+        <p:nvPr/>
+      </p:nvGrpSpPr>
+      <p:grpSpPr>
+        <a:xfrm>
+          <a:off x="0" y="0"/>
+          <a:ext cx="0" cy="0"/>
+          <a:chOff x="0" y="0"/>
+          <a:chExt cx="0" cy="0"/>
+        </a:xfrm>
+      </p:grpSpPr>
+      <p:sp>
+        <p:nvSpPr>
+          <p:cNvPr id="2" name="Title 1">
+            <a:extLst>
+              <a:ext uri="{FF2B5EF4-FFF2-40B4-BE49-F238E27FC236}">
+                <a16:creationId xmlns:a16="http://schemas.microsoft.com/office/drawing/2014/main" id="{5A4DDBF4-8143-1349-AE89-C756F9A3CD5C}"/>
+              </a:ext>
+            </a:extLst>
+          </p:cNvPr>
+          <p:cNvSpPr>
+            <a:spLocks noGrp="1"/>
+          </p:cNvSpPr>
+          <p:nvPr>
+            <p:ph type="title"/>
+          </p:nvPr>
+        </p:nvSpPr>
+        <p:spPr/>
+        <p:txBody>
+          <a:bodyPr/>
+          <a:lstStyle/>
+          <a:p>
+            <a:r>
+              <a:rPr lang="en-FR"/>
+              <a:t>Distributed Gradient Descent 101</a:t>
+            </a:r>
+          </a:p>
+        </p:txBody>
+      </p:sp>
       <p:sp>
         <p:nvSpPr>
           <p:cNvPr id="5" name="Content Placeholder 4">
@@ -4179,7 +4364,7 @@
 </p:sld>
 </file>
 
-<file path=ppt/slides/slide11.xml><?xml version="1.0" encoding="utf-8"?>
+<file path=ppt/slides/slide12.xml><?xml version="1.0" encoding="utf-8"?>
 <p:sld xmlns:a="http://schemas.openxmlformats.org/drawingml/2006/main" xmlns:r="http://schemas.openxmlformats.org/officeDocument/2006/relationships" xmlns:p="http://schemas.openxmlformats.org/presentationml/2006/main">
   <p:cSld>
     <p:spTree>
@@ -5622,128 +5807,6 @@
 </p:sld>
 </file>
 
-<file path=ppt/slides/slide12.xml><?xml version="1.0" encoding="utf-8"?>
-<p:sld xmlns:a="http://schemas.openxmlformats.org/drawingml/2006/main" xmlns:r="http://schemas.openxmlformats.org/officeDocument/2006/relationships" xmlns:p="http://schemas.openxmlformats.org/presentationml/2006/main">
-  <p:cSld>
-    <p:spTree>
-      <p:nvGrpSpPr>
-        <p:cNvPr id="1" name=""/>
-        <p:cNvGrpSpPr/>
-        <p:nvPr/>
-      </p:nvGrpSpPr>
-      <p:grpSpPr>
-        <a:xfrm>
-          <a:off x="0" y="0"/>
-          <a:ext cx="0" cy="0"/>
-          <a:chOff x="0" y="0"/>
-          <a:chExt cx="0" cy="0"/>
-        </a:xfrm>
-      </p:grpSpPr>
-      <p:sp>
-        <p:nvSpPr>
-          <p:cNvPr id="2" name="Title 1">
-            <a:extLst>
-              <a:ext uri="{FF2B5EF4-FFF2-40B4-BE49-F238E27FC236}">
-                <a16:creationId xmlns:a16="http://schemas.microsoft.com/office/drawing/2014/main" id="{5A4DDBF4-8143-1349-AE89-C756F9A3CD5C}"/>
-              </a:ext>
-            </a:extLst>
-          </p:cNvPr>
-          <p:cNvSpPr>
-            <a:spLocks noGrp="1"/>
-          </p:cNvSpPr>
-          <p:nvPr>
-            <p:ph type="title"/>
-          </p:nvPr>
-        </p:nvSpPr>
-        <p:spPr/>
-        <p:txBody>
-          <a:bodyPr/>
-          <a:lstStyle/>
-          <a:p>
-            <a:r>
-              <a:rPr lang="en-FR"/>
-              <a:t>Distributed Gradient Descent 101</a:t>
-            </a:r>
-          </a:p>
-        </p:txBody>
-      </p:sp>
-      <p:sp>
-        <p:nvSpPr>
-          <p:cNvPr id="5" name="Content Placeholder 4">
-            <a:extLst>
-              <a:ext uri="{FF2B5EF4-FFF2-40B4-BE49-F238E27FC236}">
-                <a16:creationId xmlns:a16="http://schemas.microsoft.com/office/drawing/2014/main" id="{D9F4F0FC-9B82-3D40-98B3-B4D29F6B3DD7}"/>
-              </a:ext>
-            </a:extLst>
-          </p:cNvPr>
-          <p:cNvSpPr>
-            <a:spLocks noGrp="1"/>
-          </p:cNvSpPr>
-          <p:nvPr>
-            <p:ph idx="1"/>
-          </p:nvPr>
-        </p:nvSpPr>
-        <p:spPr/>
-        <p:txBody>
-          <a:bodyPr/>
-          <a:lstStyle/>
-          <a:p>
-            <a:r>
-              <a:rPr lang="en-FR"/>
-              <a:t>Easy to implement a simple version in Spark</a:t>
-            </a:r>
-          </a:p>
-          <a:p>
-            <a:endParaRPr lang="en-FR"/>
-          </a:p>
-          <a:p>
-            <a:endParaRPr lang="en-FR"/>
-          </a:p>
-        </p:txBody>
-      </p:sp>
-      <p:pic>
-        <p:nvPicPr>
-          <p:cNvPr id="4" name="Picture 3" descr="A screenshot of a cell phone&#10;&#10;Description automatically generated">
-            <a:extLst>
-              <a:ext uri="{FF2B5EF4-FFF2-40B4-BE49-F238E27FC236}">
-                <a16:creationId xmlns:a16="http://schemas.microsoft.com/office/drawing/2014/main" id="{FEF69DBA-6BD1-1D46-8966-B7526B1E705B}"/>
-              </a:ext>
-            </a:extLst>
-          </p:cNvPr>
-          <p:cNvPicPr>
-            <a:picLocks noChangeAspect="1"/>
-          </p:cNvPicPr>
-          <p:nvPr/>
-        </p:nvPicPr>
-        <p:blipFill>
-          <a:blip r:embed="rId3"/>
-          <a:stretch>
-            <a:fillRect/>
-          </a:stretch>
-        </p:blipFill>
-        <p:spPr>
-          <a:xfrm>
-            <a:off x="2616200" y="2790247"/>
-            <a:ext cx="6959600" cy="2427575"/>
-          </a:xfrm>
-          <a:prstGeom prst="rect">
-            <a:avLst/>
-          </a:prstGeom>
-        </p:spPr>
-      </p:pic>
-    </p:spTree>
-    <p:extLst>
-      <p:ext uri="{BB962C8B-B14F-4D97-AF65-F5344CB8AC3E}">
-        <p14:creationId xmlns:p14="http://schemas.microsoft.com/office/powerpoint/2010/main" val="3658203218"/>
-      </p:ext>
-    </p:extLst>
-  </p:cSld>
-  <p:clrMapOvr>
-    <a:masterClrMapping/>
-  </p:clrMapOvr>
-</p:sld>
-</file>
-
 <file path=ppt/slides/slide13.xml><?xml version="1.0" encoding="utf-8"?>
 <p:sld xmlns:a="http://schemas.openxmlformats.org/drawingml/2006/main" xmlns:r="http://schemas.openxmlformats.org/officeDocument/2006/relationships" xmlns:p="http://schemas.openxmlformats.org/presentationml/2006/main">
   <p:cSld>
@@ -5784,17 +5847,51 @@
           <a:p>
             <a:r>
               <a:rPr lang="en-FR"/>
-              <a:t>Synchronous Data Parallel SGD</a:t>
-            </a:r>
+              <a:t>Distributed Gradient Descent 101</a:t>
+            </a:r>
+          </a:p>
+        </p:txBody>
+      </p:sp>
+      <p:sp>
+        <p:nvSpPr>
+          <p:cNvPr id="5" name="Content Placeholder 4">
+            <a:extLst>
+              <a:ext uri="{FF2B5EF4-FFF2-40B4-BE49-F238E27FC236}">
+                <a16:creationId xmlns:a16="http://schemas.microsoft.com/office/drawing/2014/main" id="{D9F4F0FC-9B82-3D40-98B3-B4D29F6B3DD7}"/>
+              </a:ext>
+            </a:extLst>
+          </p:cNvPr>
+          <p:cNvSpPr>
+            <a:spLocks noGrp="1"/>
+          </p:cNvSpPr>
+          <p:nvPr>
+            <p:ph idx="1"/>
+          </p:nvPr>
+        </p:nvSpPr>
+        <p:spPr/>
+        <p:txBody>
+          <a:bodyPr/>
+          <a:lstStyle/>
+          <a:p>
+            <a:r>
+              <a:rPr lang="en-FR"/>
+              <a:t>Easy to implement a simple version in Spark</a:t>
+            </a:r>
+          </a:p>
+          <a:p>
+            <a:endParaRPr lang="en-FR"/>
+          </a:p>
+          <a:p>
+            <a:endParaRPr lang="en-FR"/>
           </a:p>
         </p:txBody>
       </p:sp>
       <p:pic>
         <p:nvPicPr>
-          <p:cNvPr id="4" name="Picture 3" descr="A picture containing screenshot&#10;&#10;Description automatically generated">
+          <p:cNvPr id="4" name="Picture 3" descr="A screenshot of a cell phone&#10;&#10;Description automatically generated">
             <a:extLst>
               <a:ext uri="{FF2B5EF4-FFF2-40B4-BE49-F238E27FC236}">
-                <a16:creationId xmlns:a16="http://schemas.microsoft.com/office/drawing/2014/main" id="{7E753016-2667-DC45-BC91-AD8FD45E1A4E}"/>
+                <a16:creationId xmlns:a16="http://schemas.microsoft.com/office/drawing/2014/main" id="{FEF69DBA-6BD1-1D46-8966-B7526B1E705B}"/>
               </a:ext>
             </a:extLst>
           </p:cNvPr>
@@ -5804,15 +5901,15 @@
           <p:nvPr/>
         </p:nvPicPr>
         <p:blipFill>
-          <a:blip r:embed="rId2"/>
+          <a:blip r:embed="rId3"/>
           <a:stretch>
             <a:fillRect/>
           </a:stretch>
         </p:blipFill>
         <p:spPr>
           <a:xfrm>
-            <a:off x="914400" y="1690688"/>
-            <a:ext cx="9864436" cy="4328355"/>
+            <a:off x="2616200" y="2790247"/>
+            <a:ext cx="6959600" cy="2427575"/>
           </a:xfrm>
           <a:prstGeom prst="rect">
             <a:avLst/>
@@ -5822,7 +5919,7 @@
     </p:spTree>
     <p:extLst>
       <p:ext uri="{BB962C8B-B14F-4D97-AF65-F5344CB8AC3E}">
-        <p14:creationId xmlns:p14="http://schemas.microsoft.com/office/powerpoint/2010/main" val="3359569585"/>
+        <p14:creationId xmlns:p14="http://schemas.microsoft.com/office/powerpoint/2010/main" val="3658203218"/>
       </p:ext>
     </p:extLst>
   </p:cSld>
@@ -5879,10 +5976,10 @@
       </p:sp>
       <p:pic>
         <p:nvPicPr>
-          <p:cNvPr id="9" name="Picture 8" descr="A picture containing screenshot&#10;&#10;Description automatically generated">
+          <p:cNvPr id="4" name="Picture 3" descr="A picture containing screenshot&#10;&#10;Description automatically generated">
             <a:extLst>
               <a:ext uri="{FF2B5EF4-FFF2-40B4-BE49-F238E27FC236}">
-                <a16:creationId xmlns:a16="http://schemas.microsoft.com/office/drawing/2014/main" id="{457DFB0D-5582-4F4E-8E28-9278A51173E8}"/>
+                <a16:creationId xmlns:a16="http://schemas.microsoft.com/office/drawing/2014/main" id="{7E753016-2667-DC45-BC91-AD8FD45E1A4E}"/>
               </a:ext>
             </a:extLst>
           </p:cNvPr>
@@ -5899,8 +5996,8 @@
         </p:blipFill>
         <p:spPr>
           <a:xfrm>
-            <a:off x="838200" y="1690688"/>
-            <a:ext cx="10148047" cy="4547395"/>
+            <a:off x="914400" y="1690688"/>
+            <a:ext cx="9864436" cy="4328355"/>
           </a:xfrm>
           <a:prstGeom prst="rect">
             <a:avLst/>
@@ -5910,7 +6007,7 @@
     </p:spTree>
     <p:extLst>
       <p:ext uri="{BB962C8B-B14F-4D97-AF65-F5344CB8AC3E}">
-        <p14:creationId xmlns:p14="http://schemas.microsoft.com/office/powerpoint/2010/main" val="476508303"/>
+        <p14:creationId xmlns:p14="http://schemas.microsoft.com/office/powerpoint/2010/main" val="3359569585"/>
       </p:ext>
     </p:extLst>
   </p:cSld>
@@ -5967,10 +6064,10 @@
       </p:sp>
       <p:pic>
         <p:nvPicPr>
-          <p:cNvPr id="4" name="Picture 3" descr="A screenshot of a cell phone&#10;&#10;Description automatically generated">
+          <p:cNvPr id="9" name="Picture 8" descr="A picture containing screenshot&#10;&#10;Description automatically generated">
             <a:extLst>
               <a:ext uri="{FF2B5EF4-FFF2-40B4-BE49-F238E27FC236}">
-                <a16:creationId xmlns:a16="http://schemas.microsoft.com/office/drawing/2014/main" id="{EAB4EF1A-6C9E-1047-826C-DD62E7A7C5ED}"/>
+                <a16:creationId xmlns:a16="http://schemas.microsoft.com/office/drawing/2014/main" id="{457DFB0D-5582-4F4E-8E28-9278A51173E8}"/>
               </a:ext>
             </a:extLst>
           </p:cNvPr>
@@ -5987,8 +6084,8 @@
         </p:blipFill>
         <p:spPr>
           <a:xfrm>
-            <a:off x="1071418" y="1815956"/>
-            <a:ext cx="9448800" cy="4175233"/>
+            <a:off x="838200" y="1690688"/>
+            <a:ext cx="10148047" cy="4547395"/>
           </a:xfrm>
           <a:prstGeom prst="rect">
             <a:avLst/>
@@ -5998,7 +6095,7 @@
     </p:spTree>
     <p:extLst>
       <p:ext uri="{BB962C8B-B14F-4D97-AF65-F5344CB8AC3E}">
-        <p14:creationId xmlns:p14="http://schemas.microsoft.com/office/powerpoint/2010/main" val="2627488289"/>
+        <p14:creationId xmlns:p14="http://schemas.microsoft.com/office/powerpoint/2010/main" val="476508303"/>
       </p:ext>
     </p:extLst>
   </p:cSld>
@@ -6055,10 +6152,10 @@
       </p:sp>
       <p:pic>
         <p:nvPicPr>
-          <p:cNvPr id="5" name="Picture 4" descr="A screenshot of a cell phone&#10;&#10;Description automatically generated">
+          <p:cNvPr id="4" name="Picture 3" descr="A screenshot of a cell phone&#10;&#10;Description automatically generated">
             <a:extLst>
               <a:ext uri="{FF2B5EF4-FFF2-40B4-BE49-F238E27FC236}">
-                <a16:creationId xmlns:a16="http://schemas.microsoft.com/office/drawing/2014/main" id="{40D2F83F-D308-A64B-B8A0-C263610C3C8D}"/>
+                <a16:creationId xmlns:a16="http://schemas.microsoft.com/office/drawing/2014/main" id="{EAB4EF1A-6C9E-1047-826C-DD62E7A7C5ED}"/>
               </a:ext>
             </a:extLst>
           </p:cNvPr>
@@ -6075,8 +6172,8 @@
         </p:blipFill>
         <p:spPr>
           <a:xfrm>
-            <a:off x="738909" y="1789355"/>
-            <a:ext cx="10104582" cy="4432554"/>
+            <a:off x="1071418" y="1815956"/>
+            <a:ext cx="9448800" cy="4175233"/>
           </a:xfrm>
           <a:prstGeom prst="rect">
             <a:avLst/>
@@ -6086,7 +6183,7 @@
     </p:spTree>
     <p:extLst>
       <p:ext uri="{BB962C8B-B14F-4D97-AF65-F5344CB8AC3E}">
-        <p14:creationId xmlns:p14="http://schemas.microsoft.com/office/powerpoint/2010/main" val="2110330326"/>
+        <p14:creationId xmlns:p14="http://schemas.microsoft.com/office/powerpoint/2010/main" val="2627488289"/>
       </p:ext>
     </p:extLst>
   </p:cSld>
@@ -6136,298 +6233,45 @@
           <a:p>
             <a:r>
               <a:rPr lang="en-FR"/>
-              <a:t>Synchronous parallel SGD</a:t>
+              <a:t>Synchronous Data Parallel SGD</a:t>
             </a:r>
           </a:p>
         </p:txBody>
       </p:sp>
-      <p:sp>
-        <p:nvSpPr>
-          <p:cNvPr id="5" name="Content Placeholder 4">
+      <p:pic>
+        <p:nvPicPr>
+          <p:cNvPr id="5" name="Picture 4" descr="A screenshot of a cell phone&#10;&#10;Description automatically generated">
             <a:extLst>
               <a:ext uri="{FF2B5EF4-FFF2-40B4-BE49-F238E27FC236}">
-                <a16:creationId xmlns:a16="http://schemas.microsoft.com/office/drawing/2014/main" id="{D9F4F0FC-9B82-3D40-98B3-B4D29F6B3DD7}"/>
+                <a16:creationId xmlns:a16="http://schemas.microsoft.com/office/drawing/2014/main" id="{40D2F83F-D308-A64B-B8A0-C263610C3C8D}"/>
               </a:ext>
             </a:extLst>
           </p:cNvPr>
-          <p:cNvSpPr>
-            <a:spLocks noGrp="1"/>
-          </p:cNvSpPr>
-          <p:nvPr>
-            <p:ph idx="1"/>
-          </p:nvPr>
-        </p:nvSpPr>
-        <p:spPr/>
-        <p:txBody>
-          <a:bodyPr/>
-          <a:lstStyle/>
-          <a:p>
-            <a:pPr marL="285750" indent="-285750"/>
-            <a:r>
-              <a:rPr lang="fr-FR"/>
-              <a:t>Objective: </a:t>
-            </a:r>
-            <a:r>
-              <a:rPr lang="fr-FR" err="1"/>
-              <a:t>compute</a:t>
-            </a:r>
-            <a:r>
-              <a:rPr lang="fr-FR"/>
-              <a:t> the gradient in </a:t>
-            </a:r>
-            <a:r>
-              <a:rPr lang="fr-FR" err="1"/>
-              <a:t>parallel</a:t>
-            </a:r>
-            <a:endParaRPr lang="fr-FR"/>
-          </a:p>
-          <a:p>
-            <a:pPr marL="285750" indent="-285750"/>
-            <a:endParaRPr lang="fr-FR"/>
-          </a:p>
-          <a:p>
-            <a:pPr marL="285750" indent="-285750"/>
-            <a:r>
-              <a:rPr lang="fr-FR" err="1"/>
-              <a:t>Two</a:t>
-            </a:r>
-            <a:r>
-              <a:rPr lang="fr-FR"/>
-              <a:t> main </a:t>
-            </a:r>
-            <a:r>
-              <a:rPr lang="fr-FR" err="1"/>
-              <a:t>overheads</a:t>
-            </a:r>
-            <a:endParaRPr lang="fr-FR"/>
-          </a:p>
-          <a:p>
-            <a:pPr marL="742950" lvl="1" indent="-285750"/>
-            <a:r>
-              <a:rPr lang="fr-FR"/>
-              <a:t>Communication: </a:t>
-            </a:r>
-            <a:r>
-              <a:rPr lang="fr-FR" err="1"/>
-              <a:t>sending</a:t>
-            </a:r>
-            <a:r>
-              <a:rPr lang="fr-FR"/>
-              <a:t> gradient updates to the driver / </a:t>
-            </a:r>
-            <a:r>
-              <a:rPr lang="fr-FR" err="1"/>
-              <a:t>other</a:t>
-            </a:r>
-            <a:r>
-              <a:rPr lang="fr-FR"/>
-              <a:t> </a:t>
-            </a:r>
-            <a:r>
-              <a:rPr lang="fr-FR" err="1"/>
-              <a:t>workers</a:t>
-            </a:r>
-            <a:endParaRPr lang="fr-FR"/>
-          </a:p>
-          <a:p>
-            <a:pPr marL="742950" lvl="1" indent="-285750"/>
-            <a:r>
-              <a:rPr lang="fr-FR" err="1"/>
-              <a:t>Synchronization</a:t>
-            </a:r>
-            <a:r>
-              <a:rPr lang="fr-FR"/>
-              <a:t>: </a:t>
-            </a:r>
-            <a:r>
-              <a:rPr lang="fr-FR" err="1"/>
-              <a:t>waiting</a:t>
-            </a:r>
-            <a:r>
-              <a:rPr lang="fr-FR"/>
-              <a:t> for all the </a:t>
-            </a:r>
-            <a:r>
-              <a:rPr lang="fr-FR" err="1"/>
-              <a:t>workers</a:t>
-            </a:r>
-            <a:r>
-              <a:rPr lang="fr-FR"/>
-              <a:t> to </a:t>
-            </a:r>
-            <a:r>
-              <a:rPr lang="fr-FR" err="1"/>
-              <a:t>execute</a:t>
-            </a:r>
-            <a:r>
-              <a:rPr lang="fr-FR"/>
-              <a:t> the </a:t>
-            </a:r>
-            <a:r>
-              <a:rPr lang="fr-FR" err="1"/>
-              <a:t>current</a:t>
-            </a:r>
-            <a:r>
-              <a:rPr lang="fr-FR"/>
-              <a:t> </a:t>
-            </a:r>
-            <a:r>
-              <a:rPr lang="fr-FR" err="1"/>
-              <a:t>iteration</a:t>
-            </a:r>
-            <a:endParaRPr lang="fr-FR"/>
-          </a:p>
-          <a:p>
-            <a:pPr marL="742950" lvl="1" indent="-285750"/>
-            <a:endParaRPr lang="fr-FR"/>
-          </a:p>
-          <a:p>
-            <a:pPr marL="285750" indent="-285750"/>
-            <a:r>
-              <a:rPr lang="fr-FR"/>
-              <a:t>This </a:t>
-            </a:r>
-            <a:r>
-              <a:rPr lang="fr-FR" err="1"/>
-              <a:t>what</a:t>
-            </a:r>
-            <a:r>
-              <a:rPr lang="fr-FR"/>
-              <a:t> </a:t>
-            </a:r>
-            <a:r>
-              <a:rPr lang="fr-FR" err="1"/>
-              <a:t>is</a:t>
-            </a:r>
-            <a:r>
-              <a:rPr lang="fr-FR"/>
-              <a:t> </a:t>
-            </a:r>
-            <a:r>
-              <a:rPr lang="fr-FR" err="1"/>
-              <a:t>preventing</a:t>
-            </a:r>
-            <a:r>
-              <a:rPr lang="fr-FR"/>
-              <a:t> </a:t>
-            </a:r>
-            <a:r>
-              <a:rPr lang="fr-FR" err="1"/>
-              <a:t>from</a:t>
-            </a:r>
-            <a:r>
-              <a:rPr lang="fr-FR"/>
-              <a:t> </a:t>
-            </a:r>
-            <a:r>
-              <a:rPr lang="fr-FR" err="1"/>
-              <a:t>getting</a:t>
-            </a:r>
-            <a:r>
-              <a:rPr lang="fr-FR"/>
-              <a:t> the </a:t>
-            </a:r>
-            <a:r>
-              <a:rPr lang="fr-FR" err="1"/>
-              <a:t>theoretical</a:t>
-            </a:r>
-            <a:r>
-              <a:rPr lang="fr-FR"/>
-              <a:t> speed up</a:t>
-            </a:r>
-          </a:p>
-          <a:p>
-            <a:pPr marL="742950" lvl="1" indent="-285750"/>
-            <a:r>
-              <a:rPr lang="fr-FR" err="1"/>
-              <a:t>With</a:t>
-            </a:r>
-            <a:r>
-              <a:rPr lang="fr-FR"/>
-              <a:t> n </a:t>
-            </a:r>
-            <a:r>
-              <a:rPr lang="fr-FR" err="1"/>
-              <a:t>workers</a:t>
-            </a:r>
-            <a:endParaRPr lang="fr-FR"/>
-          </a:p>
-          <a:p>
-            <a:pPr marL="742950" lvl="1" indent="-285750"/>
-            <a:r>
-              <a:rPr lang="fr-FR"/>
-              <a:t>Gradient computation: T / n</a:t>
-            </a:r>
-          </a:p>
-          <a:p>
-            <a:pPr marL="742950" lvl="1" indent="-285750"/>
-            <a:r>
-              <a:rPr lang="fr-FR" err="1"/>
-              <a:t>Comm</a:t>
-            </a:r>
-            <a:r>
-              <a:rPr lang="fr-FR"/>
-              <a:t> and </a:t>
-            </a:r>
-            <a:r>
-              <a:rPr lang="fr-FR" err="1"/>
-              <a:t>sync</a:t>
-            </a:r>
-            <a:r>
-              <a:rPr lang="fr-FR"/>
-              <a:t> </a:t>
-            </a:r>
-            <a:r>
-              <a:rPr lang="fr-FR" err="1"/>
-              <a:t>cost</a:t>
-            </a:r>
-            <a:r>
-              <a:rPr lang="fr-FR"/>
-              <a:t>: </a:t>
-            </a:r>
-            <a:r>
-              <a:rPr lang="fr-FR" err="1"/>
-              <a:t>does</a:t>
-            </a:r>
-            <a:r>
-              <a:rPr lang="fr-FR"/>
-              <a:t> not </a:t>
-            </a:r>
-            <a:r>
-              <a:rPr lang="fr-FR" err="1"/>
-              <a:t>decrease</a:t>
-            </a:r>
-            <a:r>
-              <a:rPr lang="fr-FR"/>
-              <a:t> </a:t>
-            </a:r>
-            <a:r>
-              <a:rPr lang="fr-FR" err="1"/>
-              <a:t>with</a:t>
-            </a:r>
-            <a:r>
-              <a:rPr lang="fr-FR"/>
-              <a:t> n but </a:t>
-            </a:r>
-            <a:r>
-              <a:rPr lang="fr-FR" err="1"/>
-              <a:t>increase</a:t>
-            </a:r>
-            <a:r>
-              <a:rPr lang="fr-FR"/>
-              <a:t> !</a:t>
-            </a:r>
-          </a:p>
-          <a:p>
-            <a:pPr marL="285750" indent="-285750"/>
-            <a:endParaRPr lang="en-FR"/>
-          </a:p>
-        </p:txBody>
-      </p:sp>
+          <p:cNvPicPr>
+            <a:picLocks noChangeAspect="1"/>
+          </p:cNvPicPr>
+          <p:nvPr/>
+        </p:nvPicPr>
+        <p:blipFill>
+          <a:blip r:embed="rId2"/>
+          <a:stretch>
+            <a:fillRect/>
+          </a:stretch>
+        </p:blipFill>
+        <p:spPr>
+          <a:xfrm>
+            <a:off x="738909" y="1789355"/>
+            <a:ext cx="10104582" cy="4432554"/>
+          </a:xfrm>
+          <a:prstGeom prst="rect">
+            <a:avLst/>
+          </a:prstGeom>
+        </p:spPr>
+      </p:pic>
     </p:spTree>
     <p:extLst>
       <p:ext uri="{BB962C8B-B14F-4D97-AF65-F5344CB8AC3E}">
-        <p14:creationId xmlns:p14="http://schemas.microsoft.com/office/powerpoint/2010/main" val="1830502275"/>
+        <p14:creationId xmlns:p14="http://schemas.microsoft.com/office/powerpoint/2010/main" val="2110330326"/>
       </p:ext>
     </p:extLst>
   </p:cSld>
@@ -6476,9 +6320,14 @@
           <a:lstStyle/>
           <a:p>
             <a:r>
-              <a:rPr lang="en-FR"/>
-              <a:t>Communication cost</a:t>
-            </a:r>
+              <a:rPr lang="fr-FR" dirty="0"/>
+              <a:t>Main </a:t>
+            </a:r>
+            <a:r>
+              <a:rPr lang="fr-FR" dirty="0" err="1"/>
+              <a:t>Overheads</a:t>
+            </a:r>
+            <a:endParaRPr lang="en-FR" dirty="0"/>
           </a:p>
         </p:txBody>
       </p:sp>
@@ -6505,225 +6354,582 @@
           <a:p>
             <a:pPr marL="285750" indent="-285750"/>
             <a:r>
-              <a:rPr lang="fr-FR" err="1"/>
+              <a:rPr lang="fr-FR" dirty="0"/>
+              <a:t>Objective: </a:t>
+            </a:r>
+            <a:r>
+              <a:rPr lang="fr-FR" dirty="0" err="1"/>
+              <a:t>compute</a:t>
+            </a:r>
+            <a:r>
+              <a:rPr lang="fr-FR" dirty="0"/>
+              <a:t> the gradient in </a:t>
+            </a:r>
+            <a:r>
+              <a:rPr lang="fr-FR" dirty="0" err="1"/>
+              <a:t>parallel</a:t>
+            </a:r>
+            <a:endParaRPr lang="fr-FR" dirty="0"/>
+          </a:p>
+          <a:p>
+            <a:pPr marL="285750" indent="-285750"/>
+            <a:endParaRPr lang="fr-FR" dirty="0"/>
+          </a:p>
+          <a:p>
+            <a:pPr marL="285750" indent="-285750"/>
+            <a:r>
+              <a:rPr lang="fr-FR" dirty="0" err="1"/>
+              <a:t>Two</a:t>
+            </a:r>
+            <a:r>
+              <a:rPr lang="fr-FR" dirty="0"/>
+              <a:t> main </a:t>
+            </a:r>
+            <a:r>
+              <a:rPr lang="fr-FR" dirty="0" err="1"/>
+              <a:t>overheads</a:t>
+            </a:r>
+            <a:endParaRPr lang="fr-FR" dirty="0"/>
+          </a:p>
+          <a:p>
+            <a:pPr marL="742950" lvl="1" indent="-285750"/>
+            <a:r>
+              <a:rPr lang="fr-FR" dirty="0"/>
+              <a:t>Communication: </a:t>
+            </a:r>
+            <a:r>
+              <a:rPr lang="fr-FR" dirty="0" err="1"/>
+              <a:t>sending</a:t>
+            </a:r>
+            <a:r>
+              <a:rPr lang="fr-FR" dirty="0"/>
+              <a:t> gradient updates to the driver / </a:t>
+            </a:r>
+            <a:r>
+              <a:rPr lang="fr-FR" dirty="0" err="1"/>
+              <a:t>other</a:t>
+            </a:r>
+            <a:r>
+              <a:rPr lang="fr-FR" dirty="0"/>
+              <a:t> </a:t>
+            </a:r>
+            <a:r>
+              <a:rPr lang="fr-FR" dirty="0" err="1"/>
+              <a:t>workers</a:t>
+            </a:r>
+            <a:endParaRPr lang="fr-FR" dirty="0"/>
+          </a:p>
+          <a:p>
+            <a:pPr marL="742950" lvl="1" indent="-285750"/>
+            <a:r>
+              <a:rPr lang="fr-FR" dirty="0" err="1"/>
+              <a:t>Synchronization</a:t>
+            </a:r>
+            <a:r>
+              <a:rPr lang="fr-FR" dirty="0"/>
+              <a:t>: </a:t>
+            </a:r>
+            <a:r>
+              <a:rPr lang="fr-FR" dirty="0" err="1"/>
+              <a:t>waiting</a:t>
+            </a:r>
+            <a:r>
+              <a:rPr lang="fr-FR" dirty="0"/>
+              <a:t> for all the </a:t>
+            </a:r>
+            <a:r>
+              <a:rPr lang="fr-FR" dirty="0" err="1"/>
+              <a:t>workers</a:t>
+            </a:r>
+            <a:r>
+              <a:rPr lang="fr-FR" dirty="0"/>
+              <a:t> to </a:t>
+            </a:r>
+            <a:r>
+              <a:rPr lang="fr-FR" dirty="0" err="1"/>
+              <a:t>execute</a:t>
+            </a:r>
+            <a:r>
+              <a:rPr lang="fr-FR" dirty="0"/>
+              <a:t> the </a:t>
+            </a:r>
+            <a:r>
+              <a:rPr lang="fr-FR" dirty="0" err="1"/>
+              <a:t>current</a:t>
+            </a:r>
+            <a:r>
+              <a:rPr lang="fr-FR" dirty="0"/>
+              <a:t> </a:t>
+            </a:r>
+            <a:r>
+              <a:rPr lang="fr-FR" dirty="0" err="1"/>
+              <a:t>iteration</a:t>
+            </a:r>
+            <a:endParaRPr lang="fr-FR" dirty="0"/>
+          </a:p>
+          <a:p>
+            <a:pPr marL="742950" lvl="1" indent="-285750"/>
+            <a:endParaRPr lang="fr-FR" dirty="0"/>
+          </a:p>
+          <a:p>
+            <a:pPr marL="285750" indent="-285750"/>
+            <a:r>
+              <a:rPr lang="fr-FR" dirty="0"/>
+              <a:t>This </a:t>
+            </a:r>
+            <a:r>
+              <a:rPr lang="fr-FR" dirty="0" err="1"/>
+              <a:t>is</a:t>
+            </a:r>
+            <a:r>
+              <a:rPr lang="fr-FR" dirty="0"/>
+              <a:t> </a:t>
+            </a:r>
+            <a:r>
+              <a:rPr lang="fr-FR" dirty="0" err="1"/>
+              <a:t>what</a:t>
+            </a:r>
+            <a:r>
+              <a:rPr lang="fr-FR" dirty="0"/>
+              <a:t> </a:t>
+            </a:r>
+            <a:r>
+              <a:rPr lang="fr-FR" dirty="0" err="1"/>
+              <a:t>is</a:t>
+            </a:r>
+            <a:r>
+              <a:rPr lang="fr-FR" dirty="0"/>
+              <a:t> </a:t>
+            </a:r>
+            <a:r>
+              <a:rPr lang="fr-FR" dirty="0" err="1"/>
+              <a:t>preventing</a:t>
+            </a:r>
+            <a:r>
+              <a:rPr lang="fr-FR" dirty="0"/>
+              <a:t> </a:t>
+            </a:r>
+            <a:r>
+              <a:rPr lang="fr-FR" dirty="0" err="1"/>
+              <a:t>from</a:t>
+            </a:r>
+            <a:r>
+              <a:rPr lang="fr-FR" dirty="0"/>
+              <a:t> </a:t>
+            </a:r>
+            <a:r>
+              <a:rPr lang="fr-FR" dirty="0" err="1"/>
+              <a:t>getting</a:t>
+            </a:r>
+            <a:r>
+              <a:rPr lang="fr-FR" dirty="0"/>
+              <a:t> the </a:t>
+            </a:r>
+            <a:r>
+              <a:rPr lang="fr-FR" dirty="0" err="1"/>
+              <a:t>theoretical</a:t>
+            </a:r>
+            <a:r>
+              <a:rPr lang="fr-FR" dirty="0"/>
+              <a:t> speed up</a:t>
+            </a:r>
+          </a:p>
+          <a:p>
+            <a:pPr marL="742950" lvl="1" indent="-285750"/>
+            <a:r>
+              <a:rPr lang="fr-FR" dirty="0" err="1"/>
+              <a:t>With</a:t>
+            </a:r>
+            <a:r>
+              <a:rPr lang="fr-FR" dirty="0"/>
+              <a:t> n </a:t>
+            </a:r>
+            <a:r>
+              <a:rPr lang="fr-FR" dirty="0" err="1"/>
+              <a:t>workers</a:t>
+            </a:r>
+            <a:endParaRPr lang="fr-FR" dirty="0"/>
+          </a:p>
+          <a:p>
+            <a:pPr marL="742950" lvl="1" indent="-285750"/>
+            <a:r>
+              <a:rPr lang="fr-FR" dirty="0"/>
+              <a:t>Gradient computation: T / n</a:t>
+            </a:r>
+          </a:p>
+          <a:p>
+            <a:pPr marL="742950" lvl="1" indent="-285750"/>
+            <a:r>
+              <a:rPr lang="fr-FR" dirty="0" err="1"/>
+              <a:t>Comm</a:t>
+            </a:r>
+            <a:r>
+              <a:rPr lang="fr-FR" dirty="0"/>
+              <a:t> and </a:t>
+            </a:r>
+            <a:r>
+              <a:rPr lang="fr-FR" dirty="0" err="1"/>
+              <a:t>sync</a:t>
+            </a:r>
+            <a:r>
+              <a:rPr lang="fr-FR" dirty="0"/>
+              <a:t> </a:t>
+            </a:r>
+            <a:r>
+              <a:rPr lang="fr-FR" dirty="0" err="1"/>
+              <a:t>cost</a:t>
+            </a:r>
+            <a:r>
+              <a:rPr lang="fr-FR" dirty="0"/>
+              <a:t>: </a:t>
+            </a:r>
+            <a:r>
+              <a:rPr lang="fr-FR" dirty="0" err="1"/>
+              <a:t>does</a:t>
+            </a:r>
+            <a:r>
+              <a:rPr lang="fr-FR" dirty="0"/>
+              <a:t> not </a:t>
+            </a:r>
+            <a:r>
+              <a:rPr lang="fr-FR" dirty="0" err="1"/>
+              <a:t>decrease</a:t>
+            </a:r>
+            <a:r>
+              <a:rPr lang="fr-FR" dirty="0"/>
+              <a:t> </a:t>
+            </a:r>
+            <a:r>
+              <a:rPr lang="fr-FR" dirty="0" err="1"/>
+              <a:t>with</a:t>
+            </a:r>
+            <a:r>
+              <a:rPr lang="fr-FR" dirty="0"/>
+              <a:t> n but </a:t>
+            </a:r>
+            <a:r>
+              <a:rPr lang="fr-FR" dirty="0" err="1"/>
+              <a:t>increase</a:t>
+            </a:r>
+            <a:r>
+              <a:rPr lang="fr-FR" dirty="0"/>
+              <a:t> !</a:t>
+            </a:r>
+          </a:p>
+          <a:p>
+            <a:pPr marL="285750" indent="-285750"/>
+            <a:endParaRPr lang="en-FR" dirty="0"/>
+          </a:p>
+        </p:txBody>
+      </p:sp>
+    </p:spTree>
+    <p:extLst>
+      <p:ext uri="{BB962C8B-B14F-4D97-AF65-F5344CB8AC3E}">
+        <p14:creationId xmlns:p14="http://schemas.microsoft.com/office/powerpoint/2010/main" val="1830502275"/>
+      </p:ext>
+    </p:extLst>
+  </p:cSld>
+  <p:clrMapOvr>
+    <a:masterClrMapping/>
+  </p:clrMapOvr>
+</p:sld>
+</file>
+
+<file path=ppt/slides/slide19.xml><?xml version="1.0" encoding="utf-8"?>
+<p:sld xmlns:a="http://schemas.openxmlformats.org/drawingml/2006/main" xmlns:r="http://schemas.openxmlformats.org/officeDocument/2006/relationships" xmlns:p="http://schemas.openxmlformats.org/presentationml/2006/main">
+  <p:cSld>
+    <p:spTree>
+      <p:nvGrpSpPr>
+        <p:cNvPr id="1" name=""/>
+        <p:cNvGrpSpPr/>
+        <p:nvPr/>
+      </p:nvGrpSpPr>
+      <p:grpSpPr>
+        <a:xfrm>
+          <a:off x="0" y="0"/>
+          <a:ext cx="0" cy="0"/>
+          <a:chOff x="0" y="0"/>
+          <a:chExt cx="0" cy="0"/>
+        </a:xfrm>
+      </p:grpSpPr>
+      <p:sp>
+        <p:nvSpPr>
+          <p:cNvPr id="2" name="Title 1">
+            <a:extLst>
+              <a:ext uri="{FF2B5EF4-FFF2-40B4-BE49-F238E27FC236}">
+                <a16:creationId xmlns:a16="http://schemas.microsoft.com/office/drawing/2014/main" id="{5A4DDBF4-8143-1349-AE89-C756F9A3CD5C}"/>
+              </a:ext>
+            </a:extLst>
+          </p:cNvPr>
+          <p:cNvSpPr>
+            <a:spLocks noGrp="1"/>
+          </p:cNvSpPr>
+          <p:nvPr>
+            <p:ph type="title"/>
+          </p:nvPr>
+        </p:nvSpPr>
+        <p:spPr/>
+        <p:txBody>
+          <a:bodyPr/>
+          <a:lstStyle/>
+          <a:p>
+            <a:r>
+              <a:rPr lang="en-FR"/>
+              <a:t>Communication cost</a:t>
+            </a:r>
+          </a:p>
+        </p:txBody>
+      </p:sp>
+      <p:sp>
+        <p:nvSpPr>
+          <p:cNvPr id="5" name="Content Placeholder 4">
+            <a:extLst>
+              <a:ext uri="{FF2B5EF4-FFF2-40B4-BE49-F238E27FC236}">
+                <a16:creationId xmlns:a16="http://schemas.microsoft.com/office/drawing/2014/main" id="{D9F4F0FC-9B82-3D40-98B3-B4D29F6B3DD7}"/>
+              </a:ext>
+            </a:extLst>
+          </p:cNvPr>
+          <p:cNvSpPr>
+            <a:spLocks noGrp="1"/>
+          </p:cNvSpPr>
+          <p:nvPr>
+            <p:ph idx="1"/>
+          </p:nvPr>
+        </p:nvSpPr>
+        <p:spPr/>
+        <p:txBody>
+          <a:bodyPr/>
+          <a:lstStyle/>
+          <a:p>
+            <a:pPr marL="285750" indent="-285750"/>
+            <a:r>
+              <a:rPr lang="fr-FR" dirty="0" err="1"/>
               <a:t>Sparse</a:t>
             </a:r>
             <a:r>
-              <a:rPr lang="fr-FR"/>
+              <a:rPr lang="fr-FR" dirty="0"/>
               <a:t> model </a:t>
             </a:r>
             <a:r>
-              <a:rPr lang="fr-FR" err="1"/>
+              <a:rPr lang="fr-FR" dirty="0" err="1"/>
               <a:t>example</a:t>
             </a:r>
-            <a:endParaRPr lang="fr-FR"/>
+            <a:endParaRPr lang="fr-FR" dirty="0"/>
           </a:p>
           <a:p>
             <a:pPr marL="742950" lvl="1" indent="-285750"/>
             <a:r>
-              <a:rPr lang="fr-FR"/>
+              <a:rPr lang="fr-FR" dirty="0"/>
               <a:t>Total model </a:t>
             </a:r>
             <a:r>
-              <a:rPr lang="fr-FR" err="1"/>
+              <a:rPr lang="fr-FR" dirty="0" err="1"/>
               <a:t>weights</a:t>
             </a:r>
             <a:r>
-              <a:rPr lang="fr-FR"/>
+              <a:rPr lang="fr-FR" dirty="0"/>
               <a:t> M</a:t>
             </a:r>
           </a:p>
           <a:p>
             <a:pPr marL="742950" lvl="1" indent="-285750"/>
             <a:r>
-              <a:rPr lang="fr-FR"/>
+              <a:rPr lang="fr-FR" dirty="0"/>
               <a:t>But </a:t>
             </a:r>
             <a:r>
-              <a:rPr lang="fr-FR" err="1"/>
+              <a:rPr lang="fr-FR" dirty="0" err="1"/>
               <a:t>only</a:t>
             </a:r>
             <a:r>
-              <a:rPr lang="fr-FR"/>
+              <a:rPr lang="fr-FR" dirty="0"/>
               <a:t> f &lt;&lt; M non </a:t>
             </a:r>
             <a:r>
-              <a:rPr lang="fr-FR" err="1"/>
+              <a:rPr lang="fr-FR" dirty="0" err="1"/>
               <a:t>zero</a:t>
             </a:r>
             <a:r>
-              <a:rPr lang="fr-FR"/>
+              <a:rPr lang="fr-FR" dirty="0"/>
               <a:t> </a:t>
             </a:r>
             <a:r>
-              <a:rPr lang="fr-FR" err="1"/>
+              <a:rPr lang="fr-FR" dirty="0" err="1"/>
               <a:t>features</a:t>
             </a:r>
             <a:r>
-              <a:rPr lang="fr-FR"/>
+              <a:rPr lang="fr-FR" dirty="0"/>
               <a:t> per </a:t>
             </a:r>
             <a:r>
-              <a:rPr lang="fr-FR" err="1"/>
+              <a:rPr lang="fr-FR" dirty="0" err="1"/>
               <a:t>row</a:t>
             </a:r>
-            <a:endParaRPr lang="fr-FR"/>
+            <a:endParaRPr lang="fr-FR" dirty="0"/>
           </a:p>
           <a:p>
             <a:pPr marL="742950" lvl="1" indent="-285750"/>
             <a:r>
-              <a:rPr lang="fr-FR"/>
+              <a:rPr lang="fr-FR" dirty="0"/>
               <a:t>For the log-</a:t>
             </a:r>
             <a:r>
-              <a:rPr lang="fr-FR" err="1"/>
+              <a:rPr lang="fr-FR" dirty="0" err="1"/>
               <a:t>loss</a:t>
             </a:r>
             <a:r>
-              <a:rPr lang="fr-FR"/>
+              <a:rPr lang="fr-FR" dirty="0"/>
               <a:t> </a:t>
             </a:r>
             <a:r>
-              <a:rPr lang="fr-FR" err="1"/>
+              <a:rPr lang="fr-FR" dirty="0" err="1"/>
               <a:t>defined</a:t>
             </a:r>
             <a:r>
-              <a:rPr lang="fr-FR"/>
+              <a:rPr lang="fr-FR" dirty="0"/>
               <a:t> </a:t>
             </a:r>
             <a:r>
-              <a:rPr lang="fr-FR" err="1"/>
+              <a:rPr lang="fr-FR" dirty="0" err="1"/>
               <a:t>earlier</a:t>
             </a:r>
             <a:r>
-              <a:rPr lang="fr-FR"/>
+              <a:rPr lang="fr-FR" dirty="0"/>
               <a:t>, gradient </a:t>
             </a:r>
             <a:r>
-              <a:rPr lang="fr-FR" err="1"/>
+              <a:rPr lang="fr-FR" dirty="0" err="1"/>
               <a:t>will</a:t>
             </a:r>
             <a:r>
-              <a:rPr lang="fr-FR"/>
+              <a:rPr lang="fr-FR" dirty="0"/>
               <a:t> </a:t>
             </a:r>
             <a:r>
-              <a:rPr lang="fr-FR" err="1"/>
+              <a:rPr lang="fr-FR" dirty="0" err="1"/>
               <a:t>be</a:t>
             </a:r>
             <a:r>
-              <a:rPr lang="fr-FR"/>
+              <a:rPr lang="fr-FR" dirty="0"/>
               <a:t> </a:t>
             </a:r>
             <a:r>
-              <a:rPr lang="fr-FR" err="1"/>
+              <a:rPr lang="fr-FR" dirty="0" err="1"/>
               <a:t>sparse</a:t>
             </a:r>
             <a:r>
-              <a:rPr lang="fr-FR"/>
+              <a:rPr lang="fr-FR" dirty="0"/>
               <a:t> and </a:t>
             </a:r>
             <a:r>
-              <a:rPr lang="fr-FR" err="1"/>
+              <a:rPr lang="fr-FR" dirty="0" err="1"/>
               <a:t>needs</a:t>
             </a:r>
             <a:r>
-              <a:rPr lang="fr-FR"/>
+              <a:rPr lang="fr-FR" dirty="0"/>
               <a:t> to </a:t>
             </a:r>
             <a:r>
-              <a:rPr lang="fr-FR" err="1"/>
+              <a:rPr lang="fr-FR" dirty="0" err="1"/>
               <a:t>be</a:t>
             </a:r>
             <a:r>
-              <a:rPr lang="fr-FR"/>
+              <a:rPr lang="fr-FR" dirty="0"/>
               <a:t> </a:t>
             </a:r>
             <a:r>
-              <a:rPr lang="fr-FR" err="1"/>
+              <a:rPr lang="fr-FR" dirty="0" err="1"/>
               <a:t>represented</a:t>
             </a:r>
             <a:r>
-              <a:rPr lang="fr-FR"/>
+              <a:rPr lang="fr-FR" dirty="0"/>
               <a:t> by a </a:t>
             </a:r>
             <a:r>
-              <a:rPr lang="fr-FR" err="1"/>
+              <a:rPr lang="fr-FR" dirty="0" err="1"/>
               <a:t>sparse</a:t>
             </a:r>
             <a:r>
-              <a:rPr lang="fr-FR"/>
+              <a:rPr lang="fr-FR" dirty="0"/>
               <a:t> </a:t>
             </a:r>
             <a:r>
-              <a:rPr lang="fr-FR" err="1"/>
+              <a:rPr lang="fr-FR" dirty="0" err="1"/>
               <a:t>vector</a:t>
             </a:r>
-            <a:endParaRPr lang="fr-FR"/>
+            <a:endParaRPr lang="fr-FR" dirty="0"/>
           </a:p>
           <a:p>
             <a:pPr marL="742950" lvl="1" indent="-285750"/>
-            <a:endParaRPr lang="fr-FR"/>
+            <a:endParaRPr lang="fr-FR" dirty="0"/>
           </a:p>
           <a:p>
             <a:pPr marL="285750" indent="-285750"/>
             <a:r>
-              <a:rPr lang="fr-FR"/>
+              <a:rPr lang="fr-FR" dirty="0"/>
               <a:t>This </a:t>
             </a:r>
             <a:r>
-              <a:rPr lang="fr-FR" err="1"/>
+              <a:rPr lang="fr-FR" dirty="0" err="1"/>
               <a:t>is</a:t>
             </a:r>
             <a:r>
-              <a:rPr lang="fr-FR"/>
+              <a:rPr lang="fr-FR" dirty="0"/>
               <a:t> the key to </a:t>
             </a:r>
             <a:r>
-              <a:rPr lang="fr-FR" err="1"/>
+              <a:rPr lang="fr-FR" dirty="0" err="1"/>
               <a:t>efficiency</a:t>
             </a:r>
-            <a:endParaRPr lang="fr-FR"/>
+            <a:endParaRPr lang="fr-FR" dirty="0"/>
           </a:p>
           <a:p>
             <a:pPr marL="742950" lvl="1" indent="-285750"/>
             <a:r>
-              <a:rPr lang="fr-FR"/>
+              <a:rPr lang="fr-FR" dirty="0"/>
               <a:t>Gradient update </a:t>
             </a:r>
             <a:r>
-              <a:rPr lang="fr-FR" err="1"/>
+              <a:rPr lang="fr-FR" dirty="0" err="1"/>
               <a:t>is</a:t>
             </a:r>
             <a:r>
-              <a:rPr lang="fr-FR"/>
-              <a:t> sparse + </a:t>
-            </a:r>
-            <a:r>
-              <a:rPr lang="fr-FR" err="1"/>
+              <a:rPr lang="fr-FR" dirty="0"/>
+              <a:t> </a:t>
+            </a:r>
+            <a:r>
+              <a:rPr lang="fr-FR" dirty="0" err="1"/>
               <a:t>sparse</a:t>
             </a:r>
             <a:r>
-              <a:rPr lang="fr-FR"/>
+              <a:rPr lang="fr-FR" dirty="0"/>
+              <a:t> + </a:t>
+            </a:r>
+            <a:r>
+              <a:rPr lang="fr-FR" dirty="0" err="1"/>
+              <a:t>sparse</a:t>
+            </a:r>
+            <a:r>
+              <a:rPr lang="fr-FR" dirty="0"/>
               <a:t> </a:t>
             </a:r>
             <a:r>
-              <a:rPr lang="fr-FR" err="1"/>
+              <a:rPr lang="fr-FR" dirty="0" err="1"/>
               <a:t>operation</a:t>
             </a:r>
-            <a:endParaRPr lang="fr-FR"/>
+            <a:endParaRPr lang="fr-FR" dirty="0"/>
           </a:p>
           <a:p>
             <a:pPr marL="285750" indent="-285750"/>
-            <a:endParaRPr lang="fr-FR"/>
+            <a:endParaRPr lang="fr-FR" dirty="0"/>
           </a:p>
           <a:p>
             <a:pPr marL="285750" indent="-285750"/>
-            <a:endParaRPr lang="fr-FR"/>
+            <a:endParaRPr lang="fr-FR" dirty="0"/>
           </a:p>
           <a:p>
             <a:pPr marL="285750" indent="-285750"/>
-            <a:endParaRPr lang="en-FR"/>
+            <a:endParaRPr lang="en-FR" dirty="0"/>
           </a:p>
         </p:txBody>
       </p:sp>
@@ -6740,7 +6946,114 @@
 </p:sld>
 </file>
 
-<file path=ppt/slides/slide19.xml><?xml version="1.0" encoding="utf-8"?>
+<file path=ppt/slides/slide2.xml><?xml version="1.0" encoding="utf-8"?>
+<p:sld xmlns:a="http://schemas.openxmlformats.org/drawingml/2006/main" xmlns:r="http://schemas.openxmlformats.org/officeDocument/2006/relationships" xmlns:p="http://schemas.openxmlformats.org/presentationml/2006/main">
+  <p:cSld>
+    <p:spTree>
+      <p:nvGrpSpPr>
+        <p:cNvPr id="1" name=""/>
+        <p:cNvGrpSpPr/>
+        <p:nvPr/>
+      </p:nvGrpSpPr>
+      <p:grpSpPr>
+        <a:xfrm>
+          <a:off x="0" y="0"/>
+          <a:ext cx="0" cy="0"/>
+          <a:chOff x="0" y="0"/>
+          <a:chExt cx="0" cy="0"/>
+        </a:xfrm>
+      </p:grpSpPr>
+      <p:sp>
+        <p:nvSpPr>
+          <p:cNvPr id="2" name="Title 1">
+            <a:extLst>
+              <a:ext uri="{FF2B5EF4-FFF2-40B4-BE49-F238E27FC236}">
+                <a16:creationId xmlns:a16="http://schemas.microsoft.com/office/drawing/2014/main" id="{5A4DDBF4-8143-1349-AE89-C756F9A3CD5C}"/>
+              </a:ext>
+            </a:extLst>
+          </p:cNvPr>
+          <p:cNvSpPr>
+            <a:spLocks noGrp="1"/>
+          </p:cNvSpPr>
+          <p:nvPr>
+            <p:ph type="title"/>
+          </p:nvPr>
+        </p:nvSpPr>
+        <p:spPr/>
+        <p:txBody>
+          <a:bodyPr/>
+          <a:lstStyle/>
+          <a:p>
+            <a:r>
+              <a:rPr lang="en-FR"/>
+              <a:t>Previously on Large Scale ML</a:t>
+            </a:r>
+          </a:p>
+        </p:txBody>
+      </p:sp>
+      <p:sp>
+        <p:nvSpPr>
+          <p:cNvPr id="3" name="Content Placeholder 2">
+            <a:extLst>
+              <a:ext uri="{FF2B5EF4-FFF2-40B4-BE49-F238E27FC236}">
+                <a16:creationId xmlns:a16="http://schemas.microsoft.com/office/drawing/2014/main" id="{526EEF4E-6BF1-B34C-ADD3-43B473866EEA}"/>
+              </a:ext>
+            </a:extLst>
+          </p:cNvPr>
+          <p:cNvSpPr>
+            <a:spLocks noGrp="1"/>
+          </p:cNvSpPr>
+          <p:nvPr>
+            <p:ph idx="1"/>
+          </p:nvPr>
+        </p:nvSpPr>
+        <p:spPr/>
+        <p:txBody>
+          <a:bodyPr/>
+          <a:lstStyle/>
+          <a:p>
+            <a:endParaRPr lang="en-FR"/>
+          </a:p>
+          <a:p>
+            <a:r>
+              <a:rPr lang="en-FR"/>
+              <a:t>Definition of Large Scale ML</a:t>
+            </a:r>
+          </a:p>
+          <a:p>
+            <a:endParaRPr lang="en-FR"/>
+          </a:p>
+          <a:p>
+            <a:r>
+              <a:rPr lang="en-FR"/>
+              <a:t>Overview of Large Scale ML software and hardware paradigms</a:t>
+            </a:r>
+          </a:p>
+          <a:p>
+            <a:endParaRPr lang="en-FR"/>
+          </a:p>
+          <a:p>
+            <a:r>
+              <a:rPr lang="en-FR"/>
+              <a:t>Large Scale ML on your machine</a:t>
+            </a:r>
+          </a:p>
+        </p:txBody>
+      </p:sp>
+    </p:spTree>
+    <p:extLst>
+      <p:ext uri="{BB962C8B-B14F-4D97-AF65-F5344CB8AC3E}">
+        <p14:creationId xmlns:p14="http://schemas.microsoft.com/office/powerpoint/2010/main" val="4187502282"/>
+      </p:ext>
+    </p:extLst>
+  </p:cSld>
+  <p:clrMapOvr>
+    <a:masterClrMapping/>
+  </p:clrMapOvr>
+</p:sld>
+</file>
+
+<file path=ppt/slides/slide20.xml><?xml version="1.0" encoding="utf-8"?>
 <p:sld xmlns:a="http://schemas.openxmlformats.org/drawingml/2006/main" xmlns:r="http://schemas.openxmlformats.org/officeDocument/2006/relationships" xmlns:p="http://schemas.openxmlformats.org/presentationml/2006/main">
   <p:cSld>
     <p:spTree>
@@ -8005,114 +8318,7 @@
 </p:sld>
 </file>
 
-<file path=ppt/slides/slide2.xml><?xml version="1.0" encoding="utf-8"?>
-<p:sld xmlns:a="http://schemas.openxmlformats.org/drawingml/2006/main" xmlns:r="http://schemas.openxmlformats.org/officeDocument/2006/relationships" xmlns:p="http://schemas.openxmlformats.org/presentationml/2006/main">
-  <p:cSld>
-    <p:spTree>
-      <p:nvGrpSpPr>
-        <p:cNvPr id="1" name=""/>
-        <p:cNvGrpSpPr/>
-        <p:nvPr/>
-      </p:nvGrpSpPr>
-      <p:grpSpPr>
-        <a:xfrm>
-          <a:off x="0" y="0"/>
-          <a:ext cx="0" cy="0"/>
-          <a:chOff x="0" y="0"/>
-          <a:chExt cx="0" cy="0"/>
-        </a:xfrm>
-      </p:grpSpPr>
-      <p:sp>
-        <p:nvSpPr>
-          <p:cNvPr id="2" name="Title 1">
-            <a:extLst>
-              <a:ext uri="{FF2B5EF4-FFF2-40B4-BE49-F238E27FC236}">
-                <a16:creationId xmlns:a16="http://schemas.microsoft.com/office/drawing/2014/main" id="{5A4DDBF4-8143-1349-AE89-C756F9A3CD5C}"/>
-              </a:ext>
-            </a:extLst>
-          </p:cNvPr>
-          <p:cNvSpPr>
-            <a:spLocks noGrp="1"/>
-          </p:cNvSpPr>
-          <p:nvPr>
-            <p:ph type="title"/>
-          </p:nvPr>
-        </p:nvSpPr>
-        <p:spPr/>
-        <p:txBody>
-          <a:bodyPr/>
-          <a:lstStyle/>
-          <a:p>
-            <a:r>
-              <a:rPr lang="en-FR"/>
-              <a:t>Previously on Large Scale ML</a:t>
-            </a:r>
-          </a:p>
-        </p:txBody>
-      </p:sp>
-      <p:sp>
-        <p:nvSpPr>
-          <p:cNvPr id="3" name="Content Placeholder 2">
-            <a:extLst>
-              <a:ext uri="{FF2B5EF4-FFF2-40B4-BE49-F238E27FC236}">
-                <a16:creationId xmlns:a16="http://schemas.microsoft.com/office/drawing/2014/main" id="{526EEF4E-6BF1-B34C-ADD3-43B473866EEA}"/>
-              </a:ext>
-            </a:extLst>
-          </p:cNvPr>
-          <p:cNvSpPr>
-            <a:spLocks noGrp="1"/>
-          </p:cNvSpPr>
-          <p:nvPr>
-            <p:ph idx="1"/>
-          </p:nvPr>
-        </p:nvSpPr>
-        <p:spPr/>
-        <p:txBody>
-          <a:bodyPr/>
-          <a:lstStyle/>
-          <a:p>
-            <a:endParaRPr lang="en-FR"/>
-          </a:p>
-          <a:p>
-            <a:r>
-              <a:rPr lang="en-FR"/>
-              <a:t>Definition of Large Scale ML</a:t>
-            </a:r>
-          </a:p>
-          <a:p>
-            <a:endParaRPr lang="en-FR"/>
-          </a:p>
-          <a:p>
-            <a:r>
-              <a:rPr lang="en-FR"/>
-              <a:t>Overview of Large Scale ML software and hardware paradigms</a:t>
-            </a:r>
-          </a:p>
-          <a:p>
-            <a:endParaRPr lang="en-FR"/>
-          </a:p>
-          <a:p>
-            <a:r>
-              <a:rPr lang="en-FR"/>
-              <a:t>Large Scale ML on your machine</a:t>
-            </a:r>
-          </a:p>
-        </p:txBody>
-      </p:sp>
-    </p:spTree>
-    <p:extLst>
-      <p:ext uri="{BB962C8B-B14F-4D97-AF65-F5344CB8AC3E}">
-        <p14:creationId xmlns:p14="http://schemas.microsoft.com/office/powerpoint/2010/main" val="4187502282"/>
-      </p:ext>
-    </p:extLst>
-  </p:cSld>
-  <p:clrMapOvr>
-    <a:masterClrMapping/>
-  </p:clrMapOvr>
-</p:sld>
-</file>
-
-<file path=ppt/slides/slide20.xml><?xml version="1.0" encoding="utf-8"?>
+<file path=ppt/slides/slide21.xml><?xml version="1.0" encoding="utf-8"?>
 <p:sld xmlns:a="http://schemas.openxmlformats.org/drawingml/2006/main" xmlns:r="http://schemas.openxmlformats.org/officeDocument/2006/relationships" xmlns:p="http://schemas.openxmlformats.org/presentationml/2006/main">
   <p:cSld>
     <p:spTree>
@@ -8662,7 +8868,7 @@
 </p:sld>
 </file>
 
-<file path=ppt/slides/slide21.xml><?xml version="1.0" encoding="utf-8"?>
+<file path=ppt/slides/slide22.xml><?xml version="1.0" encoding="utf-8"?>
 <p:sld xmlns:a="http://schemas.openxmlformats.org/drawingml/2006/main" xmlns:r="http://schemas.openxmlformats.org/officeDocument/2006/relationships" xmlns:p="http://schemas.openxmlformats.org/presentationml/2006/main">
   <p:cSld>
     <p:spTree>
@@ -8710,8 +8916,8 @@
           </a:p>
         </p:txBody>
       </p:sp>
-      <mc:AlternateContent xmlns:mc="http://schemas.openxmlformats.org/markup-compatibility/2006" xmlns:a14="http://schemas.microsoft.com/office/drawing/2010/main">
-        <mc:Choice Requires="a14">
+      <mc:AlternateContent xmlns:mc="http://schemas.openxmlformats.org/markup-compatibility/2006">
+        <mc:Choice xmlns:a14="http://schemas.microsoft.com/office/drawing/2010/main" Requires="a14">
           <p:sp>
             <p:nvSpPr>
               <p:cNvPr id="5" name="Content Placeholder 4">
@@ -8736,11 +8942,11 @@
               <a:lstStyle/>
               <a:p>
                 <a:r>
-                  <a:rPr lang="en-GB"/>
+                  <a:rPr lang="en-GB" dirty="0"/>
                   <a:t>Let’s concentrate on the first dimension of the model</a:t>
                 </a:r>
                 <a:r>
-                  <a:rPr lang="fr-FR"/>
+                  <a:rPr lang="fr-FR" dirty="0"/>
                   <a:t> </a:t>
                 </a:r>
                 <a14:m>
@@ -8772,19 +8978,19 @@
                     </m:sSub>
                   </m:oMath>
                 </a14:m>
-                <a:endParaRPr lang="fr-FR" b="0"/>
+                <a:endParaRPr lang="fr-FR" b="0" dirty="0"/>
               </a:p>
               <a:p>
-                <a:endParaRPr lang="fr-FR" b="0"/>
+                <a:endParaRPr lang="fr-FR" b="0" dirty="0"/>
               </a:p>
               <a:p>
                 <a:r>
-                  <a:rPr lang="en-GB"/>
+                  <a:rPr lang="en-GB" dirty="0"/>
                   <a:t>Suppose we have an update with the first dimension being zero</a:t>
                 </a:r>
               </a:p>
               <a:p>
-                <a:endParaRPr lang="en-GB"/>
+                <a:endParaRPr lang="en-GB" dirty="0"/>
               </a:p>
               <a:p>
                 <a:pPr marL="0" indent="0">
@@ -9035,18 +9241,52 @@
                             </a:rPr>
                             <m:t>+</m:t>
                           </m:r>
-                          <m:r>
-                            <a:rPr lang="fr-FR" b="0" i="1" smtClean="0">
-                              <a:solidFill>
-                                <a:schemeClr val="tx1">
-                                  <a:lumMod val="65000"/>
-                                  <a:lumOff val="35000"/>
-                                </a:schemeClr>
-                              </a:solidFill>
-                              <a:latin typeface="Cambria Math" panose="02040503050406030204" pitchFamily="18" charset="0"/>
-                            </a:rPr>
-                            <m:t>𝜆𝜃</m:t>
-                          </m:r>
+                          <m:sSub>
+                            <m:sSubPr>
+                              <m:ctrlPr>
+                                <a:rPr lang="fr-FR" i="1">
+                                  <a:solidFill>
+                                    <a:schemeClr val="tx1">
+                                      <a:lumMod val="65000"/>
+                                      <a:lumOff val="35000"/>
+                                    </a:schemeClr>
+                                  </a:solidFill>
+                                  <a:latin typeface="Cambria Math" panose="02040503050406030204" pitchFamily="18" charset="0"/>
+                                  <a:ea typeface="Cambria Math" panose="02040503050406030204" pitchFamily="18" charset="0"/>
+                                </a:rPr>
+                              </m:ctrlPr>
+                            </m:sSubPr>
+                            <m:e>
+                              <m:r>
+                                <a:rPr lang="fr-FR" i="1">
+                                  <a:solidFill>
+                                    <a:schemeClr val="tx1">
+                                      <a:lumMod val="65000"/>
+                                      <a:lumOff val="35000"/>
+                                    </a:schemeClr>
+                                  </a:solidFill>
+                                  <a:latin typeface="Cambria Math" panose="02040503050406030204" pitchFamily="18" charset="0"/>
+                                  <a:ea typeface="Cambria Math" panose="02040503050406030204" pitchFamily="18" charset="0"/>
+                                </a:rPr>
+                                <m:t>𝜆𝜃</m:t>
+                              </m:r>
+                            </m:e>
+                            <m:sub>
+                              <m:r>
+                                <a:rPr lang="fr-FR" i="1">
+                                  <a:solidFill>
+                                    <a:schemeClr val="tx1">
+                                      <a:lumMod val="65000"/>
+                                      <a:lumOff val="35000"/>
+                                    </a:schemeClr>
+                                  </a:solidFill>
+                                  <a:latin typeface="Cambria Math" panose="02040503050406030204" pitchFamily="18" charset="0"/>
+                                  <a:ea typeface="Cambria Math" panose="02040503050406030204" pitchFamily="18" charset="0"/>
+                                </a:rPr>
+                                <m:t>0</m:t>
+                              </m:r>
+                            </m:sub>
+                          </m:sSub>
                         </m:e>
                       </m:d>
                     </m:oMath>
@@ -9179,31 +9419,52 @@
                         </a:rPr>
                         <m:t>𝛼</m:t>
                       </m:r>
-                      <m:r>
-                        <a:rPr lang="fr-FR" b="0" i="1" smtClean="0">
-                          <a:solidFill>
-                            <a:schemeClr val="tx1">
-                              <a:lumMod val="65000"/>
-                              <a:lumOff val="35000"/>
-                            </a:schemeClr>
-                          </a:solidFill>
-                          <a:latin typeface="Cambria Math" panose="02040503050406030204" pitchFamily="18" charset="0"/>
-                          <a:ea typeface="Cambria Math" panose="02040503050406030204" pitchFamily="18" charset="0"/>
-                        </a:rPr>
-                        <m:t> </m:t>
-                      </m:r>
-                      <m:r>
-                        <a:rPr lang="fr-FR" b="0" i="1" smtClean="0">
-                          <a:solidFill>
-                            <a:schemeClr val="tx1">
-                              <a:lumMod val="65000"/>
-                              <a:lumOff val="35000"/>
-                            </a:schemeClr>
-                          </a:solidFill>
-                          <a:latin typeface="Cambria Math" panose="02040503050406030204" pitchFamily="18" charset="0"/>
-                        </a:rPr>
-                        <m:t>𝜆𝜃</m:t>
-                      </m:r>
+                      <m:sSub>
+                        <m:sSubPr>
+                          <m:ctrlPr>
+                            <a:rPr lang="fr-FR" i="1">
+                              <a:solidFill>
+                                <a:schemeClr val="tx1">
+                                  <a:lumMod val="65000"/>
+                                  <a:lumOff val="35000"/>
+                                </a:schemeClr>
+                              </a:solidFill>
+                              <a:latin typeface="Cambria Math" panose="02040503050406030204" pitchFamily="18" charset="0"/>
+                              <a:ea typeface="Cambria Math" panose="02040503050406030204" pitchFamily="18" charset="0"/>
+                            </a:rPr>
+                          </m:ctrlPr>
+                        </m:sSubPr>
+                        <m:e>
+                          <m:r>
+                            <a:rPr lang="fr-FR" i="1">
+                              <a:solidFill>
+                                <a:schemeClr val="tx1">
+                                  <a:lumMod val="65000"/>
+                                  <a:lumOff val="35000"/>
+                                </a:schemeClr>
+                              </a:solidFill>
+                              <a:latin typeface="Cambria Math" panose="02040503050406030204" pitchFamily="18" charset="0"/>
+                              <a:ea typeface="Cambria Math" panose="02040503050406030204" pitchFamily="18" charset="0"/>
+                            </a:rPr>
+                            <m:t>𝜆𝜃</m:t>
+                          </m:r>
+                        </m:e>
+                        <m:sub>
+                          <m:r>
+                            <a:rPr lang="fr-FR" i="1">
+                              <a:solidFill>
+                                <a:schemeClr val="tx1">
+                                  <a:lumMod val="65000"/>
+                                  <a:lumOff val="35000"/>
+                                </a:schemeClr>
+                              </a:solidFill>
+                              <a:latin typeface="Cambria Math" panose="02040503050406030204" pitchFamily="18" charset="0"/>
+                              <a:ea typeface="Cambria Math" panose="02040503050406030204" pitchFamily="18" charset="0"/>
+                            </a:rPr>
+                            <m:t>0</m:t>
+                          </m:r>
+                        </m:sub>
+                      </m:sSub>
                     </m:oMath>
                     <m:oMath xmlns:m="http://schemas.openxmlformats.org/officeDocument/2006/math">
                       <m:sSub>
@@ -9350,7 +9611,7 @@
                     </m:oMath>
                   </m:oMathPara>
                 </a14:m>
-                <a:endParaRPr lang="fr-FR" i="1">
+                <a:endParaRPr lang="fr-FR" i="1" dirty="0">
                   <a:solidFill>
                     <a:schemeClr val="tx1">
                       <a:lumMod val="65000"/>
@@ -9364,30 +9625,30 @@
                 <a:pPr marL="0" indent="0">
                   <a:buNone/>
                 </a:pPr>
-                <a:endParaRPr lang="fr-FR" i="1">
+                <a:endParaRPr lang="fr-FR" i="1" dirty="0">
                   <a:latin typeface="Cambria Math" panose="02040503050406030204" pitchFamily="18" charset="0"/>
                 </a:endParaRPr>
               </a:p>
               <a:p>
                 <a:r>
-                  <a:rPr lang="fr-FR" err="1"/>
+                  <a:rPr lang="fr-FR" dirty="0" err="1"/>
                   <a:t>After</a:t>
                 </a:r>
                 <a:r>
-                  <a:rPr lang="fr-FR"/>
+                  <a:rPr lang="fr-FR" dirty="0"/>
                   <a:t> </a:t>
                 </a:r>
                 <a:r>
-                  <a:rPr lang="fr-FR" err="1"/>
+                  <a:rPr lang="fr-FR" dirty="0" err="1"/>
                   <a:t>two</a:t>
                 </a:r>
                 <a:r>
-                  <a:rPr lang="fr-FR"/>
+                  <a:rPr lang="fr-FR" dirty="0"/>
                   <a:t> updates</a:t>
                 </a:r>
               </a:p>
               <a:p>
-                <a:endParaRPr lang="fr-FR"/>
+                <a:endParaRPr lang="fr-FR" dirty="0"/>
               </a:p>
               <a:p>
                 <a:pPr marL="0" indent="0">
@@ -9581,7 +9842,7 @@
                     </m:oMath>
                   </m:oMathPara>
                 </a14:m>
-                <a:endParaRPr lang="en-GB">
+                <a:endParaRPr lang="en-GB" dirty="0">
                   <a:solidFill>
                     <a:schemeClr val="tx1">
                       <a:lumMod val="65000"/>
@@ -9593,7 +9854,7 @@
             </p:txBody>
           </p:sp>
         </mc:Choice>
-        <mc:Fallback xmlns="">
+        <mc:Fallback>
           <p:sp>
             <p:nvSpPr>
               <p:cNvPr id="5" name="Content Placeholder 4">
@@ -9614,7 +9875,7 @@
               <a:blipFill>
                 <a:blip r:embed="rId2"/>
                 <a:stretch>
-                  <a:fillRect l="-812" t="-2801"/>
+                  <a:fillRect l="-812" t="-2661"/>
                 </a:stretch>
               </a:blipFill>
             </p:spPr>
@@ -9646,7 +9907,7 @@
 </p:sld>
 </file>
 
-<file path=ppt/slides/slide22.xml><?xml version="1.0" encoding="utf-8"?>
+<file path=ppt/slides/slide23.xml><?xml version="1.0" encoding="utf-8"?>
 <p:sld xmlns:a="http://schemas.openxmlformats.org/drawingml/2006/main" xmlns:r="http://schemas.openxmlformats.org/officeDocument/2006/relationships" xmlns:p="http://schemas.openxmlformats.org/presentationml/2006/main">
   <p:cSld>
     <p:spTree>
@@ -9718,36 +9979,32 @@
               <a:lstStyle/>
               <a:p>
                 <a:r>
-                  <a:rPr lang="fr-FR"/>
-                  <a:t>We </a:t>
+                  <a:rPr lang="fr-FR" dirty="0" err="1"/>
+                  <a:t>We</a:t>
                 </a:r>
                 <a:r>
-                  <a:rPr lang="fr-FR" err="1"/>
-                  <a:t>can</a:t>
+                  <a:rPr lang="fr-FR" dirty="0"/>
+                  <a:t> can </a:t>
                 </a:r>
                 <a:r>
-                  <a:rPr lang="fr-FR"/>
+                  <a:rPr lang="fr-FR" dirty="0" err="1"/>
+                  <a:t>then</a:t>
+                </a:r>
+                <a:r>
+                  <a:rPr lang="fr-FR" dirty="0"/>
                   <a:t> </a:t>
                 </a:r>
                 <a:r>
-                  <a:rPr lang="fr-FR" err="1"/>
-                  <a:t>then</a:t>
-                </a:r>
-                <a:r>
-                  <a:rPr lang="fr-FR"/>
-                  <a:t> </a:t>
-                </a:r>
-                <a:r>
-                  <a:rPr lang="fr-FR" err="1"/>
+                  <a:rPr lang="fr-FR" dirty="0" err="1"/>
                   <a:t>compress</a:t>
                 </a:r>
                 <a:r>
-                  <a:rPr lang="fr-FR"/>
+                  <a:rPr lang="fr-FR" dirty="0"/>
                   <a:t> K computations</a:t>
                 </a:r>
               </a:p>
               <a:p>
-                <a:endParaRPr lang="fr-FR" b="0"/>
+                <a:endParaRPr lang="fr-FR" b="0" dirty="0"/>
               </a:p>
               <a:p>
                 <a:pPr marL="0" indent="0">
@@ -9941,7 +10198,7 @@
                     </m:oMath>
                   </m:oMathPara>
                 </a14:m>
-                <a:endParaRPr lang="fr-FR" b="0">
+                <a:endParaRPr lang="fr-FR" b="0" dirty="0">
                   <a:solidFill>
                     <a:schemeClr val="tx1">
                       <a:lumMod val="65000"/>
@@ -9955,20 +10212,20 @@
                 <a:pPr marL="0" indent="0">
                   <a:buNone/>
                 </a:pPr>
-                <a:endParaRPr lang="en-GB"/>
+                <a:endParaRPr lang="en-GB" dirty="0"/>
               </a:p>
               <a:p>
                 <a:r>
-                  <a:rPr lang="en-GB"/>
+                  <a:rPr lang="en-GB" dirty="0"/>
                   <a:t>We remember how many steps we didn’t update a particular dimension</a:t>
                 </a:r>
               </a:p>
               <a:p>
-                <a:endParaRPr lang="en-GB"/>
+                <a:endParaRPr lang="en-GB" dirty="0"/>
               </a:p>
               <a:p>
                 <a:r>
-                  <a:rPr lang="en-GB"/>
+                  <a:rPr lang="en-GB" dirty="0"/>
                   <a:t>Catch up when needed</a:t>
                 </a:r>
               </a:p>
@@ -9976,7 +10233,7 @@
                 <a:pPr marL="0" indent="0">
                   <a:buNone/>
                 </a:pPr>
-                <a:endParaRPr lang="en-GB"/>
+                <a:endParaRPr lang="en-GB" dirty="0"/>
               </a:p>
             </p:txBody>
           </p:sp>
@@ -10034,7 +10291,7 @@
 </p:sld>
 </file>
 
-<file path=ppt/slides/slide23.xml><?xml version="1.0" encoding="utf-8"?>
+<file path=ppt/slides/slide24.xml><?xml version="1.0" encoding="utf-8"?>
 <p:sld xmlns:a="http://schemas.openxmlformats.org/drawingml/2006/main" xmlns:r="http://schemas.openxmlformats.org/officeDocument/2006/relationships" xmlns:p="http://schemas.openxmlformats.org/presentationml/2006/main">
   <p:cSld>
     <p:spTree>
@@ -10125,7 +10382,7 @@
 </p:sld>
 </file>
 
-<file path=ppt/slides/slide24.xml><?xml version="1.0" encoding="utf-8"?>
+<file path=ppt/slides/slide25.xml><?xml version="1.0" encoding="utf-8"?>
 <p:sld xmlns:a="http://schemas.openxmlformats.org/drawingml/2006/main" xmlns:r="http://schemas.openxmlformats.org/officeDocument/2006/relationships" xmlns:p="http://schemas.openxmlformats.org/presentationml/2006/main">
   <p:cSld>
     <p:spTree>
@@ -10173,8 +10430,8 @@
           </a:p>
         </p:txBody>
       </p:sp>
-      <mc:AlternateContent xmlns:mc="http://schemas.openxmlformats.org/markup-compatibility/2006">
-        <mc:Choice xmlns:a14="http://schemas.microsoft.com/office/drawing/2010/main" Requires="a14">
+      <mc:AlternateContent xmlns:mc="http://schemas.openxmlformats.org/markup-compatibility/2006" xmlns:a14="http://schemas.microsoft.com/office/drawing/2010/main">
+        <mc:Choice Requires="a14">
           <p:sp>
             <p:nvSpPr>
               <p:cNvPr id="5" name="Content Placeholder 4">
@@ -10261,7 +10518,7 @@
             </p:txBody>
           </p:sp>
         </mc:Choice>
-        <mc:Fallback>
+        <mc:Fallback xmlns="">
           <p:sp>
             <p:nvSpPr>
               <p:cNvPr id="5" name="Content Placeholder 4">
@@ -10374,7 +10631,7 @@
 </p:sld>
 </file>
 
-<file path=ppt/slides/slide25.xml><?xml version="1.0" encoding="utf-8"?>
+<file path=ppt/slides/slide26.xml><?xml version="1.0" encoding="utf-8"?>
 <p:sld xmlns:a="http://schemas.openxmlformats.org/drawingml/2006/main" xmlns:r="http://schemas.openxmlformats.org/officeDocument/2006/relationships" xmlns:p="http://schemas.openxmlformats.org/presentationml/2006/main">
   <p:cSld>
     <p:spTree>
@@ -10920,7 +11177,7 @@
 </p:sld>
 </file>
 
-<file path=ppt/slides/slide26.xml><?xml version="1.0" encoding="utf-8"?>
+<file path=ppt/slides/slide27.xml><?xml version="1.0" encoding="utf-8"?>
 <p:sld xmlns:a="http://schemas.openxmlformats.org/drawingml/2006/main" xmlns:r="http://schemas.openxmlformats.org/officeDocument/2006/relationships" xmlns:p="http://schemas.openxmlformats.org/presentationml/2006/main">
   <p:cSld>
     <p:spTree>
@@ -11087,97 +11344,6 @@
 </p:sld>
 </file>
 
-<file path=ppt/slides/slide27.xml><?xml version="1.0" encoding="utf-8"?>
-<p:sld xmlns:a="http://schemas.openxmlformats.org/drawingml/2006/main" xmlns:r="http://schemas.openxmlformats.org/officeDocument/2006/relationships" xmlns:p="http://schemas.openxmlformats.org/presentationml/2006/main">
-  <p:cSld>
-    <p:spTree>
-      <p:nvGrpSpPr>
-        <p:cNvPr id="1" name=""/>
-        <p:cNvGrpSpPr/>
-        <p:nvPr/>
-      </p:nvGrpSpPr>
-      <p:grpSpPr>
-        <a:xfrm>
-          <a:off x="0" y="0"/>
-          <a:ext cx="0" cy="0"/>
-          <a:chOff x="0" y="0"/>
-          <a:chExt cx="0" cy="0"/>
-        </a:xfrm>
-      </p:grpSpPr>
-      <p:sp>
-        <p:nvSpPr>
-          <p:cNvPr id="2" name="Title 1">
-            <a:extLst>
-              <a:ext uri="{FF2B5EF4-FFF2-40B4-BE49-F238E27FC236}">
-                <a16:creationId xmlns:a16="http://schemas.microsoft.com/office/drawing/2014/main" id="{5A4DDBF4-8143-1349-AE89-C756F9A3CD5C}"/>
-              </a:ext>
-            </a:extLst>
-          </p:cNvPr>
-          <p:cNvSpPr>
-            <a:spLocks noGrp="1"/>
-          </p:cNvSpPr>
-          <p:nvPr>
-            <p:ph type="title"/>
-          </p:nvPr>
-        </p:nvSpPr>
-        <p:spPr/>
-        <p:txBody>
-          <a:bodyPr>
-            <a:normAutofit/>
-          </a:bodyPr>
-          <a:lstStyle/>
-          <a:p>
-            <a:r>
-              <a:rPr lang="en-GB"/>
-              <a:t>Nice trick: Stochastic Quantization</a:t>
-            </a:r>
-            <a:endParaRPr lang="en-FR"/>
-          </a:p>
-        </p:txBody>
-      </p:sp>
-      <p:pic>
-        <p:nvPicPr>
-          <p:cNvPr id="9" name="Picture 8" descr="A screenshot of a cell phone&#10;&#10;Description automatically generated">
-            <a:extLst>
-              <a:ext uri="{FF2B5EF4-FFF2-40B4-BE49-F238E27FC236}">
-                <a16:creationId xmlns:a16="http://schemas.microsoft.com/office/drawing/2014/main" id="{9036812F-1317-0446-8526-3939B0DA8C27}"/>
-              </a:ext>
-            </a:extLst>
-          </p:cNvPr>
-          <p:cNvPicPr>
-            <a:picLocks noChangeAspect="1"/>
-          </p:cNvPicPr>
-          <p:nvPr/>
-        </p:nvPicPr>
-        <p:blipFill>
-          <a:blip r:embed="rId2"/>
-          <a:stretch>
-            <a:fillRect/>
-          </a:stretch>
-        </p:blipFill>
-        <p:spPr>
-          <a:xfrm>
-            <a:off x="1911350" y="1840006"/>
-            <a:ext cx="8369300" cy="4038600"/>
-          </a:xfrm>
-          <a:prstGeom prst="rect">
-            <a:avLst/>
-          </a:prstGeom>
-        </p:spPr>
-      </p:pic>
-    </p:spTree>
-    <p:extLst>
-      <p:ext uri="{BB962C8B-B14F-4D97-AF65-F5344CB8AC3E}">
-        <p14:creationId xmlns:p14="http://schemas.microsoft.com/office/powerpoint/2010/main" val="2323177797"/>
-      </p:ext>
-    </p:extLst>
-  </p:cSld>
-  <p:clrMapOvr>
-    <a:masterClrMapping/>
-  </p:clrMapOvr>
-</p:sld>
-</file>
-
 <file path=ppt/slides/slide28.xml><?xml version="1.0" encoding="utf-8"?>
 <p:sld xmlns:a="http://schemas.openxmlformats.org/drawingml/2006/main" xmlns:r="http://schemas.openxmlformats.org/officeDocument/2006/relationships" xmlns:p="http://schemas.openxmlformats.org/presentationml/2006/main">
   <p:cSld>
@@ -11228,10 +11394,10 @@
       </p:sp>
       <p:pic>
         <p:nvPicPr>
-          <p:cNvPr id="4" name="Picture 3" descr="A close up of a map&#10;&#10;Description automatically generated">
+          <p:cNvPr id="9" name="Picture 8" descr="A screenshot of a cell phone&#10;&#10;Description automatically generated">
             <a:extLst>
               <a:ext uri="{FF2B5EF4-FFF2-40B4-BE49-F238E27FC236}">
-                <a16:creationId xmlns:a16="http://schemas.microsoft.com/office/drawing/2014/main" id="{21BD285D-7988-B246-8305-DE559A2FC3FE}"/>
+                <a16:creationId xmlns:a16="http://schemas.microsoft.com/office/drawing/2014/main" id="{9036812F-1317-0446-8526-3939B0DA8C27}"/>
               </a:ext>
             </a:extLst>
           </p:cNvPr>
@@ -11248,8 +11414,8 @@
         </p:blipFill>
         <p:spPr>
           <a:xfrm>
-            <a:off x="2596403" y="1609289"/>
-            <a:ext cx="6242797" cy="4727451"/>
+            <a:off x="1911350" y="1840006"/>
+            <a:ext cx="8369300" cy="4038600"/>
           </a:xfrm>
           <a:prstGeom prst="rect">
             <a:avLst/>
@@ -11259,7 +11425,7 @@
     </p:spTree>
     <p:extLst>
       <p:ext uri="{BB962C8B-B14F-4D97-AF65-F5344CB8AC3E}">
-        <p14:creationId xmlns:p14="http://schemas.microsoft.com/office/powerpoint/2010/main" val="4197499902"/>
+        <p14:creationId xmlns:p14="http://schemas.microsoft.com/office/powerpoint/2010/main" val="2323177797"/>
       </p:ext>
     </p:extLst>
   </p:cSld>
@@ -11311,51 +11477,46 @@
           <a:p>
             <a:r>
               <a:rPr lang="en-GB"/>
-              <a:t>How about synchronization ?</a:t>
+              <a:t>Nice trick: Stochastic Quantization</a:t>
             </a:r>
             <a:endParaRPr lang="en-FR"/>
           </a:p>
         </p:txBody>
       </p:sp>
-      <p:sp>
-        <p:nvSpPr>
-          <p:cNvPr id="7" name="Content Placeholder 6">
+      <p:pic>
+        <p:nvPicPr>
+          <p:cNvPr id="4" name="Picture 3" descr="A close up of a map&#10;&#10;Description automatically generated">
             <a:extLst>
               <a:ext uri="{FF2B5EF4-FFF2-40B4-BE49-F238E27FC236}">
-                <a16:creationId xmlns:a16="http://schemas.microsoft.com/office/drawing/2014/main" id="{D19830BC-9D18-FA41-A9C7-901067D908A5}"/>
+                <a16:creationId xmlns:a16="http://schemas.microsoft.com/office/drawing/2014/main" id="{21BD285D-7988-B246-8305-DE559A2FC3FE}"/>
               </a:ext>
             </a:extLst>
           </p:cNvPr>
-          <p:cNvSpPr>
-            <a:spLocks noGrp="1"/>
-          </p:cNvSpPr>
-          <p:nvPr>
-            <p:ph idx="1"/>
-          </p:nvPr>
-        </p:nvSpPr>
-        <p:spPr/>
-        <p:txBody>
-          <a:bodyPr/>
-          <a:lstStyle/>
-          <a:p>
-            <a:r>
-              <a:rPr lang="en-FR"/>
-              <a:t>We will talk about it a bit later but here is simple solution</a:t>
-            </a:r>
-          </a:p>
-          <a:p>
-            <a:pPr lvl="1"/>
-            <a:r>
-              <a:rPr lang="en-FR"/>
-              <a:t>Drop the gradients of slow workers by imposing a timeout to the computation</a:t>
-            </a:r>
-          </a:p>
-        </p:txBody>
-      </p:sp>
+          <p:cNvPicPr>
+            <a:picLocks noChangeAspect="1"/>
+          </p:cNvPicPr>
+          <p:nvPr/>
+        </p:nvPicPr>
+        <p:blipFill>
+          <a:blip r:embed="rId2"/>
+          <a:stretch>
+            <a:fillRect/>
+          </a:stretch>
+        </p:blipFill>
+        <p:spPr>
+          <a:xfrm>
+            <a:off x="2596403" y="1609289"/>
+            <a:ext cx="6242797" cy="4727451"/>
+          </a:xfrm>
+          <a:prstGeom prst="rect">
+            <a:avLst/>
+          </a:prstGeom>
+        </p:spPr>
+      </p:pic>
     </p:spTree>
     <p:extLst>
       <p:ext uri="{BB962C8B-B14F-4D97-AF65-F5344CB8AC3E}">
-        <p14:creationId xmlns:p14="http://schemas.microsoft.com/office/powerpoint/2010/main" val="2353596618"/>
+        <p14:creationId xmlns:p14="http://schemas.microsoft.com/office/powerpoint/2010/main" val="4197499902"/>
       </p:ext>
     </p:extLst>
   </p:cSld>
@@ -11483,6 +11644,253 @@
     <p:extLst>
       <p:ext uri="{BB962C8B-B14F-4D97-AF65-F5344CB8AC3E}">
         <p14:creationId xmlns:p14="http://schemas.microsoft.com/office/powerpoint/2010/main" val="2281986131"/>
+      </p:ext>
+    </p:extLst>
+  </p:cSld>
+  <p:clrMapOvr>
+    <a:masterClrMapping/>
+  </p:clrMapOvr>
+</p:sld>
+</file>
+
+<file path=ppt/slides/slide30.xml><?xml version="1.0" encoding="utf-8"?>
+<p:sld xmlns:a="http://schemas.openxmlformats.org/drawingml/2006/main" xmlns:r="http://schemas.openxmlformats.org/officeDocument/2006/relationships" xmlns:p="http://schemas.openxmlformats.org/presentationml/2006/main">
+  <p:cSld>
+    <p:spTree>
+      <p:nvGrpSpPr>
+        <p:cNvPr id="1" name=""/>
+        <p:cNvGrpSpPr/>
+        <p:nvPr/>
+      </p:nvGrpSpPr>
+      <p:grpSpPr>
+        <a:xfrm>
+          <a:off x="0" y="0"/>
+          <a:ext cx="0" cy="0"/>
+          <a:chOff x="0" y="0"/>
+          <a:chExt cx="0" cy="0"/>
+        </a:xfrm>
+      </p:grpSpPr>
+      <p:sp>
+        <p:nvSpPr>
+          <p:cNvPr id="2" name="Title 1">
+            <a:extLst>
+              <a:ext uri="{FF2B5EF4-FFF2-40B4-BE49-F238E27FC236}">
+                <a16:creationId xmlns:a16="http://schemas.microsoft.com/office/drawing/2014/main" id="{5A4DDBF4-8143-1349-AE89-C756F9A3CD5C}"/>
+              </a:ext>
+            </a:extLst>
+          </p:cNvPr>
+          <p:cNvSpPr>
+            <a:spLocks noGrp="1"/>
+          </p:cNvSpPr>
+          <p:nvPr>
+            <p:ph type="title"/>
+          </p:nvPr>
+        </p:nvSpPr>
+        <p:spPr/>
+        <p:txBody>
+          <a:bodyPr>
+            <a:normAutofit/>
+          </a:bodyPr>
+          <a:lstStyle/>
+          <a:p>
+            <a:r>
+              <a:rPr lang="en-GB"/>
+              <a:t>How about synchronization ?</a:t>
+            </a:r>
+            <a:endParaRPr lang="en-FR"/>
+          </a:p>
+        </p:txBody>
+      </p:sp>
+      <p:sp>
+        <p:nvSpPr>
+          <p:cNvPr id="7" name="Content Placeholder 6">
+            <a:extLst>
+              <a:ext uri="{FF2B5EF4-FFF2-40B4-BE49-F238E27FC236}">
+                <a16:creationId xmlns:a16="http://schemas.microsoft.com/office/drawing/2014/main" id="{D19830BC-9D18-FA41-A9C7-901067D908A5}"/>
+              </a:ext>
+            </a:extLst>
+          </p:cNvPr>
+          <p:cNvSpPr>
+            <a:spLocks noGrp="1"/>
+          </p:cNvSpPr>
+          <p:nvPr>
+            <p:ph idx="1"/>
+          </p:nvPr>
+        </p:nvSpPr>
+        <p:spPr/>
+        <p:txBody>
+          <a:bodyPr/>
+          <a:lstStyle/>
+          <a:p>
+            <a:r>
+              <a:rPr lang="en-FR" dirty="0"/>
+              <a:t>We will talk about it a bit later but here is simple solution</a:t>
+            </a:r>
+          </a:p>
+          <a:p>
+            <a:pPr lvl="1"/>
+            <a:r>
+              <a:rPr lang="en-FR" dirty="0"/>
+              <a:t>Drop the gradients of slow workers by imposing a timeout to the computation</a:t>
+            </a:r>
+            <a:endParaRPr lang="fr-FR" dirty="0"/>
+          </a:p>
+          <a:p>
+            <a:pPr lvl="1"/>
+            <a:endParaRPr lang="fr-FR" dirty="0"/>
+          </a:p>
+          <a:p>
+            <a:r>
+              <a:rPr lang="fr-FR" dirty="0" err="1"/>
+              <a:t>Other</a:t>
+            </a:r>
+            <a:r>
+              <a:rPr lang="fr-FR" dirty="0"/>
+              <a:t> ‘</a:t>
+            </a:r>
+            <a:r>
+              <a:rPr lang="fr-FR" dirty="0" err="1"/>
+              <a:t>Synchronization</a:t>
+            </a:r>
+            <a:r>
+              <a:rPr lang="fr-FR" dirty="0"/>
+              <a:t>’ </a:t>
+            </a:r>
+            <a:r>
+              <a:rPr lang="fr-FR" dirty="0" err="1"/>
+              <a:t>costs</a:t>
+            </a:r>
+            <a:r>
+              <a:rPr lang="fr-FR" dirty="0"/>
+              <a:t> </a:t>
+            </a:r>
+            <a:r>
+              <a:rPr lang="fr-FR" dirty="0" err="1"/>
+              <a:t>may</a:t>
+            </a:r>
+            <a:r>
+              <a:rPr lang="fr-FR" dirty="0"/>
+              <a:t> arise </a:t>
+            </a:r>
+            <a:r>
+              <a:rPr lang="fr-FR" dirty="0" err="1"/>
+              <a:t>when</a:t>
+            </a:r>
+            <a:r>
+              <a:rPr lang="fr-FR" dirty="0"/>
+              <a:t> </a:t>
+            </a:r>
+            <a:r>
+              <a:rPr lang="fr-FR" dirty="0" err="1"/>
+              <a:t>working</a:t>
+            </a:r>
+            <a:r>
+              <a:rPr lang="fr-FR" dirty="0"/>
+              <a:t> </a:t>
+            </a:r>
+            <a:r>
+              <a:rPr lang="fr-FR" dirty="0" err="1"/>
+              <a:t>with</a:t>
+            </a:r>
+            <a:r>
+              <a:rPr lang="fr-FR" dirty="0"/>
+              <a:t> (</a:t>
+            </a:r>
+            <a:r>
+              <a:rPr lang="fr-FR" dirty="0" err="1"/>
+              <a:t>deep</a:t>
+            </a:r>
+            <a:r>
+              <a:rPr lang="fr-FR" dirty="0"/>
+              <a:t>) nets:</a:t>
+            </a:r>
+            <a:endParaRPr lang="en-FR" dirty="0"/>
+          </a:p>
+        </p:txBody>
+      </p:sp>
+      <p:pic>
+        <p:nvPicPr>
+          <p:cNvPr id="4" name="Image 3">
+            <a:extLst>
+              <a:ext uri="{FF2B5EF4-FFF2-40B4-BE49-F238E27FC236}">
+                <a16:creationId xmlns:a16="http://schemas.microsoft.com/office/drawing/2014/main" id="{3EC615B9-91A2-FB50-9DC6-E80F5391CE69}"/>
+              </a:ext>
+            </a:extLst>
+          </p:cNvPr>
+          <p:cNvPicPr>
+            <a:picLocks noChangeAspect="1"/>
+          </p:cNvPicPr>
+          <p:nvPr/>
+        </p:nvPicPr>
+        <p:blipFill>
+          <a:blip r:embed="rId2"/>
+          <a:stretch>
+            <a:fillRect/>
+          </a:stretch>
+        </p:blipFill>
+        <p:spPr>
+          <a:xfrm>
+            <a:off x="1482021" y="3638550"/>
+            <a:ext cx="9058275" cy="3219450"/>
+          </a:xfrm>
+          <a:prstGeom prst="rect">
+            <a:avLst/>
+          </a:prstGeom>
+        </p:spPr>
+      </p:pic>
+      <p:sp>
+        <p:nvSpPr>
+          <p:cNvPr id="5" name="ZoneTexte 4">
+            <a:extLst>
+              <a:ext uri="{FF2B5EF4-FFF2-40B4-BE49-F238E27FC236}">
+                <a16:creationId xmlns:a16="http://schemas.microsoft.com/office/drawing/2014/main" id="{1F8332E7-2FC7-F9B2-CAED-0BA49FFF3C1C}"/>
+              </a:ext>
+            </a:extLst>
+          </p:cNvPr>
+          <p:cNvSpPr txBox="1"/>
+          <p:nvPr/>
+        </p:nvSpPr>
+        <p:spPr>
+          <a:xfrm>
+            <a:off x="9616140" y="5915353"/>
+            <a:ext cx="2463238" cy="523220"/>
+          </a:xfrm>
+          <a:prstGeom prst="rect">
+            <a:avLst/>
+          </a:prstGeom>
+          <a:noFill/>
+        </p:spPr>
+        <p:txBody>
+          <a:bodyPr wrap="none" rtlCol="0">
+            <a:spAutoFit/>
+          </a:bodyPr>
+          <a:lstStyle/>
+          <a:p>
+            <a:r>
+              <a:rPr lang="fr-FR" sz="1400" i="1" dirty="0"/>
+              <a:t>Source: Techniques for training </a:t>
+            </a:r>
+          </a:p>
+          <a:p>
+            <a:r>
+              <a:rPr lang="fr-FR" sz="1400" i="1" dirty="0"/>
+              <a:t>large neural networks (</a:t>
+            </a:r>
+            <a:r>
+              <a:rPr lang="fr-FR" sz="1400" i="1" dirty="0" err="1"/>
+              <a:t>openai</a:t>
+            </a:r>
+            <a:r>
+              <a:rPr lang="fr-FR" sz="1400" i="1" dirty="0"/>
+              <a:t>)</a:t>
+            </a:r>
+          </a:p>
+        </p:txBody>
+      </p:sp>
+    </p:spTree>
+    <p:extLst>
+      <p:ext uri="{BB962C8B-B14F-4D97-AF65-F5344CB8AC3E}">
+        <p14:creationId xmlns:p14="http://schemas.microsoft.com/office/powerpoint/2010/main" val="2353596618"/>
       </p:ext>
     </p:extLst>
   </p:cSld>
@@ -11642,81 +12050,286 @@
           <a:lstStyle/>
           <a:p>
             <a:r>
-              <a:rPr lang="en-FR"/>
-              <a:t>Logistic Regression</a:t>
-            </a:r>
+              <a:rPr lang="fr-FR" dirty="0"/>
+              <a:t>How to </a:t>
+            </a:r>
+            <a:r>
+              <a:rPr lang="fr-FR" dirty="0" err="1"/>
+              <a:t>distribute</a:t>
+            </a:r>
+            <a:r>
+              <a:rPr lang="fr-FR" dirty="0"/>
+              <a:t> ?</a:t>
+            </a:r>
+            <a:endParaRPr lang="en-FR" dirty="0"/>
           </a:p>
         </p:txBody>
       </p:sp>
-      <p:sp>
-        <p:nvSpPr>
-          <p:cNvPr id="3" name="Content Placeholder 2">
+      <p:pic>
+        <p:nvPicPr>
+          <p:cNvPr id="7" name="Image 6">
             <a:extLst>
               <a:ext uri="{FF2B5EF4-FFF2-40B4-BE49-F238E27FC236}">
-                <a16:creationId xmlns:a16="http://schemas.microsoft.com/office/drawing/2014/main" id="{526EEF4E-6BF1-B34C-ADD3-43B473866EEA}"/>
+                <a16:creationId xmlns:a16="http://schemas.microsoft.com/office/drawing/2014/main" id="{FA2C0DED-7A01-FAA4-FA5F-13D9A0DC4A48}"/>
               </a:ext>
             </a:extLst>
           </p:cNvPr>
-          <p:cNvSpPr>
-            <a:spLocks noGrp="1"/>
-          </p:cNvSpPr>
-          <p:nvPr>
-            <p:ph idx="1"/>
-          </p:nvPr>
-        </p:nvSpPr>
-        <p:spPr/>
-        <p:txBody>
-          <a:bodyPr/>
-          <a:lstStyle/>
-          <a:p>
-            <a:r>
-              <a:rPr lang="en-FR"/>
-              <a:t>We are going to use logistic regression as a show case for some of the techniques shown</a:t>
-            </a:r>
-          </a:p>
-          <a:p>
-            <a:pPr lvl="1"/>
-            <a:r>
-              <a:rPr lang="en-FR"/>
-              <a:t>Most of what we are going to say applied to most parametric models that can be optimized with Gradient Descent</a:t>
-            </a:r>
-          </a:p>
-          <a:p>
-            <a:pPr lvl="1"/>
-            <a:endParaRPr lang="en-FR"/>
-          </a:p>
-          <a:p>
-            <a:r>
-              <a:rPr lang="en-FR"/>
-              <a:t>Logistic Regression is used everywhere</a:t>
-            </a:r>
-          </a:p>
-          <a:p>
-            <a:pPr lvl="1"/>
-            <a:r>
-              <a:rPr lang="en-FR"/>
-              <a:t>Most common classification algorithm, can be quite very flexible</a:t>
-            </a:r>
-          </a:p>
-          <a:p>
-            <a:pPr lvl="1"/>
-            <a:r>
-              <a:rPr lang="en-FR"/>
-              <a:t>Criteo trains thousands of LR models per day and uses them to do billions of predictions</a:t>
-            </a:r>
-          </a:p>
-        </p:txBody>
-      </p:sp>
+          <p:cNvPicPr>
+            <a:picLocks noChangeAspect="1"/>
+          </p:cNvPicPr>
+          <p:nvPr/>
+        </p:nvPicPr>
+        <p:blipFill>
+          <a:blip r:embed="rId2"/>
+          <a:stretch>
+            <a:fillRect/>
+          </a:stretch>
+        </p:blipFill>
+        <p:spPr>
+          <a:xfrm>
+            <a:off x="1901890" y="2087336"/>
+            <a:ext cx="2266950" cy="2857500"/>
+          </a:xfrm>
+          <a:prstGeom prst="rect">
+            <a:avLst/>
+          </a:prstGeom>
+        </p:spPr>
+      </p:pic>
+      <p:pic>
+        <p:nvPicPr>
+          <p:cNvPr id="9" name="Image 8">
+            <a:extLst>
+              <a:ext uri="{FF2B5EF4-FFF2-40B4-BE49-F238E27FC236}">
+                <a16:creationId xmlns:a16="http://schemas.microsoft.com/office/drawing/2014/main" id="{9FAD2CFE-9770-790D-E7E9-23EA43FC573A}"/>
+              </a:ext>
+            </a:extLst>
+          </p:cNvPr>
+          <p:cNvPicPr>
+            <a:picLocks noChangeAspect="1"/>
+          </p:cNvPicPr>
+          <p:nvPr/>
+        </p:nvPicPr>
+        <p:blipFill>
+          <a:blip r:embed="rId3"/>
+          <a:stretch>
+            <a:fillRect/>
+          </a:stretch>
+        </p:blipFill>
+        <p:spPr>
+          <a:xfrm>
+            <a:off x="4405604" y="1985476"/>
+            <a:ext cx="2286000" cy="2971800"/>
+          </a:xfrm>
+          <a:prstGeom prst="rect">
+            <a:avLst/>
+          </a:prstGeom>
+        </p:spPr>
+      </p:pic>
+      <p:pic>
+        <p:nvPicPr>
+          <p:cNvPr id="13" name="Image 12">
+            <a:extLst>
+              <a:ext uri="{FF2B5EF4-FFF2-40B4-BE49-F238E27FC236}">
+                <a16:creationId xmlns:a16="http://schemas.microsoft.com/office/drawing/2014/main" id="{FCAFDC56-CC57-9CAD-CF7F-BABEB845BC3F}"/>
+              </a:ext>
+            </a:extLst>
+          </p:cNvPr>
+          <p:cNvPicPr>
+            <a:picLocks noChangeAspect="1"/>
+          </p:cNvPicPr>
+          <p:nvPr/>
+        </p:nvPicPr>
+        <p:blipFill>
+          <a:blip r:embed="rId4"/>
+          <a:stretch>
+            <a:fillRect/>
+          </a:stretch>
+        </p:blipFill>
+        <p:spPr>
+          <a:xfrm>
+            <a:off x="6928368" y="2051858"/>
+            <a:ext cx="2219325" cy="2828925"/>
+          </a:xfrm>
+          <a:prstGeom prst="rect">
+            <a:avLst/>
+          </a:prstGeom>
+        </p:spPr>
+      </p:pic>
     </p:spTree>
     <p:extLst>
       <p:ext uri="{BB962C8B-B14F-4D97-AF65-F5344CB8AC3E}">
-        <p14:creationId xmlns:p14="http://schemas.microsoft.com/office/powerpoint/2010/main" val="3065903460"/>
+        <p14:creationId xmlns:p14="http://schemas.microsoft.com/office/powerpoint/2010/main" val="123879202"/>
       </p:ext>
     </p:extLst>
   </p:cSld>
   <p:clrMapOvr>
     <a:masterClrMapping/>
   </p:clrMapOvr>
+  <p:timing>
+    <p:tnLst>
+      <p:par>
+        <p:cTn id="1" dur="indefinite" restart="never" nodeType="tmRoot">
+          <p:childTnLst>
+            <p:seq concurrent="1" nextAc="seek">
+              <p:cTn id="2" dur="indefinite" nodeType="mainSeq">
+                <p:childTnLst>
+                  <p:par>
+                    <p:cTn id="3" fill="hold">
+                      <p:stCondLst>
+                        <p:cond delay="indefinite"/>
+                      </p:stCondLst>
+                      <p:childTnLst>
+                        <p:par>
+                          <p:cTn id="4" fill="hold">
+                            <p:stCondLst>
+                              <p:cond delay="0"/>
+                            </p:stCondLst>
+                            <p:childTnLst>
+                              <p:par>
+                                <p:cTn id="5" presetID="1" presetClass="entr" presetSubtype="0" fill="hold" nodeType="clickEffect">
+                                  <p:stCondLst>
+                                    <p:cond delay="0"/>
+                                  </p:stCondLst>
+                                  <p:childTnLst>
+                                    <p:set>
+                                      <p:cBhvr>
+                                        <p:cTn id="6" dur="1" fill="hold">
+                                          <p:stCondLst>
+                                            <p:cond delay="0"/>
+                                          </p:stCondLst>
+                                        </p:cTn>
+                                        <p:tgtEl>
+                                          <p:spTgt spid="7"/>
+                                        </p:tgtEl>
+                                        <p:attrNameLst>
+                                          <p:attrName>style.visibility</p:attrName>
+                                        </p:attrNameLst>
+                                      </p:cBhvr>
+                                      <p:to>
+                                        <p:strVal val="visible"/>
+                                      </p:to>
+                                    </p:set>
+                                  </p:childTnLst>
+                                </p:cTn>
+                              </p:par>
+                            </p:childTnLst>
+                          </p:cTn>
+                        </p:par>
+                      </p:childTnLst>
+                    </p:cTn>
+                  </p:par>
+                  <p:par>
+                    <p:cTn id="7" fill="hold">
+                      <p:stCondLst>
+                        <p:cond delay="indefinite"/>
+                      </p:stCondLst>
+                      <p:childTnLst>
+                        <p:par>
+                          <p:cTn id="8" fill="hold">
+                            <p:stCondLst>
+                              <p:cond delay="0"/>
+                            </p:stCondLst>
+                            <p:childTnLst>
+                              <p:par>
+                                <p:cTn id="9" presetID="1" presetClass="entr" presetSubtype="0" fill="hold" nodeType="clickEffect">
+                                  <p:stCondLst>
+                                    <p:cond delay="0"/>
+                                  </p:stCondLst>
+                                  <p:childTnLst>
+                                    <p:set>
+                                      <p:cBhvr>
+                                        <p:cTn id="10" dur="1" fill="hold">
+                                          <p:stCondLst>
+                                            <p:cond delay="0"/>
+                                          </p:stCondLst>
+                                        </p:cTn>
+                                        <p:tgtEl>
+                                          <p:spTgt spid="9"/>
+                                        </p:tgtEl>
+                                        <p:attrNameLst>
+                                          <p:attrName>style.visibility</p:attrName>
+                                        </p:attrNameLst>
+                                      </p:cBhvr>
+                                      <p:to>
+                                        <p:strVal val="visible"/>
+                                      </p:to>
+                                    </p:set>
+                                  </p:childTnLst>
+                                </p:cTn>
+                              </p:par>
+                            </p:childTnLst>
+                          </p:cTn>
+                        </p:par>
+                      </p:childTnLst>
+                    </p:cTn>
+                  </p:par>
+                  <p:par>
+                    <p:cTn id="11" fill="hold">
+                      <p:stCondLst>
+                        <p:cond delay="indefinite"/>
+                      </p:stCondLst>
+                      <p:childTnLst>
+                        <p:par>
+                          <p:cTn id="12" fill="hold">
+                            <p:stCondLst>
+                              <p:cond delay="0"/>
+                            </p:stCondLst>
+                            <p:childTnLst>
+                              <p:par>
+                                <p:cTn id="13" presetID="1" presetClass="entr" presetSubtype="0" fill="hold" nodeType="clickEffect">
+                                  <p:stCondLst>
+                                    <p:cond delay="0"/>
+                                  </p:stCondLst>
+                                  <p:childTnLst>
+                                    <p:set>
+                                      <p:cBhvr>
+                                        <p:cTn id="14" dur="1" fill="hold">
+                                          <p:stCondLst>
+                                            <p:cond delay="0"/>
+                                          </p:stCondLst>
+                                        </p:cTn>
+                                        <p:tgtEl>
+                                          <p:spTgt spid="13"/>
+                                        </p:tgtEl>
+                                        <p:attrNameLst>
+                                          <p:attrName>style.visibility</p:attrName>
+                                        </p:attrNameLst>
+                                      </p:cBhvr>
+                                      <p:to>
+                                        <p:strVal val="visible"/>
+                                      </p:to>
+                                    </p:set>
+                                  </p:childTnLst>
+                                </p:cTn>
+                              </p:par>
+                            </p:childTnLst>
+                          </p:cTn>
+                        </p:par>
+                      </p:childTnLst>
+                    </p:cTn>
+                  </p:par>
+                </p:childTnLst>
+              </p:cTn>
+              <p:prevCondLst>
+                <p:cond evt="onPrev" delay="0">
+                  <p:tgtEl>
+                    <p:sldTgt/>
+                  </p:tgtEl>
+                </p:cond>
+              </p:prevCondLst>
+              <p:nextCondLst>
+                <p:cond evt="onNext" delay="0">
+                  <p:tgtEl>
+                    <p:sldTgt/>
+                  </p:tgtEl>
+                </p:cond>
+              </p:nextCondLst>
+            </p:seq>
+          </p:childTnLst>
+        </p:cTn>
+      </p:par>
+    </p:tnLst>
+  </p:timing>
 </p:sld>
 </file>
 
@@ -11765,8 +12378,125 @@
           </a:p>
         </p:txBody>
       </p:sp>
-      <mc:AlternateContent xmlns:mc="http://schemas.openxmlformats.org/markup-compatibility/2006">
-        <mc:Choice xmlns:a14="http://schemas.microsoft.com/office/drawing/2010/main" Requires="a14">
+      <p:sp>
+        <p:nvSpPr>
+          <p:cNvPr id="3" name="Content Placeholder 2">
+            <a:extLst>
+              <a:ext uri="{FF2B5EF4-FFF2-40B4-BE49-F238E27FC236}">
+                <a16:creationId xmlns:a16="http://schemas.microsoft.com/office/drawing/2014/main" id="{526EEF4E-6BF1-B34C-ADD3-43B473866EEA}"/>
+              </a:ext>
+            </a:extLst>
+          </p:cNvPr>
+          <p:cNvSpPr>
+            <a:spLocks noGrp="1"/>
+          </p:cNvSpPr>
+          <p:nvPr>
+            <p:ph idx="1"/>
+          </p:nvPr>
+        </p:nvSpPr>
+        <p:spPr/>
+        <p:txBody>
+          <a:bodyPr/>
+          <a:lstStyle/>
+          <a:p>
+            <a:r>
+              <a:rPr lang="en-FR"/>
+              <a:t>We are going to use logistic regression as a show case for some of the techniques shown</a:t>
+            </a:r>
+          </a:p>
+          <a:p>
+            <a:pPr lvl="1"/>
+            <a:r>
+              <a:rPr lang="en-FR"/>
+              <a:t>Most of what we are going to say applied to most parametric models that can be optimized with Gradient Descent</a:t>
+            </a:r>
+          </a:p>
+          <a:p>
+            <a:pPr lvl="1"/>
+            <a:endParaRPr lang="en-FR"/>
+          </a:p>
+          <a:p>
+            <a:r>
+              <a:rPr lang="en-FR"/>
+              <a:t>Logistic Regression is used everywhere</a:t>
+            </a:r>
+          </a:p>
+          <a:p>
+            <a:pPr lvl="1"/>
+            <a:r>
+              <a:rPr lang="en-FR"/>
+              <a:t>Most common classification algorithm, can be quite very flexible</a:t>
+            </a:r>
+          </a:p>
+          <a:p>
+            <a:pPr lvl="1"/>
+            <a:r>
+              <a:rPr lang="en-FR"/>
+              <a:t>Criteo trains thousands of LR models per day and uses them to do billions of predictions</a:t>
+            </a:r>
+          </a:p>
+        </p:txBody>
+      </p:sp>
+    </p:spTree>
+    <p:extLst>
+      <p:ext uri="{BB962C8B-B14F-4D97-AF65-F5344CB8AC3E}">
+        <p14:creationId xmlns:p14="http://schemas.microsoft.com/office/powerpoint/2010/main" val="3065903460"/>
+      </p:ext>
+    </p:extLst>
+  </p:cSld>
+  <p:clrMapOvr>
+    <a:masterClrMapping/>
+  </p:clrMapOvr>
+</p:sld>
+</file>
+
+<file path=ppt/slides/slide7.xml><?xml version="1.0" encoding="utf-8"?>
+<p:sld xmlns:a="http://schemas.openxmlformats.org/drawingml/2006/main" xmlns:r="http://schemas.openxmlformats.org/officeDocument/2006/relationships" xmlns:p="http://schemas.openxmlformats.org/presentationml/2006/main">
+  <p:cSld>
+    <p:spTree>
+      <p:nvGrpSpPr>
+        <p:cNvPr id="1" name=""/>
+        <p:cNvGrpSpPr/>
+        <p:nvPr/>
+      </p:nvGrpSpPr>
+      <p:grpSpPr>
+        <a:xfrm>
+          <a:off x="0" y="0"/>
+          <a:ext cx="0" cy="0"/>
+          <a:chOff x="0" y="0"/>
+          <a:chExt cx="0" cy="0"/>
+        </a:xfrm>
+      </p:grpSpPr>
+      <p:sp>
+        <p:nvSpPr>
+          <p:cNvPr id="2" name="Title 1">
+            <a:extLst>
+              <a:ext uri="{FF2B5EF4-FFF2-40B4-BE49-F238E27FC236}">
+                <a16:creationId xmlns:a16="http://schemas.microsoft.com/office/drawing/2014/main" id="{5A4DDBF4-8143-1349-AE89-C756F9A3CD5C}"/>
+              </a:ext>
+            </a:extLst>
+          </p:cNvPr>
+          <p:cNvSpPr>
+            <a:spLocks noGrp="1"/>
+          </p:cNvSpPr>
+          <p:nvPr>
+            <p:ph type="title"/>
+          </p:nvPr>
+        </p:nvSpPr>
+        <p:spPr/>
+        <p:txBody>
+          <a:bodyPr/>
+          <a:lstStyle/>
+          <a:p>
+            <a:r>
+              <a:rPr lang="en-FR"/>
+              <a:t>Logistic Regression</a:t>
+            </a:r>
+          </a:p>
+        </p:txBody>
+      </p:sp>
+      <mc:AlternateContent xmlns:mc="http://schemas.openxmlformats.org/markup-compatibility/2006" xmlns:a14="http://schemas.microsoft.com/office/drawing/2010/main">
+        <mc:Choice Requires="a14">
           <p:sp>
             <p:nvSpPr>
               <p:cNvPr id="3" name="Content Placeholder 2">
@@ -12756,7 +13486,7 @@
             </p:txBody>
           </p:sp>
         </mc:Choice>
-        <mc:Fallback>
+        <mc:Fallback xmlns="">
           <p:sp>
             <p:nvSpPr>
               <p:cNvPr id="3" name="Content Placeholder 2">
@@ -12986,7 +13716,7 @@
 </p:sld>
 </file>
 
-<file path=ppt/slides/slide7.xml><?xml version="1.0" encoding="utf-8"?>
+<file path=ppt/slides/slide8.xml><?xml version="1.0" encoding="utf-8"?>
 <p:sld xmlns:a="http://schemas.openxmlformats.org/drawingml/2006/main" xmlns:r="http://schemas.openxmlformats.org/officeDocument/2006/relationships" xmlns:p="http://schemas.openxmlformats.org/presentationml/2006/main">
   <p:cSld>
     <p:spTree>
@@ -13675,7 +14405,7 @@
 </p:sld>
 </file>
 
-<file path=ppt/slides/slide8.xml><?xml version="1.0" encoding="utf-8"?>
+<file path=ppt/slides/slide9.xml><?xml version="1.0" encoding="utf-8"?>
 <p:sld xmlns:a="http://schemas.openxmlformats.org/drawingml/2006/main" xmlns:r="http://schemas.openxmlformats.org/officeDocument/2006/relationships" xmlns:p="http://schemas.openxmlformats.org/presentationml/2006/main">
   <p:cSld>
     <p:spTree>
@@ -14847,189 +15577,6 @@
     <p:extLst>
       <p:ext uri="{BB962C8B-B14F-4D97-AF65-F5344CB8AC3E}">
         <p14:creationId xmlns:p14="http://schemas.microsoft.com/office/powerpoint/2010/main" val="2574005736"/>
-      </p:ext>
-    </p:extLst>
-  </p:cSld>
-  <p:clrMapOvr>
-    <a:masterClrMapping/>
-  </p:clrMapOvr>
-</p:sld>
-</file>
-
-<file path=ppt/slides/slide9.xml><?xml version="1.0" encoding="utf-8"?>
-<p:sld xmlns:a="http://schemas.openxmlformats.org/drawingml/2006/main" xmlns:r="http://schemas.openxmlformats.org/officeDocument/2006/relationships" xmlns:p="http://schemas.openxmlformats.org/presentationml/2006/main">
-  <p:cSld>
-    <p:spTree>
-      <p:nvGrpSpPr>
-        <p:cNvPr id="1" name=""/>
-        <p:cNvGrpSpPr/>
-        <p:nvPr/>
-      </p:nvGrpSpPr>
-      <p:grpSpPr>
-        <a:xfrm>
-          <a:off x="0" y="0"/>
-          <a:ext cx="0" cy="0"/>
-          <a:chOff x="0" y="0"/>
-          <a:chExt cx="0" cy="0"/>
-        </a:xfrm>
-      </p:grpSpPr>
-      <p:sp>
-        <p:nvSpPr>
-          <p:cNvPr id="2" name="Title 1">
-            <a:extLst>
-              <a:ext uri="{FF2B5EF4-FFF2-40B4-BE49-F238E27FC236}">
-                <a16:creationId xmlns:a16="http://schemas.microsoft.com/office/drawing/2014/main" id="{5A4DDBF4-8143-1349-AE89-C756F9A3CD5C}"/>
-              </a:ext>
-            </a:extLst>
-          </p:cNvPr>
-          <p:cNvSpPr>
-            <a:spLocks noGrp="1"/>
-          </p:cNvSpPr>
-          <p:nvPr>
-            <p:ph type="title"/>
-          </p:nvPr>
-        </p:nvSpPr>
-        <p:spPr/>
-        <p:txBody>
-          <a:bodyPr/>
-          <a:lstStyle/>
-          <a:p>
-            <a:r>
-              <a:rPr lang="en-FR"/>
-              <a:t>Distributed Gradient Descent 101</a:t>
-            </a:r>
-          </a:p>
-        </p:txBody>
-      </p:sp>
-      <mc:AlternateContent xmlns:mc="http://schemas.openxmlformats.org/markup-compatibility/2006" xmlns:a14="http://schemas.microsoft.com/office/drawing/2010/main">
-        <mc:Choice Requires="a14">
-          <p:sp>
-            <p:nvSpPr>
-              <p:cNvPr id="5" name="Content Placeholder 4">
-                <a:extLst>
-                  <a:ext uri="{FF2B5EF4-FFF2-40B4-BE49-F238E27FC236}">
-                    <a16:creationId xmlns:a16="http://schemas.microsoft.com/office/drawing/2014/main" id="{D9F4F0FC-9B82-3D40-98B3-B4D29F6B3DD7}"/>
-                  </a:ext>
-                </a:extLst>
-              </p:cNvPr>
-              <p:cNvSpPr>
-                <a:spLocks noGrp="1"/>
-              </p:cNvSpPr>
-              <p:nvPr>
-                <p:ph idx="1"/>
-              </p:nvPr>
-            </p:nvSpPr>
-            <p:spPr/>
-            <p:txBody>
-              <a:bodyPr/>
-              <a:lstStyle/>
-              <a:p>
-                <a14:m>
-                  <m:oMath xmlns:m="http://schemas.openxmlformats.org/officeDocument/2006/math">
-                    <m:r>
-                      <a:rPr lang="en-FR" i="1" dirty="0" smtClean="0">
-                        <a:latin typeface="Cambria Math" panose="02040503050406030204" pitchFamily="18" charset="0"/>
-                      </a:rPr>
-                      <m:t>𝑊</m:t>
-                    </m:r>
-                  </m:oMath>
-                </a14:m>
-                <a:r>
-                  <a:rPr lang="en-FR"/>
-                  <a:t> workers</a:t>
-                </a:r>
-              </a:p>
-              <a:p>
-                <a:r>
-                  <a:rPr lang="en-FR"/>
-                  <a:t>Each worker</a:t>
-                </a:r>
-              </a:p>
-              <a:p>
-                <a:pPr lvl="1"/>
-                <a:r>
-                  <a:rPr lang="en-FR"/>
-                  <a:t>Reads a partition of data</a:t>
-                </a:r>
-              </a:p>
-              <a:p>
-                <a:pPr lvl="1"/>
-                <a:r>
-                  <a:rPr lang="en-FR"/>
-                  <a:t>Computes a local gradient</a:t>
-                </a:r>
-              </a:p>
-              <a:p>
-                <a:pPr lvl="1"/>
-                <a:r>
-                  <a:rPr lang="en-FR"/>
-                  <a:t>Sends the gradient over to be aggregated</a:t>
-                </a:r>
-              </a:p>
-              <a:p>
-                <a:pPr lvl="1"/>
-                <a:r>
-                  <a:rPr lang="en-FR"/>
-                  <a:t>Model is updated and re-pushed to the workers</a:t>
-                </a:r>
-              </a:p>
-              <a:p>
-                <a:pPr lvl="1"/>
-                <a:r>
-                  <a:rPr lang="en-FR"/>
-                  <a:t>Rince and repeat</a:t>
-                </a:r>
-              </a:p>
-              <a:p>
-                <a:endParaRPr lang="en-FR"/>
-              </a:p>
-            </p:txBody>
-          </p:sp>
-        </mc:Choice>
-        <mc:Fallback xmlns="">
-          <p:sp>
-            <p:nvSpPr>
-              <p:cNvPr id="5" name="Content Placeholder 4">
-                <a:extLst>
-                  <a:ext uri="{FF2B5EF4-FFF2-40B4-BE49-F238E27FC236}">
-                    <a16:creationId xmlns:a16="http://schemas.microsoft.com/office/drawing/2014/main" id="{D9F4F0FC-9B82-3D40-98B3-B4D29F6B3DD7}"/>
-                  </a:ext>
-                </a:extLst>
-              </p:cNvPr>
-              <p:cNvSpPr>
-                <a:spLocks noGrp="1" noRot="1" noChangeAspect="1" noMove="1" noResize="1" noEditPoints="1" noAdjustHandles="1" noChangeArrowheads="1" noChangeShapeType="1" noTextEdit="1"/>
-              </p:cNvSpPr>
-              <p:nvPr>
-                <p:ph idx="1"/>
-              </p:nvPr>
-            </p:nvSpPr>
-            <p:spPr>
-              <a:blipFill>
-                <a:blip r:embed="rId2"/>
-                <a:stretch>
-                  <a:fillRect l="-928" t="-2241"/>
-                </a:stretch>
-              </a:blipFill>
-            </p:spPr>
-            <p:txBody>
-              <a:bodyPr/>
-              <a:lstStyle/>
-              <a:p>
-                <a:r>
-                  <a:rPr lang="fr-FR">
-                    <a:noFill/>
-                  </a:rPr>
-                  <a:t> </a:t>
-                </a:r>
-              </a:p>
-            </p:txBody>
-          </p:sp>
-        </mc:Fallback>
-      </mc:AlternateContent>
-    </p:spTree>
-    <p:extLst>
-      <p:ext uri="{BB962C8B-B14F-4D97-AF65-F5344CB8AC3E}">
-        <p14:creationId xmlns:p14="http://schemas.microsoft.com/office/powerpoint/2010/main" val="2527911543"/>
       </p:ext>
     </p:extLst>
   </p:cSld>

</xml_diff>